<commit_message>
update dock file and ppt
Signed-off-by: Liu Haixiang <haixiang1977@gmail.com>
</commit_message>
<xml_diff>
--- a/Docker Practice.pptx
+++ b/Docker Practice.pptx
@@ -19,11 +19,17 @@
     <p:sldId id="269" r:id="rId13"/>
     <p:sldId id="270" r:id="rId14"/>
     <p:sldId id="271" r:id="rId15"/>
-    <p:sldId id="268" r:id="rId16"/>
-    <p:sldId id="272" r:id="rId17"/>
-    <p:sldId id="273" r:id="rId18"/>
-    <p:sldId id="274" r:id="rId19"/>
-    <p:sldId id="265" r:id="rId20"/>
+    <p:sldId id="275" r:id="rId16"/>
+    <p:sldId id="276" r:id="rId17"/>
+    <p:sldId id="272" r:id="rId18"/>
+    <p:sldId id="273" r:id="rId19"/>
+    <p:sldId id="274" r:id="rId20"/>
+    <p:sldId id="277" r:id="rId21"/>
+    <p:sldId id="278" r:id="rId22"/>
+    <p:sldId id="279" r:id="rId23"/>
+    <p:sldId id="280" r:id="rId24"/>
+    <p:sldId id="268" r:id="rId25"/>
+    <p:sldId id="265" r:id="rId26"/>
   </p:sldIdLst>
   <p:sldSz cx="12192000" cy="6858000"/>
   <p:notesSz cx="6858000" cy="9144000"/>
@@ -6783,7 +6789,7 @@
           <p:cNvPr id="2" name="Title 1">
             <a:extLst>
               <a:ext uri="{FF2B5EF4-FFF2-40B4-BE49-F238E27FC236}">
-                <a16:creationId xmlns:a16="http://schemas.microsoft.com/office/drawing/2014/main" id="{2610DD2F-01B3-45F9-A18D-583CA347B1BF}"/>
+                <a16:creationId xmlns:a16="http://schemas.microsoft.com/office/drawing/2014/main" id="{E40B227A-7F5F-44B9-8F72-C48A92CBD124}"/>
               </a:ext>
             </a:extLst>
           </p:cNvPr>
@@ -6801,7 +6807,7 @@
           <a:p>
             <a:r>
               <a:rPr lang="en-US" dirty="0"/>
-              <a:t>Use docker file create image</a:t>
+              <a:t>Start from ubuntu image (cont.)</a:t>
             </a:r>
           </a:p>
         </p:txBody>
@@ -6811,7 +6817,7 @@
           <p:cNvPr id="3" name="Content Placeholder 2">
             <a:extLst>
               <a:ext uri="{FF2B5EF4-FFF2-40B4-BE49-F238E27FC236}">
-                <a16:creationId xmlns:a16="http://schemas.microsoft.com/office/drawing/2014/main" id="{D693EB38-8364-40D6-A27A-A20686730EF4}"/>
+                <a16:creationId xmlns:a16="http://schemas.microsoft.com/office/drawing/2014/main" id="{4440660F-8156-4AF2-BA45-EC146EC7436D}"/>
               </a:ext>
             </a:extLst>
           </p:cNvPr>
@@ -6829,29 +6835,50 @@
           <a:p>
             <a:r>
               <a:rPr lang="en-US" dirty="0"/>
-              <a:t>Multi-stage build</a:t>
-            </a:r>
-          </a:p>
-          <a:p>
-            <a:pPr lvl="1"/>
-            <a:r>
-              <a:rPr lang="en-US" dirty="0"/>
-              <a:t>Build stage docker image</a:t>
-            </a:r>
-          </a:p>
-          <a:p>
-            <a:pPr lvl="1"/>
-            <a:r>
-              <a:rPr lang="en-US" dirty="0"/>
-              <a:t>Run-time stage docker image</a:t>
-            </a:r>
-          </a:p>
-        </p:txBody>
-      </p:sp>
+              <a:t>Checking running port and </a:t>
+            </a:r>
+            <a:r>
+              <a:rPr lang="en-US" dirty="0" err="1"/>
+              <a:t>ip</a:t>
+            </a:r>
+            <a:endParaRPr lang="en-US" dirty="0"/>
+          </a:p>
+        </p:txBody>
+      </p:sp>
+      <p:pic>
+        <p:nvPicPr>
+          <p:cNvPr id="4" name="Picture 3">
+            <a:extLst>
+              <a:ext uri="{FF2B5EF4-FFF2-40B4-BE49-F238E27FC236}">
+                <a16:creationId xmlns:a16="http://schemas.microsoft.com/office/drawing/2014/main" id="{FBE16D13-6A20-4FC7-965A-35527AEDCA76}"/>
+              </a:ext>
+            </a:extLst>
+          </p:cNvPr>
+          <p:cNvPicPr>
+            <a:picLocks noChangeAspect="1"/>
+          </p:cNvPicPr>
+          <p:nvPr/>
+        </p:nvPicPr>
+        <p:blipFill>
+          <a:blip r:embed="rId2"/>
+          <a:stretch>
+            <a:fillRect/>
+          </a:stretch>
+        </p:blipFill>
+        <p:spPr>
+          <a:xfrm>
+            <a:off x="1305018" y="2783954"/>
+            <a:ext cx="7297029" cy="3626186"/>
+          </a:xfrm>
+          <a:prstGeom prst="rect">
+            <a:avLst/>
+          </a:prstGeom>
+        </p:spPr>
+      </p:pic>
     </p:spTree>
     <p:extLst>
       <p:ext uri="{BB962C8B-B14F-4D97-AF65-F5344CB8AC3E}">
-        <p14:creationId xmlns:p14="http://schemas.microsoft.com/office/powerpoint/2010/main" val="2091007274"/>
+        <p14:creationId xmlns:p14="http://schemas.microsoft.com/office/powerpoint/2010/main" val="983448388"/>
       </p:ext>
     </p:extLst>
   </p:cSld>
@@ -6883,7 +6910,7 @@
           <p:cNvPr id="2" name="Title 1">
             <a:extLst>
               <a:ext uri="{FF2B5EF4-FFF2-40B4-BE49-F238E27FC236}">
-                <a16:creationId xmlns:a16="http://schemas.microsoft.com/office/drawing/2014/main" id="{E33254AB-084E-4115-8696-8394B767BB83}"/>
+                <a16:creationId xmlns:a16="http://schemas.microsoft.com/office/drawing/2014/main" id="{BE80F3F4-B3D5-4F93-A1F2-E49E578B611A}"/>
               </a:ext>
             </a:extLst>
           </p:cNvPr>
@@ -6901,7 +6928,7 @@
           <a:p>
             <a:r>
               <a:rPr lang="en-US" dirty="0"/>
-              <a:t>Build stage docker image</a:t>
+              <a:t>Start from ubuntu image (cont.)</a:t>
             </a:r>
           </a:p>
         </p:txBody>
@@ -6911,7 +6938,7 @@
           <p:cNvPr id="3" name="Content Placeholder 2">
             <a:extLst>
               <a:ext uri="{FF2B5EF4-FFF2-40B4-BE49-F238E27FC236}">
-                <a16:creationId xmlns:a16="http://schemas.microsoft.com/office/drawing/2014/main" id="{1D491AE3-93DF-45CF-BA24-2C64AD8F0865}"/>
+                <a16:creationId xmlns:a16="http://schemas.microsoft.com/office/drawing/2014/main" id="{B57FB7F6-E570-4AE0-9CF4-6B6AD44A10A1}"/>
               </a:ext>
             </a:extLst>
           </p:cNvPr>
@@ -6929,32 +6956,15 @@
           <a:p>
             <a:r>
               <a:rPr lang="en-US" dirty="0"/>
-              <a:t>Run ubuntu:16.04 image with /bin/bash</a:t>
-            </a:r>
-          </a:p>
-          <a:p>
-            <a:pPr lvl="1"/>
-            <a:r>
-              <a:rPr lang="en-US" dirty="0"/>
-              <a:t>docker run -it ubuntu:16.04 /bin/bash</a:t>
-            </a:r>
-          </a:p>
-          <a:p>
-            <a:pPr lvl="1"/>
-            <a:endParaRPr lang="en-US" dirty="0"/>
-          </a:p>
-          <a:p>
-            <a:pPr lvl="1"/>
-            <a:endParaRPr lang="en-US" dirty="0"/>
-          </a:p>
-          <a:p>
-            <a:pPr lvl="1"/>
-            <a:endParaRPr lang="en-US" dirty="0"/>
-          </a:p>
-          <a:p>
-            <a:r>
-              <a:rPr lang="en-US" dirty="0"/>
-              <a:t>Install packages</a:t>
+              <a:t>Checking running port and </a:t>
+            </a:r>
+            <a:r>
+              <a:rPr lang="en-US" dirty="0" err="1"/>
+              <a:t>ip</a:t>
+            </a:r>
+            <a:r>
+              <a:rPr lang="en-US" dirty="0"/>
+              <a:t> (cont.)</a:t>
             </a:r>
           </a:p>
         </p:txBody>
@@ -6964,7 +6974,7 @@
           <p:cNvPr id="4" name="Picture 3">
             <a:extLst>
               <a:ext uri="{FF2B5EF4-FFF2-40B4-BE49-F238E27FC236}">
-                <a16:creationId xmlns:a16="http://schemas.microsoft.com/office/drawing/2014/main" id="{7D50F52F-A7E5-47C7-88E4-4C9B9889C813}"/>
+                <a16:creationId xmlns:a16="http://schemas.microsoft.com/office/drawing/2014/main" id="{E95CAB92-18D1-46D0-8278-A50F0F79FF7D}"/>
               </a:ext>
             </a:extLst>
           </p:cNvPr>
@@ -6981,38 +6991,8 @@
         </p:blipFill>
         <p:spPr>
           <a:xfrm>
-            <a:off x="1457325" y="3265225"/>
-            <a:ext cx="9820275" cy="1162050"/>
-          </a:xfrm>
-          <a:prstGeom prst="rect">
-            <a:avLst/>
-          </a:prstGeom>
-        </p:spPr>
-      </p:pic>
-      <p:pic>
-        <p:nvPicPr>
-          <p:cNvPr id="5" name="Picture 4">
-            <a:extLst>
-              <a:ext uri="{FF2B5EF4-FFF2-40B4-BE49-F238E27FC236}">
-                <a16:creationId xmlns:a16="http://schemas.microsoft.com/office/drawing/2014/main" id="{905FB4D4-8FB8-4CC9-B41B-DC5FB134E6C3}"/>
-              </a:ext>
-            </a:extLst>
-          </p:cNvPr>
-          <p:cNvPicPr>
-            <a:picLocks noChangeAspect="1"/>
-          </p:cNvPicPr>
-          <p:nvPr/>
-        </p:nvPicPr>
-        <p:blipFill>
-          <a:blip r:embed="rId3"/>
-          <a:stretch>
-            <a:fillRect/>
-          </a:stretch>
-        </p:blipFill>
-        <p:spPr>
-          <a:xfrm>
-            <a:off x="1457325" y="5013709"/>
-            <a:ext cx="8239125" cy="1304925"/>
+            <a:off x="1296140" y="2781458"/>
+            <a:ext cx="5211192" cy="3904240"/>
           </a:xfrm>
           <a:prstGeom prst="rect">
             <a:avLst/>
@@ -7022,7 +7002,7 @@
     </p:spTree>
     <p:extLst>
       <p:ext uri="{BB962C8B-B14F-4D97-AF65-F5344CB8AC3E}">
-        <p14:creationId xmlns:p14="http://schemas.microsoft.com/office/powerpoint/2010/main" val="4222781916"/>
+        <p14:creationId xmlns:p14="http://schemas.microsoft.com/office/powerpoint/2010/main" val="175981310"/>
       </p:ext>
     </p:extLst>
   </p:cSld>
@@ -7054,7 +7034,7 @@
           <p:cNvPr id="2" name="Title 1">
             <a:extLst>
               <a:ext uri="{FF2B5EF4-FFF2-40B4-BE49-F238E27FC236}">
-                <a16:creationId xmlns:a16="http://schemas.microsoft.com/office/drawing/2014/main" id="{300AE0EF-69B6-4FB2-940F-EE21A62B54E8}"/>
+                <a16:creationId xmlns:a16="http://schemas.microsoft.com/office/drawing/2014/main" id="{E33254AB-084E-4115-8696-8394B767BB83}"/>
               </a:ext>
             </a:extLst>
           </p:cNvPr>
@@ -7072,7 +7052,7 @@
           <a:p>
             <a:r>
               <a:rPr lang="en-US" dirty="0"/>
-              <a:t>Build stage docker image</a:t>
+              <a:t>Build stage docker image – by manual</a:t>
             </a:r>
           </a:p>
         </p:txBody>
@@ -7082,7 +7062,7 @@
           <p:cNvPr id="3" name="Content Placeholder 2">
             <a:extLst>
               <a:ext uri="{FF2B5EF4-FFF2-40B4-BE49-F238E27FC236}">
-                <a16:creationId xmlns:a16="http://schemas.microsoft.com/office/drawing/2014/main" id="{1007A7FF-2CC9-44D1-9D29-6337764CB17C}"/>
+                <a16:creationId xmlns:a16="http://schemas.microsoft.com/office/drawing/2014/main" id="{1D491AE3-93DF-45CF-BA24-2C64AD8F0865}"/>
               </a:ext>
             </a:extLst>
           </p:cNvPr>
@@ -7100,25 +7080,32 @@
           <a:p>
             <a:r>
               <a:rPr lang="en-US" dirty="0"/>
-              <a:t>Install packages (cont.)</a:t>
-            </a:r>
-          </a:p>
-          <a:p>
-            <a:endParaRPr lang="en-US" dirty="0"/>
-          </a:p>
-          <a:p>
-            <a:endParaRPr lang="en-US" dirty="0"/>
-          </a:p>
-          <a:p>
-            <a:endParaRPr lang="en-US" dirty="0"/>
-          </a:p>
-          <a:p>
-            <a:endParaRPr lang="en-US" dirty="0"/>
-          </a:p>
-          <a:p>
-            <a:r>
-              <a:rPr lang="en-US" dirty="0"/>
-              <a:t>Build dependency</a:t>
+              <a:t>Run ubuntu:16.04 image with /bin/bash</a:t>
+            </a:r>
+          </a:p>
+          <a:p>
+            <a:pPr lvl="1"/>
+            <a:r>
+              <a:rPr lang="en-US" dirty="0"/>
+              <a:t>docker run -it ubuntu:16.04 /bin/bash</a:t>
+            </a:r>
+          </a:p>
+          <a:p>
+            <a:pPr lvl="1"/>
+            <a:endParaRPr lang="en-US" dirty="0"/>
+          </a:p>
+          <a:p>
+            <a:pPr lvl="1"/>
+            <a:endParaRPr lang="en-US" dirty="0"/>
+          </a:p>
+          <a:p>
+            <a:pPr lvl="1"/>
+            <a:endParaRPr lang="en-US" dirty="0"/>
+          </a:p>
+          <a:p>
+            <a:r>
+              <a:rPr lang="en-US" dirty="0"/>
+              <a:t>Install packages</a:t>
             </a:r>
           </a:p>
         </p:txBody>
@@ -7128,7 +7115,7 @@
           <p:cNvPr id="4" name="Picture 3">
             <a:extLst>
               <a:ext uri="{FF2B5EF4-FFF2-40B4-BE49-F238E27FC236}">
-                <a16:creationId xmlns:a16="http://schemas.microsoft.com/office/drawing/2014/main" id="{7B610457-6E67-402A-8E46-442D23E7782B}"/>
+                <a16:creationId xmlns:a16="http://schemas.microsoft.com/office/drawing/2014/main" id="{7D50F52F-A7E5-47C7-88E4-4C9B9889C813}"/>
               </a:ext>
             </a:extLst>
           </p:cNvPr>
@@ -7145,8 +7132,38 @@
         </p:blipFill>
         <p:spPr>
           <a:xfrm>
-            <a:off x="1262201" y="2821619"/>
-            <a:ext cx="7181850" cy="1676400"/>
+            <a:off x="1457325" y="3265225"/>
+            <a:ext cx="9820275" cy="1162050"/>
+          </a:xfrm>
+          <a:prstGeom prst="rect">
+            <a:avLst/>
+          </a:prstGeom>
+        </p:spPr>
+      </p:pic>
+      <p:pic>
+        <p:nvPicPr>
+          <p:cNvPr id="5" name="Picture 4">
+            <a:extLst>
+              <a:ext uri="{FF2B5EF4-FFF2-40B4-BE49-F238E27FC236}">
+                <a16:creationId xmlns:a16="http://schemas.microsoft.com/office/drawing/2014/main" id="{905FB4D4-8FB8-4CC9-B41B-DC5FB134E6C3}"/>
+              </a:ext>
+            </a:extLst>
+          </p:cNvPr>
+          <p:cNvPicPr>
+            <a:picLocks noChangeAspect="1"/>
+          </p:cNvPicPr>
+          <p:nvPr/>
+        </p:nvPicPr>
+        <p:blipFill>
+          <a:blip r:embed="rId3"/>
+          <a:stretch>
+            <a:fillRect/>
+          </a:stretch>
+        </p:blipFill>
+        <p:spPr>
+          <a:xfrm>
+            <a:off x="1457325" y="5013709"/>
+            <a:ext cx="8239125" cy="1304925"/>
           </a:xfrm>
           <a:prstGeom prst="rect">
             <a:avLst/>
@@ -7156,7 +7173,7 @@
     </p:spTree>
     <p:extLst>
       <p:ext uri="{BB962C8B-B14F-4D97-AF65-F5344CB8AC3E}">
-        <p14:creationId xmlns:p14="http://schemas.microsoft.com/office/powerpoint/2010/main" val="568102352"/>
+        <p14:creationId xmlns:p14="http://schemas.microsoft.com/office/powerpoint/2010/main" val="4222781916"/>
       </p:ext>
     </p:extLst>
   </p:cSld>
@@ -7188,7 +7205,7 @@
           <p:cNvPr id="2" name="Title 1">
             <a:extLst>
               <a:ext uri="{FF2B5EF4-FFF2-40B4-BE49-F238E27FC236}">
-                <a16:creationId xmlns:a16="http://schemas.microsoft.com/office/drawing/2014/main" id="{364B08A9-C5B5-49A0-80B0-BA10AC996EEC}"/>
+                <a16:creationId xmlns:a16="http://schemas.microsoft.com/office/drawing/2014/main" id="{300AE0EF-69B6-4FB2-940F-EE21A62B54E8}"/>
               </a:ext>
             </a:extLst>
           </p:cNvPr>
@@ -7206,7 +7223,7 @@
           <a:p>
             <a:r>
               <a:rPr lang="en-US" dirty="0"/>
-              <a:t>Build stage docker image</a:t>
+              <a:t>Build stage docker image (cont.)</a:t>
             </a:r>
           </a:p>
         </p:txBody>
@@ -7216,7 +7233,7 @@
           <p:cNvPr id="3" name="Content Placeholder 2">
             <a:extLst>
               <a:ext uri="{FF2B5EF4-FFF2-40B4-BE49-F238E27FC236}">
-                <a16:creationId xmlns:a16="http://schemas.microsoft.com/office/drawing/2014/main" id="{196C30E1-A232-4145-BE36-568F0695AE6A}"/>
+                <a16:creationId xmlns:a16="http://schemas.microsoft.com/office/drawing/2014/main" id="{1007A7FF-2CC9-44D1-9D29-6337764CB17C}"/>
               </a:ext>
             </a:extLst>
           </p:cNvPr>
@@ -7234,41 +7251,26 @@
           <a:p>
             <a:r>
               <a:rPr lang="en-US" dirty="0"/>
-              <a:t>COPY source code to running container</a:t>
-            </a:r>
-          </a:p>
-          <a:p>
-            <a:pPr lvl="1"/>
-            <a:r>
-              <a:rPr lang="en-US" dirty="0"/>
-              <a:t>Host side docker copy</a:t>
-            </a:r>
-          </a:p>
-          <a:p>
-            <a:pPr lvl="1"/>
-            <a:endParaRPr lang="en-US" dirty="0"/>
-          </a:p>
-          <a:p>
-            <a:pPr lvl="1"/>
-            <a:endParaRPr lang="en-US" dirty="0"/>
-          </a:p>
-          <a:p>
-            <a:pPr lvl="1"/>
-            <a:endParaRPr lang="en-US" dirty="0"/>
-          </a:p>
-          <a:p>
-            <a:pPr lvl="1"/>
-            <a:endParaRPr lang="en-US" dirty="0"/>
-          </a:p>
-          <a:p>
-            <a:pPr lvl="1"/>
-            <a:r>
-              <a:rPr lang="en-US" dirty="0"/>
-              <a:t>Container side</a:t>
-            </a:r>
-          </a:p>
-          <a:p>
-            <a:endParaRPr lang="en-US" dirty="0"/>
+              <a:t>Install packages (cont.)</a:t>
+            </a:r>
+          </a:p>
+          <a:p>
+            <a:endParaRPr lang="en-US" dirty="0"/>
+          </a:p>
+          <a:p>
+            <a:endParaRPr lang="en-US" dirty="0"/>
+          </a:p>
+          <a:p>
+            <a:endParaRPr lang="en-US" dirty="0"/>
+          </a:p>
+          <a:p>
+            <a:endParaRPr lang="en-US" dirty="0"/>
+          </a:p>
+          <a:p>
+            <a:r>
+              <a:rPr lang="en-US" dirty="0"/>
+              <a:t>Build dependency</a:t>
+            </a:r>
           </a:p>
         </p:txBody>
       </p:sp>
@@ -7277,7 +7279,7 @@
           <p:cNvPr id="4" name="Picture 3">
             <a:extLst>
               <a:ext uri="{FF2B5EF4-FFF2-40B4-BE49-F238E27FC236}">
-                <a16:creationId xmlns:a16="http://schemas.microsoft.com/office/drawing/2014/main" id="{43DFD2A5-75B8-4DA4-8B41-4629A60023EC}"/>
+                <a16:creationId xmlns:a16="http://schemas.microsoft.com/office/drawing/2014/main" id="{7B610457-6E67-402A-8E46-442D23E7782B}"/>
               </a:ext>
             </a:extLst>
           </p:cNvPr>
@@ -7294,38 +7296,8 @@
         </p:blipFill>
         <p:spPr>
           <a:xfrm>
-            <a:off x="1687311" y="3267629"/>
-            <a:ext cx="7734300" cy="1352550"/>
-          </a:xfrm>
-          <a:prstGeom prst="rect">
-            <a:avLst/>
-          </a:prstGeom>
-        </p:spPr>
-      </p:pic>
-      <p:pic>
-        <p:nvPicPr>
-          <p:cNvPr id="5" name="Picture 4">
-            <a:extLst>
-              <a:ext uri="{FF2B5EF4-FFF2-40B4-BE49-F238E27FC236}">
-                <a16:creationId xmlns:a16="http://schemas.microsoft.com/office/drawing/2014/main" id="{3115D39B-DA52-4024-B261-8358C5422316}"/>
-              </a:ext>
-            </a:extLst>
-          </p:cNvPr>
-          <p:cNvPicPr>
-            <a:picLocks noChangeAspect="1"/>
-          </p:cNvPicPr>
-          <p:nvPr/>
-        </p:nvPicPr>
-        <p:blipFill>
-          <a:blip r:embed="rId3"/>
-          <a:stretch>
-            <a:fillRect/>
-          </a:stretch>
-        </p:blipFill>
-        <p:spPr>
-          <a:xfrm>
-            <a:off x="1687311" y="5182578"/>
-            <a:ext cx="4333875" cy="981075"/>
+            <a:off x="1262201" y="2821619"/>
+            <a:ext cx="7181850" cy="1676400"/>
           </a:xfrm>
           <a:prstGeom prst="rect">
             <a:avLst/>
@@ -7335,7 +7307,7 @@
     </p:spTree>
     <p:extLst>
       <p:ext uri="{BB962C8B-B14F-4D97-AF65-F5344CB8AC3E}">
-        <p14:creationId xmlns:p14="http://schemas.microsoft.com/office/powerpoint/2010/main" val="3273663606"/>
+        <p14:creationId xmlns:p14="http://schemas.microsoft.com/office/powerpoint/2010/main" val="568102352"/>
       </p:ext>
     </p:extLst>
   </p:cSld>
@@ -7367,7 +7339,7 @@
           <p:cNvPr id="2" name="Title 1">
             <a:extLst>
               <a:ext uri="{FF2B5EF4-FFF2-40B4-BE49-F238E27FC236}">
-                <a16:creationId xmlns:a16="http://schemas.microsoft.com/office/drawing/2014/main" id="{6EE111B4-E6ED-4BEF-95A2-BE2F4EC7B7B6}"/>
+                <a16:creationId xmlns:a16="http://schemas.microsoft.com/office/drawing/2014/main" id="{364B08A9-C5B5-49A0-80B0-BA10AC996EEC}"/>
               </a:ext>
             </a:extLst>
           </p:cNvPr>
@@ -7385,7 +7357,7 @@
           <a:p>
             <a:r>
               <a:rPr lang="en-US" dirty="0"/>
-              <a:t>search alpine image</a:t>
+              <a:t>Build stage docker image (cont.)</a:t>
             </a:r>
           </a:p>
         </p:txBody>
@@ -7395,7 +7367,7 @@
           <p:cNvPr id="3" name="Content Placeholder 2">
             <a:extLst>
               <a:ext uri="{FF2B5EF4-FFF2-40B4-BE49-F238E27FC236}">
-                <a16:creationId xmlns:a16="http://schemas.microsoft.com/office/drawing/2014/main" id="{6DA82F44-40AA-4077-914B-E895EC72259C}"/>
+                <a16:creationId xmlns:a16="http://schemas.microsoft.com/office/drawing/2014/main" id="{196C30E1-A232-4145-BE36-568F0695AE6A}"/>
               </a:ext>
             </a:extLst>
           </p:cNvPr>
@@ -7412,13 +7384,42 @@
           <a:lstStyle/>
           <a:p>
             <a:r>
-              <a:rPr lang="en-US" dirty="0" err="1"/>
-              <a:t>sudo</a:t>
-            </a:r>
-            <a:r>
-              <a:rPr lang="en-US" dirty="0"/>
-              <a:t> docker search alpine</a:t>
-            </a:r>
+              <a:rPr lang="en-US" dirty="0"/>
+              <a:t>COPY source code to running container</a:t>
+            </a:r>
+          </a:p>
+          <a:p>
+            <a:pPr lvl="1"/>
+            <a:r>
+              <a:rPr lang="en-US" dirty="0"/>
+              <a:t>Host side docker copy</a:t>
+            </a:r>
+          </a:p>
+          <a:p>
+            <a:pPr lvl="1"/>
+            <a:endParaRPr lang="en-US" dirty="0"/>
+          </a:p>
+          <a:p>
+            <a:pPr lvl="1"/>
+            <a:endParaRPr lang="en-US" dirty="0"/>
+          </a:p>
+          <a:p>
+            <a:pPr lvl="1"/>
+            <a:endParaRPr lang="en-US" dirty="0"/>
+          </a:p>
+          <a:p>
+            <a:pPr lvl="1"/>
+            <a:endParaRPr lang="en-US" dirty="0"/>
+          </a:p>
+          <a:p>
+            <a:pPr lvl="1"/>
+            <a:r>
+              <a:rPr lang="en-US" dirty="0"/>
+              <a:t>Container side</a:t>
+            </a:r>
+          </a:p>
+          <a:p>
+            <a:endParaRPr lang="en-US" dirty="0"/>
           </a:p>
         </p:txBody>
       </p:sp>
@@ -7427,7 +7428,7 @@
           <p:cNvPr id="4" name="Picture 3">
             <a:extLst>
               <a:ext uri="{FF2B5EF4-FFF2-40B4-BE49-F238E27FC236}">
-                <a16:creationId xmlns:a16="http://schemas.microsoft.com/office/drawing/2014/main" id="{F4DA52F7-9BF1-4F79-800B-4D374B5C321E}"/>
+                <a16:creationId xmlns:a16="http://schemas.microsoft.com/office/drawing/2014/main" id="{43DFD2A5-75B8-4DA4-8B41-4629A60023EC}"/>
               </a:ext>
             </a:extLst>
           </p:cNvPr>
@@ -7444,8 +7445,38 @@
         </p:blipFill>
         <p:spPr>
           <a:xfrm>
-            <a:off x="1189608" y="2834807"/>
-            <a:ext cx="9502066" cy="3911396"/>
+            <a:off x="1687311" y="3267629"/>
+            <a:ext cx="7734300" cy="1352550"/>
+          </a:xfrm>
+          <a:prstGeom prst="rect">
+            <a:avLst/>
+          </a:prstGeom>
+        </p:spPr>
+      </p:pic>
+      <p:pic>
+        <p:nvPicPr>
+          <p:cNvPr id="5" name="Picture 4">
+            <a:extLst>
+              <a:ext uri="{FF2B5EF4-FFF2-40B4-BE49-F238E27FC236}">
+                <a16:creationId xmlns:a16="http://schemas.microsoft.com/office/drawing/2014/main" id="{3115D39B-DA52-4024-B261-8358C5422316}"/>
+              </a:ext>
+            </a:extLst>
+          </p:cNvPr>
+          <p:cNvPicPr>
+            <a:picLocks noChangeAspect="1"/>
+          </p:cNvPicPr>
+          <p:nvPr/>
+        </p:nvPicPr>
+        <p:blipFill>
+          <a:blip r:embed="rId3"/>
+          <a:stretch>
+            <a:fillRect/>
+          </a:stretch>
+        </p:blipFill>
+        <p:spPr>
+          <a:xfrm>
+            <a:off x="1687311" y="5182578"/>
+            <a:ext cx="4333875" cy="981075"/>
           </a:xfrm>
           <a:prstGeom prst="rect">
             <a:avLst/>
@@ -7455,7 +7486,7 @@
     </p:spTree>
     <p:extLst>
       <p:ext uri="{BB962C8B-B14F-4D97-AF65-F5344CB8AC3E}">
-        <p14:creationId xmlns:p14="http://schemas.microsoft.com/office/powerpoint/2010/main" val="2286989010"/>
+        <p14:creationId xmlns:p14="http://schemas.microsoft.com/office/powerpoint/2010/main" val="3273663606"/>
       </p:ext>
     </p:extLst>
   </p:cSld>
@@ -7558,6 +7589,1017 @@
     <p:extLst>
       <p:ext uri="{BB962C8B-B14F-4D97-AF65-F5344CB8AC3E}">
         <p14:creationId xmlns:p14="http://schemas.microsoft.com/office/powerpoint/2010/main" val="392204675"/>
+      </p:ext>
+    </p:extLst>
+  </p:cSld>
+  <p:clrMapOvr>
+    <a:masterClrMapping/>
+  </p:clrMapOvr>
+</p:sld>
+</file>
+
+<file path=ppt/slides/slide20.xml><?xml version="1.0" encoding="utf-8"?>
+<p:sld xmlns:a="http://schemas.openxmlformats.org/drawingml/2006/main" xmlns:r="http://schemas.openxmlformats.org/officeDocument/2006/relationships" xmlns:p="http://schemas.openxmlformats.org/presentationml/2006/main">
+  <p:cSld>
+    <p:spTree>
+      <p:nvGrpSpPr>
+        <p:cNvPr id="1" name=""/>
+        <p:cNvGrpSpPr/>
+        <p:nvPr/>
+      </p:nvGrpSpPr>
+      <p:grpSpPr>
+        <a:xfrm>
+          <a:off x="0" y="0"/>
+          <a:ext cx="0" cy="0"/>
+          <a:chOff x="0" y="0"/>
+          <a:chExt cx="0" cy="0"/>
+        </a:xfrm>
+      </p:grpSpPr>
+      <p:sp>
+        <p:nvSpPr>
+          <p:cNvPr id="2" name="Title 1">
+            <a:extLst>
+              <a:ext uri="{FF2B5EF4-FFF2-40B4-BE49-F238E27FC236}">
+                <a16:creationId xmlns:a16="http://schemas.microsoft.com/office/drawing/2014/main" id="{5914CA8A-6FB3-4323-AD92-06CC439D5A3A}"/>
+              </a:ext>
+            </a:extLst>
+          </p:cNvPr>
+          <p:cNvSpPr>
+            <a:spLocks noGrp="1"/>
+          </p:cNvSpPr>
+          <p:nvPr>
+            <p:ph type="title"/>
+          </p:nvPr>
+        </p:nvSpPr>
+        <p:spPr/>
+        <p:txBody>
+          <a:bodyPr/>
+          <a:lstStyle/>
+          <a:p>
+            <a:r>
+              <a:rPr lang="en-US" dirty="0"/>
+              <a:t>Build stage docker image (cont.)</a:t>
+            </a:r>
+          </a:p>
+        </p:txBody>
+      </p:sp>
+      <p:sp>
+        <p:nvSpPr>
+          <p:cNvPr id="3" name="Content Placeholder 2">
+            <a:extLst>
+              <a:ext uri="{FF2B5EF4-FFF2-40B4-BE49-F238E27FC236}">
+                <a16:creationId xmlns:a16="http://schemas.microsoft.com/office/drawing/2014/main" id="{2FBC5596-7CA6-48E9-B0E5-EC199112DC13}"/>
+              </a:ext>
+            </a:extLst>
+          </p:cNvPr>
+          <p:cNvSpPr>
+            <a:spLocks noGrp="1"/>
+          </p:cNvSpPr>
+          <p:nvPr>
+            <p:ph sz="quarter" idx="13"/>
+          </p:nvPr>
+        </p:nvSpPr>
+        <p:spPr/>
+        <p:txBody>
+          <a:bodyPr/>
+          <a:lstStyle/>
+          <a:p>
+            <a:r>
+              <a:rPr lang="en-US" dirty="0"/>
+              <a:t>Exit docker and docker commit to generate a new image</a:t>
+            </a:r>
+          </a:p>
+        </p:txBody>
+      </p:sp>
+      <p:pic>
+        <p:nvPicPr>
+          <p:cNvPr id="4" name="Picture 3">
+            <a:extLst>
+              <a:ext uri="{FF2B5EF4-FFF2-40B4-BE49-F238E27FC236}">
+                <a16:creationId xmlns:a16="http://schemas.microsoft.com/office/drawing/2014/main" id="{561CF6E6-4F2E-4F21-98BE-75A3300E4640}"/>
+              </a:ext>
+            </a:extLst>
+          </p:cNvPr>
+          <p:cNvPicPr>
+            <a:picLocks noChangeAspect="1"/>
+          </p:cNvPicPr>
+          <p:nvPr/>
+        </p:nvPicPr>
+        <p:blipFill>
+          <a:blip r:embed="rId2"/>
+          <a:stretch>
+            <a:fillRect/>
+          </a:stretch>
+        </p:blipFill>
+        <p:spPr>
+          <a:xfrm>
+            <a:off x="1248838" y="2901195"/>
+            <a:ext cx="5876925" cy="771525"/>
+          </a:xfrm>
+          <a:prstGeom prst="rect">
+            <a:avLst/>
+          </a:prstGeom>
+        </p:spPr>
+      </p:pic>
+      <p:pic>
+        <p:nvPicPr>
+          <p:cNvPr id="5" name="Picture 4">
+            <a:extLst>
+              <a:ext uri="{FF2B5EF4-FFF2-40B4-BE49-F238E27FC236}">
+                <a16:creationId xmlns:a16="http://schemas.microsoft.com/office/drawing/2014/main" id="{760D582F-6CD6-4D33-A5C8-612F24E6D282}"/>
+              </a:ext>
+            </a:extLst>
+          </p:cNvPr>
+          <p:cNvPicPr>
+            <a:picLocks noChangeAspect="1"/>
+          </p:cNvPicPr>
+          <p:nvPr/>
+        </p:nvPicPr>
+        <p:blipFill>
+          <a:blip r:embed="rId3"/>
+          <a:stretch>
+            <a:fillRect/>
+          </a:stretch>
+        </p:blipFill>
+        <p:spPr>
+          <a:xfrm>
+            <a:off x="1248838" y="3905858"/>
+            <a:ext cx="7181850" cy="2333625"/>
+          </a:xfrm>
+          <a:prstGeom prst="rect">
+            <a:avLst/>
+          </a:prstGeom>
+        </p:spPr>
+      </p:pic>
+    </p:spTree>
+    <p:extLst>
+      <p:ext uri="{BB962C8B-B14F-4D97-AF65-F5344CB8AC3E}">
+        <p14:creationId xmlns:p14="http://schemas.microsoft.com/office/powerpoint/2010/main" val="1909992595"/>
+      </p:ext>
+    </p:extLst>
+  </p:cSld>
+  <p:clrMapOvr>
+    <a:masterClrMapping/>
+  </p:clrMapOvr>
+</p:sld>
+</file>
+
+<file path=ppt/slides/slide21.xml><?xml version="1.0" encoding="utf-8"?>
+<p:sld xmlns:a="http://schemas.openxmlformats.org/drawingml/2006/main" xmlns:r="http://schemas.openxmlformats.org/officeDocument/2006/relationships" xmlns:p="http://schemas.openxmlformats.org/presentationml/2006/main">
+  <p:cSld>
+    <p:spTree>
+      <p:nvGrpSpPr>
+        <p:cNvPr id="1" name=""/>
+        <p:cNvGrpSpPr/>
+        <p:nvPr/>
+      </p:nvGrpSpPr>
+      <p:grpSpPr>
+        <a:xfrm>
+          <a:off x="0" y="0"/>
+          <a:ext cx="0" cy="0"/>
+          <a:chOff x="0" y="0"/>
+          <a:chExt cx="0" cy="0"/>
+        </a:xfrm>
+      </p:grpSpPr>
+      <p:sp>
+        <p:nvSpPr>
+          <p:cNvPr id="2" name="Title 1">
+            <a:extLst>
+              <a:ext uri="{FF2B5EF4-FFF2-40B4-BE49-F238E27FC236}">
+                <a16:creationId xmlns:a16="http://schemas.microsoft.com/office/drawing/2014/main" id="{8FDE79D7-822B-461B-84F2-5BDC07CAE1DD}"/>
+              </a:ext>
+            </a:extLst>
+          </p:cNvPr>
+          <p:cNvSpPr>
+            <a:spLocks noGrp="1"/>
+          </p:cNvSpPr>
+          <p:nvPr>
+            <p:ph type="title"/>
+          </p:nvPr>
+        </p:nvSpPr>
+        <p:spPr/>
+        <p:txBody>
+          <a:bodyPr/>
+          <a:lstStyle/>
+          <a:p>
+            <a:r>
+              <a:rPr lang="en-US" dirty="0"/>
+              <a:t>Build stage docker image (cont.)</a:t>
+            </a:r>
+          </a:p>
+        </p:txBody>
+      </p:sp>
+      <p:sp>
+        <p:nvSpPr>
+          <p:cNvPr id="3" name="Content Placeholder 2">
+            <a:extLst>
+              <a:ext uri="{FF2B5EF4-FFF2-40B4-BE49-F238E27FC236}">
+                <a16:creationId xmlns:a16="http://schemas.microsoft.com/office/drawing/2014/main" id="{9DCC188C-D7F3-43A0-846C-601FD0270913}"/>
+              </a:ext>
+            </a:extLst>
+          </p:cNvPr>
+          <p:cNvSpPr>
+            <a:spLocks noGrp="1"/>
+          </p:cNvSpPr>
+          <p:nvPr>
+            <p:ph sz="quarter" idx="13"/>
+          </p:nvPr>
+        </p:nvSpPr>
+        <p:spPr/>
+        <p:txBody>
+          <a:bodyPr/>
+          <a:lstStyle/>
+          <a:p>
+            <a:r>
+              <a:rPr lang="en-US" dirty="0"/>
+              <a:t>Exit docker and docker commit to generate a new image</a:t>
+            </a:r>
+          </a:p>
+          <a:p>
+            <a:endParaRPr lang="en-US" dirty="0"/>
+          </a:p>
+        </p:txBody>
+      </p:sp>
+      <p:pic>
+        <p:nvPicPr>
+          <p:cNvPr id="4" name="Picture 3">
+            <a:extLst>
+              <a:ext uri="{FF2B5EF4-FFF2-40B4-BE49-F238E27FC236}">
+                <a16:creationId xmlns:a16="http://schemas.microsoft.com/office/drawing/2014/main" id="{C76861E3-3495-495F-9DF8-1756D19DEE31}"/>
+              </a:ext>
+            </a:extLst>
+          </p:cNvPr>
+          <p:cNvPicPr>
+            <a:picLocks noChangeAspect="1"/>
+          </p:cNvPicPr>
+          <p:nvPr/>
+        </p:nvPicPr>
+        <p:blipFill>
+          <a:blip r:embed="rId2"/>
+          <a:stretch>
+            <a:fillRect/>
+          </a:stretch>
+        </p:blipFill>
+        <p:spPr>
+          <a:xfrm>
+            <a:off x="1197859" y="2828731"/>
+            <a:ext cx="7524750" cy="2133600"/>
+          </a:xfrm>
+          <a:prstGeom prst="rect">
+            <a:avLst/>
+          </a:prstGeom>
+        </p:spPr>
+      </p:pic>
+      <p:pic>
+        <p:nvPicPr>
+          <p:cNvPr id="5" name="Picture 4">
+            <a:extLst>
+              <a:ext uri="{FF2B5EF4-FFF2-40B4-BE49-F238E27FC236}">
+                <a16:creationId xmlns:a16="http://schemas.microsoft.com/office/drawing/2014/main" id="{D331374F-4098-4331-A271-A2FE88E9C121}"/>
+              </a:ext>
+            </a:extLst>
+          </p:cNvPr>
+          <p:cNvPicPr>
+            <a:picLocks noChangeAspect="1"/>
+          </p:cNvPicPr>
+          <p:nvPr/>
+        </p:nvPicPr>
+        <p:blipFill>
+          <a:blip r:embed="rId3"/>
+          <a:stretch>
+            <a:fillRect/>
+          </a:stretch>
+        </p:blipFill>
+        <p:spPr>
+          <a:xfrm>
+            <a:off x="1164341" y="5128242"/>
+            <a:ext cx="9829800" cy="1200150"/>
+          </a:xfrm>
+          <a:prstGeom prst="rect">
+            <a:avLst/>
+          </a:prstGeom>
+        </p:spPr>
+      </p:pic>
+    </p:spTree>
+    <p:extLst>
+      <p:ext uri="{BB962C8B-B14F-4D97-AF65-F5344CB8AC3E}">
+        <p14:creationId xmlns:p14="http://schemas.microsoft.com/office/powerpoint/2010/main" val="2859512703"/>
+      </p:ext>
+    </p:extLst>
+  </p:cSld>
+  <p:clrMapOvr>
+    <a:masterClrMapping/>
+  </p:clrMapOvr>
+</p:sld>
+</file>
+
+<file path=ppt/slides/slide22.xml><?xml version="1.0" encoding="utf-8"?>
+<p:sld xmlns:a="http://schemas.openxmlformats.org/drawingml/2006/main" xmlns:r="http://schemas.openxmlformats.org/officeDocument/2006/relationships" xmlns:p="http://schemas.openxmlformats.org/presentationml/2006/main">
+  <p:cSld>
+    <p:spTree>
+      <p:nvGrpSpPr>
+        <p:cNvPr id="1" name=""/>
+        <p:cNvGrpSpPr/>
+        <p:nvPr/>
+      </p:nvGrpSpPr>
+      <p:grpSpPr>
+        <a:xfrm>
+          <a:off x="0" y="0"/>
+          <a:ext cx="0" cy="0"/>
+          <a:chOff x="0" y="0"/>
+          <a:chExt cx="0" cy="0"/>
+        </a:xfrm>
+      </p:grpSpPr>
+      <p:sp>
+        <p:nvSpPr>
+          <p:cNvPr id="2" name="Title 1">
+            <a:extLst>
+              <a:ext uri="{FF2B5EF4-FFF2-40B4-BE49-F238E27FC236}">
+                <a16:creationId xmlns:a16="http://schemas.microsoft.com/office/drawing/2014/main" id="{5DAF2345-7743-42B8-808D-E0447817763C}"/>
+              </a:ext>
+            </a:extLst>
+          </p:cNvPr>
+          <p:cNvSpPr>
+            <a:spLocks noGrp="1"/>
+          </p:cNvSpPr>
+          <p:nvPr>
+            <p:ph type="title"/>
+          </p:nvPr>
+        </p:nvSpPr>
+        <p:spPr/>
+        <p:txBody>
+          <a:bodyPr/>
+          <a:lstStyle/>
+          <a:p>
+            <a:r>
+              <a:rPr lang="en-US" dirty="0"/>
+              <a:t>Build stage docker image (cont.)</a:t>
+            </a:r>
+          </a:p>
+        </p:txBody>
+      </p:sp>
+      <p:sp>
+        <p:nvSpPr>
+          <p:cNvPr id="3" name="Content Placeholder 2">
+            <a:extLst>
+              <a:ext uri="{FF2B5EF4-FFF2-40B4-BE49-F238E27FC236}">
+                <a16:creationId xmlns:a16="http://schemas.microsoft.com/office/drawing/2014/main" id="{BC1CC13C-FFB6-4555-8192-31B249673521}"/>
+              </a:ext>
+            </a:extLst>
+          </p:cNvPr>
+          <p:cNvSpPr>
+            <a:spLocks noGrp="1"/>
+          </p:cNvSpPr>
+          <p:nvPr>
+            <p:ph sz="quarter" idx="13"/>
+          </p:nvPr>
+        </p:nvSpPr>
+        <p:spPr/>
+        <p:txBody>
+          <a:bodyPr/>
+          <a:lstStyle/>
+          <a:p>
+            <a:r>
+              <a:rPr lang="en-US" dirty="0"/>
+              <a:t>Run application</a:t>
+            </a:r>
+          </a:p>
+        </p:txBody>
+      </p:sp>
+      <p:pic>
+        <p:nvPicPr>
+          <p:cNvPr id="4" name="Picture 3">
+            <a:extLst>
+              <a:ext uri="{FF2B5EF4-FFF2-40B4-BE49-F238E27FC236}">
+                <a16:creationId xmlns:a16="http://schemas.microsoft.com/office/drawing/2014/main" id="{1A8BE3FB-D838-4120-AF33-DB71CAEB1515}"/>
+              </a:ext>
+            </a:extLst>
+          </p:cNvPr>
+          <p:cNvPicPr>
+            <a:picLocks noChangeAspect="1"/>
+          </p:cNvPicPr>
+          <p:nvPr/>
+        </p:nvPicPr>
+        <p:blipFill>
+          <a:blip r:embed="rId2"/>
+          <a:stretch>
+            <a:fillRect/>
+          </a:stretch>
+        </p:blipFill>
+        <p:spPr>
+          <a:xfrm>
+            <a:off x="913774" y="3044024"/>
+            <a:ext cx="10191750" cy="1924050"/>
+          </a:xfrm>
+          <a:prstGeom prst="rect">
+            <a:avLst/>
+          </a:prstGeom>
+        </p:spPr>
+      </p:pic>
+    </p:spTree>
+    <p:extLst>
+      <p:ext uri="{BB962C8B-B14F-4D97-AF65-F5344CB8AC3E}">
+        <p14:creationId xmlns:p14="http://schemas.microsoft.com/office/powerpoint/2010/main" val="3049579494"/>
+      </p:ext>
+    </p:extLst>
+  </p:cSld>
+  <p:clrMapOvr>
+    <a:masterClrMapping/>
+  </p:clrMapOvr>
+</p:sld>
+</file>
+
+<file path=ppt/slides/slide23.xml><?xml version="1.0" encoding="utf-8"?>
+<p:sld xmlns:a="http://schemas.openxmlformats.org/drawingml/2006/main" xmlns:r="http://schemas.openxmlformats.org/officeDocument/2006/relationships" xmlns:p="http://schemas.openxmlformats.org/presentationml/2006/main">
+  <p:cSld>
+    <p:spTree>
+      <p:nvGrpSpPr>
+        <p:cNvPr id="1" name=""/>
+        <p:cNvGrpSpPr/>
+        <p:nvPr/>
+      </p:nvGrpSpPr>
+      <p:grpSpPr>
+        <a:xfrm>
+          <a:off x="0" y="0"/>
+          <a:ext cx="0" cy="0"/>
+          <a:chOff x="0" y="0"/>
+          <a:chExt cx="0" cy="0"/>
+        </a:xfrm>
+      </p:grpSpPr>
+      <p:sp>
+        <p:nvSpPr>
+          <p:cNvPr id="6" name="Rectangle 5">
+            <a:extLst>
+              <a:ext uri="{FF2B5EF4-FFF2-40B4-BE49-F238E27FC236}">
+                <a16:creationId xmlns:a16="http://schemas.microsoft.com/office/drawing/2014/main" id="{1C2F3CAD-F9F7-4148-BB47-DD392E373C6C}"/>
+              </a:ext>
+            </a:extLst>
+          </p:cNvPr>
+          <p:cNvSpPr/>
+          <p:nvPr/>
+        </p:nvSpPr>
+        <p:spPr>
+          <a:xfrm>
+            <a:off x="1560993" y="3386831"/>
+            <a:ext cx="3614688" cy="2317070"/>
+          </a:xfrm>
+          <a:prstGeom prst="rect">
+            <a:avLst/>
+          </a:prstGeom>
+          <a:solidFill>
+            <a:schemeClr val="accent4">
+              <a:lumMod val="60000"/>
+              <a:lumOff val="40000"/>
+            </a:schemeClr>
+          </a:solidFill>
+        </p:spPr>
+        <p:style>
+          <a:lnRef idx="2">
+            <a:schemeClr val="accent1">
+              <a:shade val="50000"/>
+            </a:schemeClr>
+          </a:lnRef>
+          <a:fillRef idx="1">
+            <a:schemeClr val="accent1"/>
+          </a:fillRef>
+          <a:effectRef idx="0">
+            <a:schemeClr val="accent1"/>
+          </a:effectRef>
+          <a:fontRef idx="minor">
+            <a:schemeClr val="lt1"/>
+          </a:fontRef>
+        </p:style>
+        <p:txBody>
+          <a:bodyPr rtlCol="0" anchor="ctr"/>
+          <a:lstStyle/>
+          <a:p>
+            <a:pPr algn="ctr"/>
+            <a:r>
+              <a:rPr lang="en-US" dirty="0"/>
+              <a:t>Host</a:t>
+            </a:r>
+          </a:p>
+          <a:p>
+            <a:pPr algn="ctr"/>
+            <a:endParaRPr lang="en-US" dirty="0"/>
+          </a:p>
+          <a:p>
+            <a:pPr algn="ctr"/>
+            <a:endParaRPr lang="en-US" dirty="0"/>
+          </a:p>
+          <a:p>
+            <a:pPr algn="ctr"/>
+            <a:endParaRPr lang="en-US" dirty="0"/>
+          </a:p>
+          <a:p>
+            <a:pPr algn="ctr"/>
+            <a:endParaRPr lang="en-US" dirty="0"/>
+          </a:p>
+          <a:p>
+            <a:pPr algn="ctr"/>
+            <a:endParaRPr lang="en-US" dirty="0"/>
+          </a:p>
+          <a:p>
+            <a:pPr algn="ctr"/>
+            <a:endParaRPr lang="en-US" dirty="0"/>
+          </a:p>
+        </p:txBody>
+      </p:sp>
+      <p:sp>
+        <p:nvSpPr>
+          <p:cNvPr id="2" name="Title 1">
+            <a:extLst>
+              <a:ext uri="{FF2B5EF4-FFF2-40B4-BE49-F238E27FC236}">
+                <a16:creationId xmlns:a16="http://schemas.microsoft.com/office/drawing/2014/main" id="{2114AAF3-5D61-431F-9F2B-A50E3544B281}"/>
+              </a:ext>
+            </a:extLst>
+          </p:cNvPr>
+          <p:cNvSpPr>
+            <a:spLocks noGrp="1"/>
+          </p:cNvSpPr>
+          <p:nvPr>
+            <p:ph type="title"/>
+          </p:nvPr>
+        </p:nvSpPr>
+        <p:spPr/>
+        <p:txBody>
+          <a:bodyPr/>
+          <a:lstStyle/>
+          <a:p>
+            <a:r>
+              <a:rPr lang="en-US" dirty="0"/>
+              <a:t>Assign port</a:t>
+            </a:r>
+          </a:p>
+        </p:txBody>
+      </p:sp>
+      <p:sp>
+        <p:nvSpPr>
+          <p:cNvPr id="3" name="Content Placeholder 2">
+            <a:extLst>
+              <a:ext uri="{FF2B5EF4-FFF2-40B4-BE49-F238E27FC236}">
+                <a16:creationId xmlns:a16="http://schemas.microsoft.com/office/drawing/2014/main" id="{32F415E3-D964-4CE1-A2E3-7AA0BE11D0A4}"/>
+              </a:ext>
+            </a:extLst>
+          </p:cNvPr>
+          <p:cNvSpPr>
+            <a:spLocks noGrp="1"/>
+          </p:cNvSpPr>
+          <p:nvPr>
+            <p:ph sz="quarter" idx="13"/>
+          </p:nvPr>
+        </p:nvSpPr>
+        <p:spPr/>
+        <p:txBody>
+          <a:bodyPr/>
+          <a:lstStyle/>
+          <a:p>
+            <a:r>
+              <a:rPr lang="en-US" dirty="0" err="1"/>
+              <a:t>Mqtt</a:t>
+            </a:r>
+            <a:r>
+              <a:rPr lang="en-US" dirty="0"/>
+              <a:t> default port is 1883</a:t>
+            </a:r>
+          </a:p>
+          <a:p>
+            <a:pPr lvl="1"/>
+            <a:r>
+              <a:rPr lang="en-US" dirty="0"/>
+              <a:t>Host </a:t>
+            </a:r>
+            <a:r>
+              <a:rPr lang="en-US" dirty="0" err="1"/>
+              <a:t>mqtt</a:t>
+            </a:r>
+            <a:r>
+              <a:rPr lang="en-US" dirty="0"/>
+              <a:t> default </a:t>
+            </a:r>
+            <a:r>
+              <a:rPr lang="en-US"/>
+              <a:t>port is 1883</a:t>
+            </a:r>
+            <a:endParaRPr lang="en-US" dirty="0"/>
+          </a:p>
+        </p:txBody>
+      </p:sp>
+      <p:sp>
+        <p:nvSpPr>
+          <p:cNvPr id="4" name="Rectangle 3">
+            <a:extLst>
+              <a:ext uri="{FF2B5EF4-FFF2-40B4-BE49-F238E27FC236}">
+                <a16:creationId xmlns:a16="http://schemas.microsoft.com/office/drawing/2014/main" id="{33DAA075-61F6-425E-926F-DD9239EEFE90}"/>
+              </a:ext>
+            </a:extLst>
+          </p:cNvPr>
+          <p:cNvSpPr/>
+          <p:nvPr/>
+        </p:nvSpPr>
+        <p:spPr>
+          <a:xfrm>
+            <a:off x="2228295" y="3987183"/>
+            <a:ext cx="1979720" cy="1116367"/>
+          </a:xfrm>
+          <a:prstGeom prst="rect">
+            <a:avLst/>
+          </a:prstGeom>
+        </p:spPr>
+        <p:style>
+          <a:lnRef idx="2">
+            <a:schemeClr val="accent1">
+              <a:shade val="50000"/>
+            </a:schemeClr>
+          </a:lnRef>
+          <a:fillRef idx="1">
+            <a:schemeClr val="accent1"/>
+          </a:fillRef>
+          <a:effectRef idx="0">
+            <a:schemeClr val="accent1"/>
+          </a:effectRef>
+          <a:fontRef idx="minor">
+            <a:schemeClr val="lt1"/>
+          </a:fontRef>
+        </p:style>
+        <p:txBody>
+          <a:bodyPr rtlCol="0" anchor="ctr"/>
+          <a:lstStyle/>
+          <a:p>
+            <a:pPr algn="ctr"/>
+            <a:r>
+              <a:rPr lang="en-US" dirty="0"/>
+              <a:t>container</a:t>
+            </a:r>
+          </a:p>
+        </p:txBody>
+      </p:sp>
+      <p:sp>
+        <p:nvSpPr>
+          <p:cNvPr id="5" name="Rectangle 4">
+            <a:extLst>
+              <a:ext uri="{FF2B5EF4-FFF2-40B4-BE49-F238E27FC236}">
+                <a16:creationId xmlns:a16="http://schemas.microsoft.com/office/drawing/2014/main" id="{7476597E-BEEB-4C03-B2CA-D1290DC8AEB5}"/>
+              </a:ext>
+            </a:extLst>
+          </p:cNvPr>
+          <p:cNvSpPr/>
+          <p:nvPr/>
+        </p:nvSpPr>
+        <p:spPr>
+          <a:xfrm>
+            <a:off x="3762278" y="4394445"/>
+            <a:ext cx="743139" cy="363985"/>
+          </a:xfrm>
+          <a:prstGeom prst="rect">
+            <a:avLst/>
+          </a:prstGeom>
+        </p:spPr>
+        <p:style>
+          <a:lnRef idx="3">
+            <a:schemeClr val="lt1"/>
+          </a:lnRef>
+          <a:fillRef idx="1">
+            <a:schemeClr val="accent3"/>
+          </a:fillRef>
+          <a:effectRef idx="1">
+            <a:schemeClr val="accent3"/>
+          </a:effectRef>
+          <a:fontRef idx="minor">
+            <a:schemeClr val="lt1"/>
+          </a:fontRef>
+        </p:style>
+        <p:txBody>
+          <a:bodyPr rtlCol="0" anchor="ctr"/>
+          <a:lstStyle/>
+          <a:p>
+            <a:pPr algn="ctr"/>
+            <a:r>
+              <a:rPr lang="en-US" dirty="0"/>
+              <a:t>client</a:t>
+            </a:r>
+          </a:p>
+        </p:txBody>
+      </p:sp>
+      <p:sp>
+        <p:nvSpPr>
+          <p:cNvPr id="7" name="Rectangle 6">
+            <a:extLst>
+              <a:ext uri="{FF2B5EF4-FFF2-40B4-BE49-F238E27FC236}">
+                <a16:creationId xmlns:a16="http://schemas.microsoft.com/office/drawing/2014/main" id="{31278BE7-1919-4F2F-8696-98E1BE9DD867}"/>
+              </a:ext>
+            </a:extLst>
+          </p:cNvPr>
+          <p:cNvSpPr/>
+          <p:nvPr/>
+        </p:nvSpPr>
+        <p:spPr>
+          <a:xfrm>
+            <a:off x="4857560" y="4394444"/>
+            <a:ext cx="743139" cy="363985"/>
+          </a:xfrm>
+          <a:prstGeom prst="rect">
+            <a:avLst/>
+          </a:prstGeom>
+          <a:solidFill>
+            <a:schemeClr val="accent6">
+              <a:lumMod val="75000"/>
+            </a:schemeClr>
+          </a:solidFill>
+        </p:spPr>
+        <p:style>
+          <a:lnRef idx="3">
+            <a:schemeClr val="lt1"/>
+          </a:lnRef>
+          <a:fillRef idx="1">
+            <a:schemeClr val="accent3"/>
+          </a:fillRef>
+          <a:effectRef idx="1">
+            <a:schemeClr val="accent3"/>
+          </a:effectRef>
+          <a:fontRef idx="minor">
+            <a:schemeClr val="lt1"/>
+          </a:fontRef>
+        </p:style>
+        <p:txBody>
+          <a:bodyPr rtlCol="0" anchor="ctr"/>
+          <a:lstStyle/>
+          <a:p>
+            <a:pPr algn="ctr"/>
+            <a:r>
+              <a:rPr lang="en-US" dirty="0"/>
+              <a:t>1883</a:t>
+            </a:r>
+          </a:p>
+        </p:txBody>
+      </p:sp>
+      <p:cxnSp>
+        <p:nvCxnSpPr>
+          <p:cNvPr id="9" name="Straight Arrow Connector 8">
+            <a:extLst>
+              <a:ext uri="{FF2B5EF4-FFF2-40B4-BE49-F238E27FC236}">
+                <a16:creationId xmlns:a16="http://schemas.microsoft.com/office/drawing/2014/main" id="{F6B8AD03-ED2F-4EEA-AF8D-D442C3E1FDA4}"/>
+              </a:ext>
+            </a:extLst>
+          </p:cNvPr>
+          <p:cNvCxnSpPr>
+            <a:cxnSpLocks/>
+            <a:stCxn id="5" idx="3"/>
+          </p:cNvCxnSpPr>
+          <p:nvPr/>
+        </p:nvCxnSpPr>
+        <p:spPr>
+          <a:xfrm flipV="1">
+            <a:off x="4505417" y="4576436"/>
+            <a:ext cx="352144" cy="2"/>
+          </a:xfrm>
+          <a:prstGeom prst="straightConnector1">
+            <a:avLst/>
+          </a:prstGeom>
+          <a:ln>
+            <a:headEnd type="triangle"/>
+            <a:tailEnd type="triangle"/>
+          </a:ln>
+        </p:spPr>
+        <p:style>
+          <a:lnRef idx="1">
+            <a:schemeClr val="accent1"/>
+          </a:lnRef>
+          <a:fillRef idx="0">
+            <a:schemeClr val="accent1"/>
+          </a:fillRef>
+          <a:effectRef idx="0">
+            <a:schemeClr val="accent1"/>
+          </a:effectRef>
+          <a:fontRef idx="minor">
+            <a:schemeClr val="tx1"/>
+          </a:fontRef>
+        </p:style>
+      </p:cxnSp>
+    </p:spTree>
+    <p:extLst>
+      <p:ext uri="{BB962C8B-B14F-4D97-AF65-F5344CB8AC3E}">
+        <p14:creationId xmlns:p14="http://schemas.microsoft.com/office/powerpoint/2010/main" val="684336083"/>
+      </p:ext>
+    </p:extLst>
+  </p:cSld>
+  <p:clrMapOvr>
+    <a:masterClrMapping/>
+  </p:clrMapOvr>
+</p:sld>
+</file>
+
+<file path=ppt/slides/slide24.xml><?xml version="1.0" encoding="utf-8"?>
+<p:sld xmlns:a="http://schemas.openxmlformats.org/drawingml/2006/main" xmlns:r="http://schemas.openxmlformats.org/officeDocument/2006/relationships" xmlns:p="http://schemas.openxmlformats.org/presentationml/2006/main">
+  <p:cSld>
+    <p:spTree>
+      <p:nvGrpSpPr>
+        <p:cNvPr id="1" name=""/>
+        <p:cNvGrpSpPr/>
+        <p:nvPr/>
+      </p:nvGrpSpPr>
+      <p:grpSpPr>
+        <a:xfrm>
+          <a:off x="0" y="0"/>
+          <a:ext cx="0" cy="0"/>
+          <a:chOff x="0" y="0"/>
+          <a:chExt cx="0" cy="0"/>
+        </a:xfrm>
+      </p:grpSpPr>
+      <p:sp>
+        <p:nvSpPr>
+          <p:cNvPr id="2" name="Title 1">
+            <a:extLst>
+              <a:ext uri="{FF2B5EF4-FFF2-40B4-BE49-F238E27FC236}">
+                <a16:creationId xmlns:a16="http://schemas.microsoft.com/office/drawing/2014/main" id="{2610DD2F-01B3-45F9-A18D-583CA347B1BF}"/>
+              </a:ext>
+            </a:extLst>
+          </p:cNvPr>
+          <p:cNvSpPr>
+            <a:spLocks noGrp="1"/>
+          </p:cNvSpPr>
+          <p:nvPr>
+            <p:ph type="title"/>
+          </p:nvPr>
+        </p:nvSpPr>
+        <p:spPr/>
+        <p:txBody>
+          <a:bodyPr/>
+          <a:lstStyle/>
+          <a:p>
+            <a:r>
+              <a:rPr lang="en-US" dirty="0"/>
+              <a:t>Use docker file create image</a:t>
+            </a:r>
+          </a:p>
+        </p:txBody>
+      </p:sp>
+      <p:sp>
+        <p:nvSpPr>
+          <p:cNvPr id="3" name="Content Placeholder 2">
+            <a:extLst>
+              <a:ext uri="{FF2B5EF4-FFF2-40B4-BE49-F238E27FC236}">
+                <a16:creationId xmlns:a16="http://schemas.microsoft.com/office/drawing/2014/main" id="{D693EB38-8364-40D6-A27A-A20686730EF4}"/>
+              </a:ext>
+            </a:extLst>
+          </p:cNvPr>
+          <p:cNvSpPr>
+            <a:spLocks noGrp="1"/>
+          </p:cNvSpPr>
+          <p:nvPr>
+            <p:ph sz="quarter" idx="13"/>
+          </p:nvPr>
+        </p:nvSpPr>
+        <p:spPr/>
+        <p:txBody>
+          <a:bodyPr/>
+          <a:lstStyle/>
+          <a:p>
+            <a:r>
+              <a:rPr lang="en-US" dirty="0"/>
+              <a:t>Multi-stage build</a:t>
+            </a:r>
+          </a:p>
+          <a:p>
+            <a:pPr lvl="1"/>
+            <a:r>
+              <a:rPr lang="en-US" dirty="0"/>
+              <a:t>Build stage docker image</a:t>
+            </a:r>
+          </a:p>
+          <a:p>
+            <a:pPr lvl="1"/>
+            <a:r>
+              <a:rPr lang="en-US" dirty="0"/>
+              <a:t>Run-time stage docker image</a:t>
+            </a:r>
+          </a:p>
+        </p:txBody>
+      </p:sp>
+    </p:spTree>
+    <p:extLst>
+      <p:ext uri="{BB962C8B-B14F-4D97-AF65-F5344CB8AC3E}">
+        <p14:creationId xmlns:p14="http://schemas.microsoft.com/office/powerpoint/2010/main" val="2091007274"/>
+      </p:ext>
+    </p:extLst>
+  </p:cSld>
+  <p:clrMapOvr>
+    <a:masterClrMapping/>
+  </p:clrMapOvr>
+</p:sld>
+</file>
+
+<file path=ppt/slides/slide25.xml><?xml version="1.0" encoding="utf-8"?>
+<p:sld xmlns:a="http://schemas.openxmlformats.org/drawingml/2006/main" xmlns:r="http://schemas.openxmlformats.org/officeDocument/2006/relationships" xmlns:p="http://schemas.openxmlformats.org/presentationml/2006/main">
+  <p:cSld>
+    <p:spTree>
+      <p:nvGrpSpPr>
+        <p:cNvPr id="1" name=""/>
+        <p:cNvGrpSpPr/>
+        <p:nvPr/>
+      </p:nvGrpSpPr>
+      <p:grpSpPr>
+        <a:xfrm>
+          <a:off x="0" y="0"/>
+          <a:ext cx="0" cy="0"/>
+          <a:chOff x="0" y="0"/>
+          <a:chExt cx="0" cy="0"/>
+        </a:xfrm>
+      </p:grpSpPr>
+      <p:sp>
+        <p:nvSpPr>
+          <p:cNvPr id="2" name="Title 1">
+            <a:extLst>
+              <a:ext uri="{FF2B5EF4-FFF2-40B4-BE49-F238E27FC236}">
+                <a16:creationId xmlns:a16="http://schemas.microsoft.com/office/drawing/2014/main" id="{6EE111B4-E6ED-4BEF-95A2-BE2F4EC7B7B6}"/>
+              </a:ext>
+            </a:extLst>
+          </p:cNvPr>
+          <p:cNvSpPr>
+            <a:spLocks noGrp="1"/>
+          </p:cNvSpPr>
+          <p:nvPr>
+            <p:ph type="title"/>
+          </p:nvPr>
+        </p:nvSpPr>
+        <p:spPr/>
+        <p:txBody>
+          <a:bodyPr/>
+          <a:lstStyle/>
+          <a:p>
+            <a:r>
+              <a:rPr lang="en-US" dirty="0"/>
+              <a:t>search alpine image</a:t>
+            </a:r>
+          </a:p>
+        </p:txBody>
+      </p:sp>
+      <p:sp>
+        <p:nvSpPr>
+          <p:cNvPr id="3" name="Content Placeholder 2">
+            <a:extLst>
+              <a:ext uri="{FF2B5EF4-FFF2-40B4-BE49-F238E27FC236}">
+                <a16:creationId xmlns:a16="http://schemas.microsoft.com/office/drawing/2014/main" id="{6DA82F44-40AA-4077-914B-E895EC72259C}"/>
+              </a:ext>
+            </a:extLst>
+          </p:cNvPr>
+          <p:cNvSpPr>
+            <a:spLocks noGrp="1"/>
+          </p:cNvSpPr>
+          <p:nvPr>
+            <p:ph sz="quarter" idx="13"/>
+          </p:nvPr>
+        </p:nvSpPr>
+        <p:spPr/>
+        <p:txBody>
+          <a:bodyPr/>
+          <a:lstStyle/>
+          <a:p>
+            <a:r>
+              <a:rPr lang="en-US" dirty="0" err="1"/>
+              <a:t>sudo</a:t>
+            </a:r>
+            <a:r>
+              <a:rPr lang="en-US" dirty="0"/>
+              <a:t> docker search alpine</a:t>
+            </a:r>
+          </a:p>
+        </p:txBody>
+      </p:sp>
+      <p:pic>
+        <p:nvPicPr>
+          <p:cNvPr id="4" name="Picture 3">
+            <a:extLst>
+              <a:ext uri="{FF2B5EF4-FFF2-40B4-BE49-F238E27FC236}">
+                <a16:creationId xmlns:a16="http://schemas.microsoft.com/office/drawing/2014/main" id="{F4DA52F7-9BF1-4F79-800B-4D374B5C321E}"/>
+              </a:ext>
+            </a:extLst>
+          </p:cNvPr>
+          <p:cNvPicPr>
+            <a:picLocks noChangeAspect="1"/>
+          </p:cNvPicPr>
+          <p:nvPr/>
+        </p:nvPicPr>
+        <p:blipFill>
+          <a:blip r:embed="rId2"/>
+          <a:stretch>
+            <a:fillRect/>
+          </a:stretch>
+        </p:blipFill>
+        <p:spPr>
+          <a:xfrm>
+            <a:off x="1189608" y="2834807"/>
+            <a:ext cx="9502066" cy="3911396"/>
+          </a:xfrm>
+          <a:prstGeom prst="rect">
+            <a:avLst/>
+          </a:prstGeom>
+        </p:spPr>
+      </p:pic>
+    </p:spTree>
+    <p:extLst>
+      <p:ext uri="{BB962C8B-B14F-4D97-AF65-F5344CB8AC3E}">
+        <p14:creationId xmlns:p14="http://schemas.microsoft.com/office/powerpoint/2010/main" val="2286989010"/>
       </p:ext>
     </p:extLst>
   </p:cSld>

</xml_diff>

<commit_message>
Update the mosquitto docker
Signed-off-by: Liu Haixiang <haixiang1977@gmail.com>
</commit_message>
<xml_diff>
--- a/Docker Practice.pptx
+++ b/Docker Practice.pptx
@@ -19,17 +19,31 @@
     <p:sldId id="269" r:id="rId13"/>
     <p:sldId id="270" r:id="rId14"/>
     <p:sldId id="271" r:id="rId15"/>
-    <p:sldId id="275" r:id="rId16"/>
-    <p:sldId id="276" r:id="rId17"/>
-    <p:sldId id="272" r:id="rId18"/>
-    <p:sldId id="273" r:id="rId19"/>
-    <p:sldId id="274" r:id="rId20"/>
-    <p:sldId id="277" r:id="rId21"/>
-    <p:sldId id="278" r:id="rId22"/>
-    <p:sldId id="279" r:id="rId23"/>
-    <p:sldId id="280" r:id="rId24"/>
-    <p:sldId id="268" r:id="rId25"/>
-    <p:sldId id="265" r:id="rId26"/>
+    <p:sldId id="281" r:id="rId16"/>
+    <p:sldId id="282" r:id="rId17"/>
+    <p:sldId id="275" r:id="rId18"/>
+    <p:sldId id="276" r:id="rId19"/>
+    <p:sldId id="272" r:id="rId20"/>
+    <p:sldId id="283" r:id="rId21"/>
+    <p:sldId id="284" r:id="rId22"/>
+    <p:sldId id="273" r:id="rId23"/>
+    <p:sldId id="277" r:id="rId24"/>
+    <p:sldId id="278" r:id="rId25"/>
+    <p:sldId id="286" r:id="rId26"/>
+    <p:sldId id="287" r:id="rId27"/>
+    <p:sldId id="285" r:id="rId28"/>
+    <p:sldId id="288" r:id="rId29"/>
+    <p:sldId id="279" r:id="rId30"/>
+    <p:sldId id="268" r:id="rId31"/>
+    <p:sldId id="289" r:id="rId32"/>
+    <p:sldId id="290" r:id="rId33"/>
+    <p:sldId id="291" r:id="rId34"/>
+    <p:sldId id="292" r:id="rId35"/>
+    <p:sldId id="293" r:id="rId36"/>
+    <p:sldId id="294" r:id="rId37"/>
+    <p:sldId id="295" r:id="rId38"/>
+    <p:sldId id="280" r:id="rId39"/>
+    <p:sldId id="265" r:id="rId40"/>
   </p:sldIdLst>
   <p:sldSz cx="12192000" cy="6858000"/>
   <p:notesSz cx="6858000" cy="9144000"/>
@@ -129,6 +143,53 @@
     </a:lvl9pPr>
   </p:defaultTextStyle>
   <p:extLst>
+    <p:ext uri="{521415D9-36F7-43E2-AB2F-B90AF26B5E84}">
+      <p14:sectionLst xmlns:p14="http://schemas.microsoft.com/office/powerpoint/2010/main">
+        <p14:section name="Default Section" id="{86B0F499-AEBB-4D78-8B8A-385D73EE0CC5}">
+          <p14:sldIdLst>
+            <p14:sldId id="256"/>
+            <p14:sldId id="257"/>
+            <p14:sldId id="259"/>
+            <p14:sldId id="258"/>
+            <p14:sldId id="260"/>
+            <p14:sldId id="261"/>
+            <p14:sldId id="262"/>
+            <p14:sldId id="263"/>
+            <p14:sldId id="264"/>
+            <p14:sldId id="266"/>
+            <p14:sldId id="267"/>
+            <p14:sldId id="269"/>
+            <p14:sldId id="270"/>
+            <p14:sldId id="271"/>
+            <p14:sldId id="281"/>
+            <p14:sldId id="282"/>
+            <p14:sldId id="275"/>
+            <p14:sldId id="276"/>
+            <p14:sldId id="272"/>
+            <p14:sldId id="283"/>
+            <p14:sldId id="284"/>
+            <p14:sldId id="273"/>
+            <p14:sldId id="277"/>
+            <p14:sldId id="278"/>
+            <p14:sldId id="286"/>
+            <p14:sldId id="287"/>
+            <p14:sldId id="285"/>
+            <p14:sldId id="288"/>
+            <p14:sldId id="279"/>
+            <p14:sldId id="268"/>
+            <p14:sldId id="289"/>
+            <p14:sldId id="290"/>
+            <p14:sldId id="291"/>
+            <p14:sldId id="292"/>
+            <p14:sldId id="293"/>
+            <p14:sldId id="294"/>
+            <p14:sldId id="295"/>
+            <p14:sldId id="280"/>
+            <p14:sldId id="265"/>
+          </p14:sldIdLst>
+        </p14:section>
+      </p14:sectionLst>
+    </p:ext>
     <p:ext uri="{EFAFB233-063F-42B5-8137-9DF3F51BA10A}">
       <p15:sldGuideLst xmlns:p15="http://schemas.microsoft.com/office/powerpoint/2012/main"/>
     </p:ext>
@@ -307,7 +368,7 @@
           <a:p>
             <a:fld id="{48A87A34-81AB-432B-8DAE-1953F412C126}" type="datetimeFigureOut">
               <a:rPr lang="en-US" dirty="0"/>
-              <a:t>5/24/2020</a:t>
+              <a:t>5/25/2020</a:t>
             </a:fld>
             <a:endParaRPr lang="en-US" dirty="0"/>
           </a:p>
@@ -614,7 +675,7 @@
           <a:p>
             <a:fld id="{48A87A34-81AB-432B-8DAE-1953F412C126}" type="datetimeFigureOut">
               <a:rPr lang="en-US" dirty="0"/>
-              <a:t>5/24/2020</a:t>
+              <a:t>5/25/2020</a:t>
             </a:fld>
             <a:endParaRPr lang="en-US" dirty="0"/>
           </a:p>
@@ -831,7 +892,7 @@
           <a:p>
             <a:fld id="{48A87A34-81AB-432B-8DAE-1953F412C126}" type="datetimeFigureOut">
               <a:rPr lang="en-US" dirty="0"/>
-              <a:t>5/24/2020</a:t>
+              <a:t>5/25/2020</a:t>
             </a:fld>
             <a:endParaRPr lang="en-US" dirty="0"/>
           </a:p>
@@ -1117,7 +1178,7 @@
           <a:p>
             <a:fld id="{48A87A34-81AB-432B-8DAE-1953F412C126}" type="datetimeFigureOut">
               <a:rPr lang="en-US" dirty="0"/>
-              <a:t>5/24/2020</a:t>
+              <a:t>5/25/2020</a:t>
             </a:fld>
             <a:endParaRPr lang="en-US" dirty="0"/>
           </a:p>
@@ -1566,7 +1627,7 @@
           <a:p>
             <a:fld id="{48A87A34-81AB-432B-8DAE-1953F412C126}" type="datetimeFigureOut">
               <a:rPr lang="en-US" dirty="0"/>
-              <a:t>5/24/2020</a:t>
+              <a:t>5/25/2020</a:t>
             </a:fld>
             <a:endParaRPr lang="en-US" dirty="0"/>
           </a:p>
@@ -2137,7 +2198,7 @@
           <a:p>
             <a:fld id="{48A87A34-81AB-432B-8DAE-1953F412C126}" type="datetimeFigureOut">
               <a:rPr lang="en-US" dirty="0"/>
-              <a:t>5/24/2020</a:t>
+              <a:t>5/25/2020</a:t>
             </a:fld>
             <a:endParaRPr lang="en-US" dirty="0"/>
           </a:p>
@@ -2984,7 +3045,7 @@
           <a:p>
             <a:fld id="{48A87A34-81AB-432B-8DAE-1953F412C126}" type="datetimeFigureOut">
               <a:rPr lang="en-US" dirty="0"/>
-              <a:t>5/24/2020</a:t>
+              <a:t>5/25/2020</a:t>
             </a:fld>
             <a:endParaRPr lang="en-US" dirty="0"/>
           </a:p>
@@ -3184,7 +3245,7 @@
           <a:p>
             <a:fld id="{48A87A34-81AB-432B-8DAE-1953F412C126}" type="datetimeFigureOut">
               <a:rPr lang="en-US" dirty="0"/>
-              <a:t>5/24/2020</a:t>
+              <a:t>5/25/2020</a:t>
             </a:fld>
             <a:endParaRPr lang="en-US" dirty="0"/>
           </a:p>
@@ -3393,7 +3454,7 @@
           <a:p>
             <a:fld id="{48A87A34-81AB-432B-8DAE-1953F412C126}" type="datetimeFigureOut">
               <a:rPr lang="en-US" dirty="0"/>
-              <a:t>5/24/2020</a:t>
+              <a:t>5/25/2020</a:t>
             </a:fld>
             <a:endParaRPr lang="en-US" dirty="0"/>
           </a:p>
@@ -3593,7 +3654,7 @@
           <a:p>
             <a:fld id="{48A87A34-81AB-432B-8DAE-1953F412C126}" type="datetimeFigureOut">
               <a:rPr lang="en-US" dirty="0"/>
-              <a:t>5/24/2020</a:t>
+              <a:t>5/25/2020</a:t>
             </a:fld>
             <a:endParaRPr lang="en-US" dirty="0"/>
           </a:p>
@@ -3868,7 +3929,7 @@
           <a:p>
             <a:fld id="{48A87A34-81AB-432B-8DAE-1953F412C126}" type="datetimeFigureOut">
               <a:rPr lang="en-US" dirty="0"/>
-              <a:t>5/24/2020</a:t>
+              <a:t>5/25/2020</a:t>
             </a:fld>
             <a:endParaRPr lang="en-US" dirty="0"/>
           </a:p>
@@ -4130,7 +4191,7 @@
           <a:p>
             <a:fld id="{48A87A34-81AB-432B-8DAE-1953F412C126}" type="datetimeFigureOut">
               <a:rPr lang="en-US" dirty="0"/>
-              <a:t>5/24/2020</a:t>
+              <a:t>5/25/2020</a:t>
             </a:fld>
             <a:endParaRPr lang="en-US" dirty="0"/>
           </a:p>
@@ -4540,7 +4601,7 @@
           <a:p>
             <a:fld id="{48A87A34-81AB-432B-8DAE-1953F412C126}" type="datetimeFigureOut">
               <a:rPr lang="en-US" dirty="0"/>
-              <a:t>5/24/2020</a:t>
+              <a:t>5/25/2020</a:t>
             </a:fld>
             <a:endParaRPr lang="en-US" dirty="0"/>
           </a:p>
@@ -4683,7 +4744,7 @@
           <a:p>
             <a:fld id="{48A87A34-81AB-432B-8DAE-1953F412C126}" type="datetimeFigureOut">
               <a:rPr lang="en-US" dirty="0"/>
-              <a:t>5/24/2020</a:t>
+              <a:t>5/25/2020</a:t>
             </a:fld>
             <a:endParaRPr lang="en-US" dirty="0"/>
           </a:p>
@@ -4803,7 +4864,7 @@
           <a:p>
             <a:fld id="{48A87A34-81AB-432B-8DAE-1953F412C126}" type="datetimeFigureOut">
               <a:rPr lang="en-US" dirty="0"/>
-              <a:t>5/24/2020</a:t>
+              <a:t>5/25/2020</a:t>
             </a:fld>
             <a:endParaRPr lang="en-US" dirty="0"/>
           </a:p>
@@ -5077,7 +5138,7 @@
           <a:p>
             <a:fld id="{48A87A34-81AB-432B-8DAE-1953F412C126}" type="datetimeFigureOut">
               <a:rPr lang="en-US" dirty="0"/>
-              <a:t>5/24/2020</a:t>
+              <a:t>5/25/2020</a:t>
             </a:fld>
             <a:endParaRPr lang="en-US" dirty="0"/>
           </a:p>
@@ -5384,7 +5445,7 @@
           <a:p>
             <a:fld id="{48A87A34-81AB-432B-8DAE-1953F412C126}" type="datetimeFigureOut">
               <a:rPr lang="en-US" dirty="0"/>
-              <a:t>5/24/2020</a:t>
+              <a:t>5/25/2020</a:t>
             </a:fld>
             <a:endParaRPr lang="en-US" dirty="0"/>
           </a:p>
@@ -5633,7 +5694,7 @@
             <a:fld id="{48A87A34-81AB-432B-8DAE-1953F412C126}" type="datetimeFigureOut">
               <a:rPr lang="en-US" dirty="0"/>
               <a:pPr/>
-              <a:t>5/24/2020</a:t>
+              <a:t>5/25/2020</a:t>
             </a:fld>
             <a:endParaRPr lang="en-US" dirty="0"/>
           </a:p>
@@ -6365,7 +6426,7 @@
           <a:p>
             <a:r>
               <a:rPr lang="en-US" dirty="0"/>
-              <a:t>docker images</a:t>
+              <a:t>docker images ls</a:t>
             </a:r>
           </a:p>
         </p:txBody>
@@ -6789,7 +6850,7 @@
           <p:cNvPr id="2" name="Title 1">
             <a:extLst>
               <a:ext uri="{FF2B5EF4-FFF2-40B4-BE49-F238E27FC236}">
-                <a16:creationId xmlns:a16="http://schemas.microsoft.com/office/drawing/2014/main" id="{E40B227A-7F5F-44B9-8F72-C48A92CBD124}"/>
+                <a16:creationId xmlns:a16="http://schemas.microsoft.com/office/drawing/2014/main" id="{9FA88B63-E001-492A-ACE5-944585EC5EDE}"/>
               </a:ext>
             </a:extLst>
           </p:cNvPr>
@@ -6817,7 +6878,7 @@
           <p:cNvPr id="3" name="Content Placeholder 2">
             <a:extLst>
               <a:ext uri="{FF2B5EF4-FFF2-40B4-BE49-F238E27FC236}">
-                <a16:creationId xmlns:a16="http://schemas.microsoft.com/office/drawing/2014/main" id="{4440660F-8156-4AF2-BA45-EC146EC7436D}"/>
+                <a16:creationId xmlns:a16="http://schemas.microsoft.com/office/drawing/2014/main" id="{9C4434C0-D52C-4EFF-BF4B-95ADD9C97B97}"/>
               </a:ext>
             </a:extLst>
           </p:cNvPr>
@@ -6835,12 +6896,38 @@
           <a:p>
             <a:r>
               <a:rPr lang="en-US" dirty="0"/>
-              <a:t>Checking running port and </a:t>
+              <a:t>Display all containers</a:t>
+            </a:r>
+          </a:p>
+          <a:p>
+            <a:pPr lvl="1"/>
+            <a:r>
+              <a:rPr lang="en-US" dirty="0"/>
+              <a:t>Docker </a:t>
             </a:r>
             <a:r>
               <a:rPr lang="en-US" dirty="0" err="1"/>
-              <a:t>ip</a:t>
-            </a:r>
+              <a:t>ps</a:t>
+            </a:r>
+            <a:r>
+              <a:rPr lang="en-US" dirty="0"/>
+              <a:t> –a</a:t>
+            </a:r>
+          </a:p>
+          <a:p>
+            <a:pPr lvl="1"/>
+            <a:endParaRPr lang="en-US" dirty="0"/>
+          </a:p>
+          <a:p>
+            <a:pPr lvl="1"/>
+            <a:endParaRPr lang="en-US" dirty="0"/>
+          </a:p>
+          <a:p>
+            <a:pPr lvl="1"/>
+            <a:endParaRPr lang="en-US" dirty="0"/>
+          </a:p>
+          <a:p>
+            <a:pPr lvl="1"/>
             <a:endParaRPr lang="en-US" dirty="0"/>
           </a:p>
         </p:txBody>
@@ -6850,7 +6937,7 @@
           <p:cNvPr id="4" name="Picture 3">
             <a:extLst>
               <a:ext uri="{FF2B5EF4-FFF2-40B4-BE49-F238E27FC236}">
-                <a16:creationId xmlns:a16="http://schemas.microsoft.com/office/drawing/2014/main" id="{FBE16D13-6A20-4FC7-965A-35527AEDCA76}"/>
+                <a16:creationId xmlns:a16="http://schemas.microsoft.com/office/drawing/2014/main" id="{4DB4023F-85DB-485C-8DBB-A21997067ACD}"/>
               </a:ext>
             </a:extLst>
           </p:cNvPr>
@@ -6867,8 +6954,8 @@
         </p:blipFill>
         <p:spPr>
           <a:xfrm>
-            <a:off x="1305018" y="2783954"/>
-            <a:ext cx="7297029" cy="3626186"/>
+            <a:off x="1482570" y="3262685"/>
+            <a:ext cx="10233635" cy="1114006"/>
           </a:xfrm>
           <a:prstGeom prst="rect">
             <a:avLst/>
@@ -6878,7 +6965,7 @@
     </p:spTree>
     <p:extLst>
       <p:ext uri="{BB962C8B-B14F-4D97-AF65-F5344CB8AC3E}">
-        <p14:creationId xmlns:p14="http://schemas.microsoft.com/office/powerpoint/2010/main" val="983448388"/>
+        <p14:creationId xmlns:p14="http://schemas.microsoft.com/office/powerpoint/2010/main" val="2009427351"/>
       </p:ext>
     </p:extLst>
   </p:cSld>
@@ -6910,7 +6997,7 @@
           <p:cNvPr id="2" name="Title 1">
             <a:extLst>
               <a:ext uri="{FF2B5EF4-FFF2-40B4-BE49-F238E27FC236}">
-                <a16:creationId xmlns:a16="http://schemas.microsoft.com/office/drawing/2014/main" id="{BE80F3F4-B3D5-4F93-A1F2-E49E578B611A}"/>
+                <a16:creationId xmlns:a16="http://schemas.microsoft.com/office/drawing/2014/main" id="{BB81FAD4-856D-41C2-981A-854DD4F74E39}"/>
               </a:ext>
             </a:extLst>
           </p:cNvPr>
@@ -6938,7 +7025,7 @@
           <p:cNvPr id="3" name="Content Placeholder 2">
             <a:extLst>
               <a:ext uri="{FF2B5EF4-FFF2-40B4-BE49-F238E27FC236}">
-                <a16:creationId xmlns:a16="http://schemas.microsoft.com/office/drawing/2014/main" id="{B57FB7F6-E570-4AE0-9CF4-6B6AD44A10A1}"/>
+                <a16:creationId xmlns:a16="http://schemas.microsoft.com/office/drawing/2014/main" id="{DE618661-64D9-4587-8D4D-3A9A7486A94C}"/>
               </a:ext>
             </a:extLst>
           </p:cNvPr>
@@ -6956,16 +7043,11 @@
           <a:p>
             <a:r>
               <a:rPr lang="en-US" dirty="0"/>
-              <a:t>Checking running port and </a:t>
-            </a:r>
-            <a:r>
-              <a:rPr lang="en-US" dirty="0" err="1"/>
-              <a:t>ip</a:t>
-            </a:r>
-            <a:r>
-              <a:rPr lang="en-US" dirty="0"/>
-              <a:t> (cont.)</a:t>
-            </a:r>
+              <a:t>Before remove docker image, you must remove docker contains first</a:t>
+            </a:r>
+          </a:p>
+          <a:p>
+            <a:endParaRPr lang="en-US" dirty="0"/>
           </a:p>
         </p:txBody>
       </p:sp>
@@ -6974,7 +7056,7 @@
           <p:cNvPr id="4" name="Picture 3">
             <a:extLst>
               <a:ext uri="{FF2B5EF4-FFF2-40B4-BE49-F238E27FC236}">
-                <a16:creationId xmlns:a16="http://schemas.microsoft.com/office/drawing/2014/main" id="{E95CAB92-18D1-46D0-8278-A50F0F79FF7D}"/>
+                <a16:creationId xmlns:a16="http://schemas.microsoft.com/office/drawing/2014/main" id="{3FDF41B0-4BF4-4F31-BE11-7ECAA7C9043B}"/>
               </a:ext>
             </a:extLst>
           </p:cNvPr>
@@ -6991,8 +7073,38 @@
         </p:blipFill>
         <p:spPr>
           <a:xfrm>
-            <a:off x="1296140" y="2781458"/>
-            <a:ext cx="5211192" cy="3904240"/>
+            <a:off x="1199477" y="2838450"/>
+            <a:ext cx="4114800" cy="1181100"/>
+          </a:xfrm>
+          <a:prstGeom prst="rect">
+            <a:avLst/>
+          </a:prstGeom>
+        </p:spPr>
+      </p:pic>
+      <p:pic>
+        <p:nvPicPr>
+          <p:cNvPr id="5" name="Picture 4">
+            <a:extLst>
+              <a:ext uri="{FF2B5EF4-FFF2-40B4-BE49-F238E27FC236}">
+                <a16:creationId xmlns:a16="http://schemas.microsoft.com/office/drawing/2014/main" id="{50E4F10D-FB15-4F5F-9B61-6B6E7C7D9C66}"/>
+              </a:ext>
+            </a:extLst>
+          </p:cNvPr>
+          <p:cNvPicPr>
+            <a:picLocks noChangeAspect="1"/>
+          </p:cNvPicPr>
+          <p:nvPr/>
+        </p:nvPicPr>
+        <p:blipFill>
+          <a:blip r:embed="rId3"/>
+          <a:stretch>
+            <a:fillRect/>
+          </a:stretch>
+        </p:blipFill>
+        <p:spPr>
+          <a:xfrm>
+            <a:off x="1199477" y="4295774"/>
+            <a:ext cx="7667625" cy="609600"/>
           </a:xfrm>
           <a:prstGeom prst="rect">
             <a:avLst/>
@@ -7002,7 +7114,7 @@
     </p:spTree>
     <p:extLst>
       <p:ext uri="{BB962C8B-B14F-4D97-AF65-F5344CB8AC3E}">
-        <p14:creationId xmlns:p14="http://schemas.microsoft.com/office/powerpoint/2010/main" val="175981310"/>
+        <p14:creationId xmlns:p14="http://schemas.microsoft.com/office/powerpoint/2010/main" val="3818694201"/>
       </p:ext>
     </p:extLst>
   </p:cSld>
@@ -7034,7 +7146,7 @@
           <p:cNvPr id="2" name="Title 1">
             <a:extLst>
               <a:ext uri="{FF2B5EF4-FFF2-40B4-BE49-F238E27FC236}">
-                <a16:creationId xmlns:a16="http://schemas.microsoft.com/office/drawing/2014/main" id="{E33254AB-084E-4115-8696-8394B767BB83}"/>
+                <a16:creationId xmlns:a16="http://schemas.microsoft.com/office/drawing/2014/main" id="{E40B227A-7F5F-44B9-8F72-C48A92CBD124}"/>
               </a:ext>
             </a:extLst>
           </p:cNvPr>
@@ -7052,7 +7164,7 @@
           <a:p>
             <a:r>
               <a:rPr lang="en-US" dirty="0"/>
-              <a:t>Build stage docker image – by manual</a:t>
+              <a:t>Start from ubuntu image (cont.)</a:t>
             </a:r>
           </a:p>
         </p:txBody>
@@ -7062,7 +7174,7 @@
           <p:cNvPr id="3" name="Content Placeholder 2">
             <a:extLst>
               <a:ext uri="{FF2B5EF4-FFF2-40B4-BE49-F238E27FC236}">
-                <a16:creationId xmlns:a16="http://schemas.microsoft.com/office/drawing/2014/main" id="{1D491AE3-93DF-45CF-BA24-2C64AD8F0865}"/>
+                <a16:creationId xmlns:a16="http://schemas.microsoft.com/office/drawing/2014/main" id="{4440660F-8156-4AF2-BA45-EC146EC7436D}"/>
               </a:ext>
             </a:extLst>
           </p:cNvPr>
@@ -7080,33 +7192,13 @@
           <a:p>
             <a:r>
               <a:rPr lang="en-US" dirty="0"/>
-              <a:t>Run ubuntu:16.04 image with /bin/bash</a:t>
-            </a:r>
-          </a:p>
-          <a:p>
-            <a:pPr lvl="1"/>
-            <a:r>
-              <a:rPr lang="en-US" dirty="0"/>
-              <a:t>docker run -it ubuntu:16.04 /bin/bash</a:t>
-            </a:r>
-          </a:p>
-          <a:p>
-            <a:pPr lvl="1"/>
-            <a:endParaRPr lang="en-US" dirty="0"/>
-          </a:p>
-          <a:p>
-            <a:pPr lvl="1"/>
-            <a:endParaRPr lang="en-US" dirty="0"/>
-          </a:p>
-          <a:p>
-            <a:pPr lvl="1"/>
-            <a:endParaRPr lang="en-US" dirty="0"/>
-          </a:p>
-          <a:p>
-            <a:r>
-              <a:rPr lang="en-US" dirty="0"/>
-              <a:t>Install packages</a:t>
-            </a:r>
+              <a:t>Checking running port and </a:t>
+            </a:r>
+            <a:r>
+              <a:rPr lang="en-US" dirty="0" err="1"/>
+              <a:t>ip</a:t>
+            </a:r>
+            <a:endParaRPr lang="en-US" dirty="0"/>
           </a:p>
         </p:txBody>
       </p:sp>
@@ -7115,7 +7207,7 @@
           <p:cNvPr id="4" name="Picture 3">
             <a:extLst>
               <a:ext uri="{FF2B5EF4-FFF2-40B4-BE49-F238E27FC236}">
-                <a16:creationId xmlns:a16="http://schemas.microsoft.com/office/drawing/2014/main" id="{7D50F52F-A7E5-47C7-88E4-4C9B9889C813}"/>
+                <a16:creationId xmlns:a16="http://schemas.microsoft.com/office/drawing/2014/main" id="{FBE16D13-6A20-4FC7-965A-35527AEDCA76}"/>
               </a:ext>
             </a:extLst>
           </p:cNvPr>
@@ -7132,38 +7224,8 @@
         </p:blipFill>
         <p:spPr>
           <a:xfrm>
-            <a:off x="1457325" y="3265225"/>
-            <a:ext cx="9820275" cy="1162050"/>
-          </a:xfrm>
-          <a:prstGeom prst="rect">
-            <a:avLst/>
-          </a:prstGeom>
-        </p:spPr>
-      </p:pic>
-      <p:pic>
-        <p:nvPicPr>
-          <p:cNvPr id="5" name="Picture 4">
-            <a:extLst>
-              <a:ext uri="{FF2B5EF4-FFF2-40B4-BE49-F238E27FC236}">
-                <a16:creationId xmlns:a16="http://schemas.microsoft.com/office/drawing/2014/main" id="{905FB4D4-8FB8-4CC9-B41B-DC5FB134E6C3}"/>
-              </a:ext>
-            </a:extLst>
-          </p:cNvPr>
-          <p:cNvPicPr>
-            <a:picLocks noChangeAspect="1"/>
-          </p:cNvPicPr>
-          <p:nvPr/>
-        </p:nvPicPr>
-        <p:blipFill>
-          <a:blip r:embed="rId3"/>
-          <a:stretch>
-            <a:fillRect/>
-          </a:stretch>
-        </p:blipFill>
-        <p:spPr>
-          <a:xfrm>
-            <a:off x="1457325" y="5013709"/>
-            <a:ext cx="8239125" cy="1304925"/>
+            <a:off x="1305018" y="2783954"/>
+            <a:ext cx="7297029" cy="3626186"/>
           </a:xfrm>
           <a:prstGeom prst="rect">
             <a:avLst/>
@@ -7173,7 +7235,7 @@
     </p:spTree>
     <p:extLst>
       <p:ext uri="{BB962C8B-B14F-4D97-AF65-F5344CB8AC3E}">
-        <p14:creationId xmlns:p14="http://schemas.microsoft.com/office/powerpoint/2010/main" val="4222781916"/>
+        <p14:creationId xmlns:p14="http://schemas.microsoft.com/office/powerpoint/2010/main" val="983448388"/>
       </p:ext>
     </p:extLst>
   </p:cSld>
@@ -7205,7 +7267,7 @@
           <p:cNvPr id="2" name="Title 1">
             <a:extLst>
               <a:ext uri="{FF2B5EF4-FFF2-40B4-BE49-F238E27FC236}">
-                <a16:creationId xmlns:a16="http://schemas.microsoft.com/office/drawing/2014/main" id="{300AE0EF-69B6-4FB2-940F-EE21A62B54E8}"/>
+                <a16:creationId xmlns:a16="http://schemas.microsoft.com/office/drawing/2014/main" id="{BE80F3F4-B3D5-4F93-A1F2-E49E578B611A}"/>
               </a:ext>
             </a:extLst>
           </p:cNvPr>
@@ -7223,7 +7285,7 @@
           <a:p>
             <a:r>
               <a:rPr lang="en-US" dirty="0"/>
-              <a:t>Build stage docker image (cont.)</a:t>
+              <a:t>Start from ubuntu image (cont.)</a:t>
             </a:r>
           </a:p>
         </p:txBody>
@@ -7233,7 +7295,7 @@
           <p:cNvPr id="3" name="Content Placeholder 2">
             <a:extLst>
               <a:ext uri="{FF2B5EF4-FFF2-40B4-BE49-F238E27FC236}">
-                <a16:creationId xmlns:a16="http://schemas.microsoft.com/office/drawing/2014/main" id="{1007A7FF-2CC9-44D1-9D29-6337764CB17C}"/>
+                <a16:creationId xmlns:a16="http://schemas.microsoft.com/office/drawing/2014/main" id="{B57FB7F6-E570-4AE0-9CF4-6B6AD44A10A1}"/>
               </a:ext>
             </a:extLst>
           </p:cNvPr>
@@ -7251,25 +7313,15 @@
           <a:p>
             <a:r>
               <a:rPr lang="en-US" dirty="0"/>
-              <a:t>Install packages (cont.)</a:t>
-            </a:r>
-          </a:p>
-          <a:p>
-            <a:endParaRPr lang="en-US" dirty="0"/>
-          </a:p>
-          <a:p>
-            <a:endParaRPr lang="en-US" dirty="0"/>
-          </a:p>
-          <a:p>
-            <a:endParaRPr lang="en-US" dirty="0"/>
-          </a:p>
-          <a:p>
-            <a:endParaRPr lang="en-US" dirty="0"/>
-          </a:p>
-          <a:p>
-            <a:r>
-              <a:rPr lang="en-US" dirty="0"/>
-              <a:t>Build dependency</a:t>
+              <a:t>Checking running port and </a:t>
+            </a:r>
+            <a:r>
+              <a:rPr lang="en-US" dirty="0" err="1"/>
+              <a:t>ip</a:t>
+            </a:r>
+            <a:r>
+              <a:rPr lang="en-US" dirty="0"/>
+              <a:t> (cont.)</a:t>
             </a:r>
           </a:p>
         </p:txBody>
@@ -7279,7 +7331,7 @@
           <p:cNvPr id="4" name="Picture 3">
             <a:extLst>
               <a:ext uri="{FF2B5EF4-FFF2-40B4-BE49-F238E27FC236}">
-                <a16:creationId xmlns:a16="http://schemas.microsoft.com/office/drawing/2014/main" id="{7B610457-6E67-402A-8E46-442D23E7782B}"/>
+                <a16:creationId xmlns:a16="http://schemas.microsoft.com/office/drawing/2014/main" id="{E95CAB92-18D1-46D0-8278-A50F0F79FF7D}"/>
               </a:ext>
             </a:extLst>
           </p:cNvPr>
@@ -7296,8 +7348,8 @@
         </p:blipFill>
         <p:spPr>
           <a:xfrm>
-            <a:off x="1262201" y="2821619"/>
-            <a:ext cx="7181850" cy="1676400"/>
+            <a:off x="1296140" y="2781458"/>
+            <a:ext cx="5211192" cy="3904240"/>
           </a:xfrm>
           <a:prstGeom prst="rect">
             <a:avLst/>
@@ -7307,7 +7359,7 @@
     </p:spTree>
     <p:extLst>
       <p:ext uri="{BB962C8B-B14F-4D97-AF65-F5344CB8AC3E}">
-        <p14:creationId xmlns:p14="http://schemas.microsoft.com/office/powerpoint/2010/main" val="568102352"/>
+        <p14:creationId xmlns:p14="http://schemas.microsoft.com/office/powerpoint/2010/main" val="175981310"/>
       </p:ext>
     </p:extLst>
   </p:cSld>
@@ -7339,7 +7391,7 @@
           <p:cNvPr id="2" name="Title 1">
             <a:extLst>
               <a:ext uri="{FF2B5EF4-FFF2-40B4-BE49-F238E27FC236}">
-                <a16:creationId xmlns:a16="http://schemas.microsoft.com/office/drawing/2014/main" id="{364B08A9-C5B5-49A0-80B0-BA10AC996EEC}"/>
+                <a16:creationId xmlns:a16="http://schemas.microsoft.com/office/drawing/2014/main" id="{E33254AB-084E-4115-8696-8394B767BB83}"/>
               </a:ext>
             </a:extLst>
           </p:cNvPr>
@@ -7357,7 +7409,7 @@
           <a:p>
             <a:r>
               <a:rPr lang="en-US" dirty="0"/>
-              <a:t>Build stage docker image (cont.)</a:t>
+              <a:t>Build stage docker image – from container</a:t>
             </a:r>
           </a:p>
         </p:txBody>
@@ -7367,7 +7419,7 @@
           <p:cNvPr id="3" name="Content Placeholder 2">
             <a:extLst>
               <a:ext uri="{FF2B5EF4-FFF2-40B4-BE49-F238E27FC236}">
-                <a16:creationId xmlns:a16="http://schemas.microsoft.com/office/drawing/2014/main" id="{196C30E1-A232-4145-BE36-568F0695AE6A}"/>
+                <a16:creationId xmlns:a16="http://schemas.microsoft.com/office/drawing/2014/main" id="{1D491AE3-93DF-45CF-BA24-2C64AD8F0865}"/>
               </a:ext>
             </a:extLst>
           </p:cNvPr>
@@ -7385,14 +7437,14 @@
           <a:p>
             <a:r>
               <a:rPr lang="en-US" dirty="0"/>
-              <a:t>COPY source code to running container</a:t>
+              <a:t>Create ubuntu:16.04 container from ubuntu:16.04 image with /bin/bash and start</a:t>
             </a:r>
           </a:p>
           <a:p>
             <a:pPr lvl="1"/>
             <a:r>
               <a:rPr lang="en-US" dirty="0"/>
-              <a:t>Host side docker copy</a:t>
+              <a:t>docker run -it ubuntu:16.04 /bin/bash</a:t>
             </a:r>
           </a:p>
           <a:p>
@@ -7405,30 +7457,16 @@
           </a:p>
           <a:p>
             <a:pPr lvl="1"/>
-            <a:endParaRPr lang="en-US" dirty="0"/>
-          </a:p>
-          <a:p>
-            <a:pPr lvl="1"/>
-            <a:endParaRPr lang="en-US" dirty="0"/>
-          </a:p>
-          <a:p>
-            <a:pPr lvl="1"/>
-            <a:r>
-              <a:rPr lang="en-US" dirty="0"/>
-              <a:t>Container side</a:t>
-            </a:r>
-          </a:p>
-          <a:p>
             <a:endParaRPr lang="en-US" dirty="0"/>
           </a:p>
         </p:txBody>
       </p:sp>
       <p:pic>
         <p:nvPicPr>
-          <p:cNvPr id="4" name="Picture 3">
-            <a:extLst>
-              <a:ext uri="{FF2B5EF4-FFF2-40B4-BE49-F238E27FC236}">
-                <a16:creationId xmlns:a16="http://schemas.microsoft.com/office/drawing/2014/main" id="{43DFD2A5-75B8-4DA4-8B41-4629A60023EC}"/>
+          <p:cNvPr id="6" name="Picture 5">
+            <a:extLst>
+              <a:ext uri="{FF2B5EF4-FFF2-40B4-BE49-F238E27FC236}">
+                <a16:creationId xmlns:a16="http://schemas.microsoft.com/office/drawing/2014/main" id="{C0680F84-5E51-4B58-A250-DFDC866E63AC}"/>
               </a:ext>
             </a:extLst>
           </p:cNvPr>
@@ -7445,8 +7483,8 @@
         </p:blipFill>
         <p:spPr>
           <a:xfrm>
-            <a:off x="1687311" y="3267629"/>
-            <a:ext cx="7734300" cy="1352550"/>
+            <a:off x="773744" y="4890921"/>
+            <a:ext cx="11006137" cy="722104"/>
           </a:xfrm>
           <a:prstGeom prst="rect">
             <a:avLst/>
@@ -7455,10 +7493,10 @@
       </p:pic>
       <p:pic>
         <p:nvPicPr>
-          <p:cNvPr id="5" name="Picture 4">
-            <a:extLst>
-              <a:ext uri="{FF2B5EF4-FFF2-40B4-BE49-F238E27FC236}">
-                <a16:creationId xmlns:a16="http://schemas.microsoft.com/office/drawing/2014/main" id="{3115D39B-DA52-4024-B261-8358C5422316}"/>
+          <p:cNvPr id="7" name="Picture 6">
+            <a:extLst>
+              <a:ext uri="{FF2B5EF4-FFF2-40B4-BE49-F238E27FC236}">
+                <a16:creationId xmlns:a16="http://schemas.microsoft.com/office/drawing/2014/main" id="{1F65B668-09D3-4623-BCCB-329BA63279AE}"/>
               </a:ext>
             </a:extLst>
           </p:cNvPr>
@@ -7475,8 +7513,8 @@
         </p:blipFill>
         <p:spPr>
           <a:xfrm>
-            <a:off x="1687311" y="5182578"/>
-            <a:ext cx="4333875" cy="981075"/>
+            <a:off x="773744" y="3429000"/>
+            <a:ext cx="9753600" cy="752475"/>
           </a:xfrm>
           <a:prstGeom prst="rect">
             <a:avLst/>
@@ -7486,7 +7524,7 @@
     </p:spTree>
     <p:extLst>
       <p:ext uri="{BB962C8B-B14F-4D97-AF65-F5344CB8AC3E}">
-        <p14:creationId xmlns:p14="http://schemas.microsoft.com/office/powerpoint/2010/main" val="3273663606"/>
+        <p14:creationId xmlns:p14="http://schemas.microsoft.com/office/powerpoint/2010/main" val="4222781916"/>
       </p:ext>
     </p:extLst>
   </p:cSld>
@@ -7620,7 +7658,7 @@
           <p:cNvPr id="2" name="Title 1">
             <a:extLst>
               <a:ext uri="{FF2B5EF4-FFF2-40B4-BE49-F238E27FC236}">
-                <a16:creationId xmlns:a16="http://schemas.microsoft.com/office/drawing/2014/main" id="{5914CA8A-6FB3-4323-AD92-06CC439D5A3A}"/>
+                <a16:creationId xmlns:a16="http://schemas.microsoft.com/office/drawing/2014/main" id="{1E8F0639-F960-4239-93E5-124FF7747481}"/>
               </a:ext>
             </a:extLst>
           </p:cNvPr>
@@ -7638,7 +7676,7 @@
           <a:p>
             <a:r>
               <a:rPr lang="en-US" dirty="0"/>
-              <a:t>Build stage docker image (cont.)</a:t>
+              <a:t>Build stage docker image – from container</a:t>
             </a:r>
           </a:p>
         </p:txBody>
@@ -7648,7 +7686,7 @@
           <p:cNvPr id="3" name="Content Placeholder 2">
             <a:extLst>
               <a:ext uri="{FF2B5EF4-FFF2-40B4-BE49-F238E27FC236}">
-                <a16:creationId xmlns:a16="http://schemas.microsoft.com/office/drawing/2014/main" id="{2FBC5596-7CA6-48E9-B0E5-EC199112DC13}"/>
+                <a16:creationId xmlns:a16="http://schemas.microsoft.com/office/drawing/2014/main" id="{ABB9F316-13BE-41C6-916C-1CBF0D2B6BBB}"/>
               </a:ext>
             </a:extLst>
           </p:cNvPr>
@@ -7666,75 +7704,71 @@
           <a:p>
             <a:r>
               <a:rPr lang="en-US" dirty="0"/>
-              <a:t>Exit docker and docker commit to generate a new image</a:t>
-            </a:r>
-          </a:p>
-        </p:txBody>
-      </p:sp>
-      <p:pic>
-        <p:nvPicPr>
-          <p:cNvPr id="4" name="Picture 3">
-            <a:extLst>
-              <a:ext uri="{FF2B5EF4-FFF2-40B4-BE49-F238E27FC236}">
-                <a16:creationId xmlns:a16="http://schemas.microsoft.com/office/drawing/2014/main" id="{561CF6E6-4F2E-4F21-98BE-75A3300E4640}"/>
-              </a:ext>
-            </a:extLst>
-          </p:cNvPr>
-          <p:cNvPicPr>
-            <a:picLocks noChangeAspect="1"/>
-          </p:cNvPicPr>
-          <p:nvPr/>
-        </p:nvPicPr>
-        <p:blipFill>
-          <a:blip r:embed="rId2"/>
-          <a:stretch>
-            <a:fillRect/>
-          </a:stretch>
-        </p:blipFill>
-        <p:spPr>
-          <a:xfrm>
-            <a:off x="1248838" y="2901195"/>
-            <a:ext cx="5876925" cy="771525"/>
-          </a:xfrm>
-          <a:prstGeom prst="rect">
-            <a:avLst/>
-          </a:prstGeom>
-        </p:spPr>
-      </p:pic>
-      <p:pic>
-        <p:nvPicPr>
-          <p:cNvPr id="5" name="Picture 4">
-            <a:extLst>
-              <a:ext uri="{FF2B5EF4-FFF2-40B4-BE49-F238E27FC236}">
-                <a16:creationId xmlns:a16="http://schemas.microsoft.com/office/drawing/2014/main" id="{760D582F-6CD6-4D33-A5C8-612F24E6D282}"/>
-              </a:ext>
-            </a:extLst>
-          </p:cNvPr>
-          <p:cNvPicPr>
-            <a:picLocks noChangeAspect="1"/>
-          </p:cNvPicPr>
-          <p:nvPr/>
-        </p:nvPicPr>
-        <p:blipFill>
-          <a:blip r:embed="rId3"/>
-          <a:stretch>
-            <a:fillRect/>
-          </a:stretch>
-        </p:blipFill>
-        <p:spPr>
-          <a:xfrm>
-            <a:off x="1248838" y="3905858"/>
-            <a:ext cx="7181850" cy="2333625"/>
-          </a:xfrm>
-          <a:prstGeom prst="rect">
-            <a:avLst/>
-          </a:prstGeom>
-        </p:spPr>
-      </p:pic>
+              <a:t>Create ubuntu:16.04 container from ubuntu:16.04 image with /bin/bash and start</a:t>
+            </a:r>
+          </a:p>
+          <a:p>
+            <a:pPr lvl="1"/>
+            <a:r>
+              <a:rPr lang="en-US" dirty="0"/>
+              <a:t>Install hyacinth components into container</a:t>
+            </a:r>
+          </a:p>
+          <a:p>
+            <a:pPr lvl="2"/>
+            <a:r>
+              <a:rPr lang="en-US" dirty="0"/>
+              <a:t>Install </a:t>
+            </a:r>
+            <a:r>
+              <a:rPr lang="en-US" dirty="0" err="1"/>
+              <a:t>dependancies</a:t>
+            </a:r>
+            <a:endParaRPr lang="en-US" dirty="0"/>
+          </a:p>
+          <a:p>
+            <a:pPr lvl="2"/>
+            <a:r>
+              <a:rPr lang="en-US" dirty="0"/>
+              <a:t>build boost</a:t>
+            </a:r>
+          </a:p>
+          <a:p>
+            <a:pPr lvl="2"/>
+            <a:r>
+              <a:rPr lang="en-US" dirty="0"/>
+              <a:t>build </a:t>
+            </a:r>
+            <a:r>
+              <a:rPr lang="en-US" dirty="0" err="1"/>
+              <a:t>mqtt</a:t>
+            </a:r>
+            <a:r>
+              <a:rPr lang="en-US" dirty="0"/>
+              <a:t> </a:t>
+            </a:r>
+            <a:r>
+              <a:rPr lang="en-US" dirty="0" err="1"/>
+              <a:t>mosquitto</a:t>
+            </a:r>
+            <a:endParaRPr lang="en-US" dirty="0"/>
+          </a:p>
+          <a:p>
+            <a:pPr lvl="2"/>
+            <a:r>
+              <a:rPr lang="en-US" dirty="0"/>
+              <a:t>build hyacinth</a:t>
+            </a:r>
+          </a:p>
+          <a:p>
+            <a:endParaRPr lang="en-US" dirty="0"/>
+          </a:p>
+        </p:txBody>
+      </p:sp>
     </p:spTree>
     <p:extLst>
       <p:ext uri="{BB962C8B-B14F-4D97-AF65-F5344CB8AC3E}">
-        <p14:creationId xmlns:p14="http://schemas.microsoft.com/office/powerpoint/2010/main" val="1909992595"/>
+        <p14:creationId xmlns:p14="http://schemas.microsoft.com/office/powerpoint/2010/main" val="3166931925"/>
       </p:ext>
     </p:extLst>
   </p:cSld>
@@ -7766,7 +7800,7 @@
           <p:cNvPr id="2" name="Title 1">
             <a:extLst>
               <a:ext uri="{FF2B5EF4-FFF2-40B4-BE49-F238E27FC236}">
-                <a16:creationId xmlns:a16="http://schemas.microsoft.com/office/drawing/2014/main" id="{8FDE79D7-822B-461B-84F2-5BDC07CAE1DD}"/>
+                <a16:creationId xmlns:a16="http://schemas.microsoft.com/office/drawing/2014/main" id="{BFA45C4F-7032-4EA7-8686-010103BD5A93}"/>
               </a:ext>
             </a:extLst>
           </p:cNvPr>
@@ -7784,7 +7818,7 @@
           <a:p>
             <a:r>
               <a:rPr lang="en-US" dirty="0"/>
-              <a:t>Build stage docker image (cont.)</a:t>
+              <a:t>Build stage docker image – from container</a:t>
             </a:r>
           </a:p>
         </p:txBody>
@@ -7794,7 +7828,7 @@
           <p:cNvPr id="3" name="Content Placeholder 2">
             <a:extLst>
               <a:ext uri="{FF2B5EF4-FFF2-40B4-BE49-F238E27FC236}">
-                <a16:creationId xmlns:a16="http://schemas.microsoft.com/office/drawing/2014/main" id="{9DCC188C-D7F3-43A0-846C-601FD0270913}"/>
+                <a16:creationId xmlns:a16="http://schemas.microsoft.com/office/drawing/2014/main" id="{52422458-93A8-4819-80D3-B08B07D11403}"/>
               </a:ext>
             </a:extLst>
           </p:cNvPr>
@@ -7812,7 +7846,7 @@
           <a:p>
             <a:r>
               <a:rPr lang="en-US" dirty="0"/>
-              <a:t>Exit docker and docker commit to generate a new image</a:t>
+              <a:t>Install packages</a:t>
             </a:r>
           </a:p>
           <a:p>
@@ -7825,7 +7859,7 @@
           <p:cNvPr id="4" name="Picture 3">
             <a:extLst>
               <a:ext uri="{FF2B5EF4-FFF2-40B4-BE49-F238E27FC236}">
-                <a16:creationId xmlns:a16="http://schemas.microsoft.com/office/drawing/2014/main" id="{C76861E3-3495-495F-9DF8-1756D19DEE31}"/>
+                <a16:creationId xmlns:a16="http://schemas.microsoft.com/office/drawing/2014/main" id="{70468701-AA28-49E1-ACF1-276BFF223C5F}"/>
               </a:ext>
             </a:extLst>
           </p:cNvPr>
@@ -7842,8 +7876,8 @@
         </p:blipFill>
         <p:spPr>
           <a:xfrm>
-            <a:off x="1197859" y="2828731"/>
-            <a:ext cx="7524750" cy="2133600"/>
+            <a:off x="1208750" y="2927456"/>
+            <a:ext cx="8239125" cy="1304925"/>
           </a:xfrm>
           <a:prstGeom prst="rect">
             <a:avLst/>
@@ -7855,7 +7889,7 @@
           <p:cNvPr id="5" name="Picture 4">
             <a:extLst>
               <a:ext uri="{FF2B5EF4-FFF2-40B4-BE49-F238E27FC236}">
-                <a16:creationId xmlns:a16="http://schemas.microsoft.com/office/drawing/2014/main" id="{D331374F-4098-4331-A271-A2FE88E9C121}"/>
+                <a16:creationId xmlns:a16="http://schemas.microsoft.com/office/drawing/2014/main" id="{31794AD3-B420-46C1-B24C-3E65CA84B6CD}"/>
               </a:ext>
             </a:extLst>
           </p:cNvPr>
@@ -7872,8 +7906,8 @@
         </p:blipFill>
         <p:spPr>
           <a:xfrm>
-            <a:off x="1164341" y="5128242"/>
-            <a:ext cx="9829800" cy="1200150"/>
+            <a:off x="1208750" y="4472865"/>
+            <a:ext cx="7181850" cy="1676400"/>
           </a:xfrm>
           <a:prstGeom prst="rect">
             <a:avLst/>
@@ -7883,7 +7917,7 @@
     </p:spTree>
     <p:extLst>
       <p:ext uri="{BB962C8B-B14F-4D97-AF65-F5344CB8AC3E}">
-        <p14:creationId xmlns:p14="http://schemas.microsoft.com/office/powerpoint/2010/main" val="2859512703"/>
+        <p14:creationId xmlns:p14="http://schemas.microsoft.com/office/powerpoint/2010/main" val="3843012464"/>
       </p:ext>
     </p:extLst>
   </p:cSld>
@@ -7915,7 +7949,7 @@
           <p:cNvPr id="2" name="Title 1">
             <a:extLst>
               <a:ext uri="{FF2B5EF4-FFF2-40B4-BE49-F238E27FC236}">
-                <a16:creationId xmlns:a16="http://schemas.microsoft.com/office/drawing/2014/main" id="{5DAF2345-7743-42B8-808D-E0447817763C}"/>
+                <a16:creationId xmlns:a16="http://schemas.microsoft.com/office/drawing/2014/main" id="{300AE0EF-69B6-4FB2-940F-EE21A62B54E8}"/>
               </a:ext>
             </a:extLst>
           </p:cNvPr>
@@ -7933,7 +7967,7 @@
           <a:p>
             <a:r>
               <a:rPr lang="en-US" dirty="0"/>
-              <a:t>Build stage docker image (cont.)</a:t>
+              <a:t>Build stage docker image – from container</a:t>
             </a:r>
           </a:p>
         </p:txBody>
@@ -7943,7 +7977,7 @@
           <p:cNvPr id="3" name="Content Placeholder 2">
             <a:extLst>
               <a:ext uri="{FF2B5EF4-FFF2-40B4-BE49-F238E27FC236}">
-                <a16:creationId xmlns:a16="http://schemas.microsoft.com/office/drawing/2014/main" id="{BC1CC13C-FFB6-4555-8192-31B249673521}"/>
+                <a16:creationId xmlns:a16="http://schemas.microsoft.com/office/drawing/2014/main" id="{1007A7FF-2CC9-44D1-9D29-6337764CB17C}"/>
               </a:ext>
             </a:extLst>
           </p:cNvPr>
@@ -7961,17 +7995,58 @@
           <a:p>
             <a:r>
               <a:rPr lang="en-US" dirty="0"/>
-              <a:t>Run application</a:t>
-            </a:r>
+              <a:t>Build dependency boost, mosquito</a:t>
+            </a:r>
+          </a:p>
+          <a:p>
+            <a:pPr lvl="1"/>
+            <a:r>
+              <a:rPr lang="en-US" dirty="0"/>
+              <a:t>COPY source code to running container</a:t>
+            </a:r>
+          </a:p>
+          <a:p>
+            <a:pPr lvl="2"/>
+            <a:r>
+              <a:rPr lang="en-US" dirty="0"/>
+              <a:t>Host side docker copy</a:t>
+            </a:r>
+          </a:p>
+          <a:p>
+            <a:pPr lvl="2"/>
+            <a:endParaRPr lang="en-US" dirty="0"/>
+          </a:p>
+          <a:p>
+            <a:pPr lvl="2"/>
+            <a:endParaRPr lang="en-US" dirty="0"/>
+          </a:p>
+          <a:p>
+            <a:pPr lvl="2"/>
+            <a:endParaRPr lang="en-US" dirty="0"/>
+          </a:p>
+          <a:p>
+            <a:pPr lvl="2"/>
+            <a:endParaRPr lang="en-US" dirty="0"/>
+          </a:p>
+          <a:p>
+            <a:pPr lvl="2"/>
+            <a:r>
+              <a:rPr lang="en-US" dirty="0"/>
+              <a:t>Container side</a:t>
+            </a:r>
+          </a:p>
+          <a:p>
+            <a:pPr lvl="2"/>
+            <a:endParaRPr lang="en-US" dirty="0"/>
           </a:p>
         </p:txBody>
       </p:sp>
       <p:pic>
         <p:nvPicPr>
-          <p:cNvPr id="4" name="Picture 3">
-            <a:extLst>
-              <a:ext uri="{FF2B5EF4-FFF2-40B4-BE49-F238E27FC236}">
-                <a16:creationId xmlns:a16="http://schemas.microsoft.com/office/drawing/2014/main" id="{1A8BE3FB-D838-4120-AF33-DB71CAEB1515}"/>
+          <p:cNvPr id="5" name="Picture 4">
+            <a:extLst>
+              <a:ext uri="{FF2B5EF4-FFF2-40B4-BE49-F238E27FC236}">
+                <a16:creationId xmlns:a16="http://schemas.microsoft.com/office/drawing/2014/main" id="{85C3222B-07F4-4BB7-8649-B1A45161D47C}"/>
               </a:ext>
             </a:extLst>
           </p:cNvPr>
@@ -7988,8 +8063,38 @@
         </p:blipFill>
         <p:spPr>
           <a:xfrm>
-            <a:off x="913774" y="3044024"/>
-            <a:ext cx="10191750" cy="1924050"/>
+            <a:off x="2095684" y="3578347"/>
+            <a:ext cx="7734300" cy="1352550"/>
+          </a:xfrm>
+          <a:prstGeom prst="rect">
+            <a:avLst/>
+          </a:prstGeom>
+        </p:spPr>
+      </p:pic>
+      <p:pic>
+        <p:nvPicPr>
+          <p:cNvPr id="6" name="Picture 5">
+            <a:extLst>
+              <a:ext uri="{FF2B5EF4-FFF2-40B4-BE49-F238E27FC236}">
+                <a16:creationId xmlns:a16="http://schemas.microsoft.com/office/drawing/2014/main" id="{DE76084F-2082-4FA7-94A5-42A923CA9B99}"/>
+              </a:ext>
+            </a:extLst>
+          </p:cNvPr>
+          <p:cNvPicPr>
+            <a:picLocks noChangeAspect="1"/>
+          </p:cNvPicPr>
+          <p:nvPr/>
+        </p:nvPicPr>
+        <p:blipFill>
+          <a:blip r:embed="rId3"/>
+          <a:stretch>
+            <a:fillRect/>
+          </a:stretch>
+        </p:blipFill>
+        <p:spPr>
+          <a:xfrm>
+            <a:off x="2095684" y="5453059"/>
+            <a:ext cx="4333875" cy="981075"/>
           </a:xfrm>
           <a:prstGeom prst="rect">
             <a:avLst/>
@@ -7999,7 +8104,7 @@
     </p:spTree>
     <p:extLst>
       <p:ext uri="{BB962C8B-B14F-4D97-AF65-F5344CB8AC3E}">
-        <p14:creationId xmlns:p14="http://schemas.microsoft.com/office/powerpoint/2010/main" val="3049579494"/>
+        <p14:creationId xmlns:p14="http://schemas.microsoft.com/office/powerpoint/2010/main" val="568102352"/>
       </p:ext>
     </p:extLst>
   </p:cSld>
@@ -8028,30 +8133,2749 @@
       </p:grpSpPr>
       <p:sp>
         <p:nvSpPr>
-          <p:cNvPr id="6" name="Rectangle 5">
-            <a:extLst>
-              <a:ext uri="{FF2B5EF4-FFF2-40B4-BE49-F238E27FC236}">
-                <a16:creationId xmlns:a16="http://schemas.microsoft.com/office/drawing/2014/main" id="{1C2F3CAD-F9F7-4148-BB47-DD392E373C6C}"/>
-              </a:ext>
-            </a:extLst>
-          </p:cNvPr>
-          <p:cNvSpPr/>
+          <p:cNvPr id="2" name="Title 1">
+            <a:extLst>
+              <a:ext uri="{FF2B5EF4-FFF2-40B4-BE49-F238E27FC236}">
+                <a16:creationId xmlns:a16="http://schemas.microsoft.com/office/drawing/2014/main" id="{5914CA8A-6FB3-4323-AD92-06CC439D5A3A}"/>
+              </a:ext>
+            </a:extLst>
+          </p:cNvPr>
+          <p:cNvSpPr>
+            <a:spLocks noGrp="1"/>
+          </p:cNvSpPr>
+          <p:nvPr>
+            <p:ph type="title"/>
+          </p:nvPr>
+        </p:nvSpPr>
+        <p:spPr/>
+        <p:txBody>
+          <a:bodyPr/>
+          <a:lstStyle/>
+          <a:p>
+            <a:r>
+              <a:rPr lang="en-US" dirty="0"/>
+              <a:t>Build stage docker image – from container</a:t>
+            </a:r>
+          </a:p>
+        </p:txBody>
+      </p:sp>
+      <p:sp>
+        <p:nvSpPr>
+          <p:cNvPr id="3" name="Content Placeholder 2">
+            <a:extLst>
+              <a:ext uri="{FF2B5EF4-FFF2-40B4-BE49-F238E27FC236}">
+                <a16:creationId xmlns:a16="http://schemas.microsoft.com/office/drawing/2014/main" id="{2FBC5596-7CA6-48E9-B0E5-EC199112DC13}"/>
+              </a:ext>
+            </a:extLst>
+          </p:cNvPr>
+          <p:cNvSpPr>
+            <a:spLocks noGrp="1"/>
+          </p:cNvSpPr>
+          <p:nvPr>
+            <p:ph sz="quarter" idx="13"/>
+          </p:nvPr>
+        </p:nvSpPr>
+        <p:spPr/>
+        <p:txBody>
+          <a:bodyPr/>
+          <a:lstStyle/>
+          <a:p>
+            <a:r>
+              <a:rPr lang="en-US" dirty="0"/>
+              <a:t>Exit docker and docker commit to generate a new image</a:t>
+            </a:r>
+          </a:p>
+        </p:txBody>
+      </p:sp>
+      <p:pic>
+        <p:nvPicPr>
+          <p:cNvPr id="4" name="Picture 3">
+            <a:extLst>
+              <a:ext uri="{FF2B5EF4-FFF2-40B4-BE49-F238E27FC236}">
+                <a16:creationId xmlns:a16="http://schemas.microsoft.com/office/drawing/2014/main" id="{561CF6E6-4F2E-4F21-98BE-75A3300E4640}"/>
+              </a:ext>
+            </a:extLst>
+          </p:cNvPr>
+          <p:cNvPicPr>
+            <a:picLocks noChangeAspect="1"/>
+          </p:cNvPicPr>
           <p:nvPr/>
-        </p:nvSpPr>
-        <p:spPr>
-          <a:xfrm>
-            <a:off x="1560993" y="3386831"/>
-            <a:ext cx="3614688" cy="2317070"/>
+        </p:nvPicPr>
+        <p:blipFill>
+          <a:blip r:embed="rId2"/>
+          <a:stretch>
+            <a:fillRect/>
+          </a:stretch>
+        </p:blipFill>
+        <p:spPr>
+          <a:xfrm>
+            <a:off x="1248838" y="2901195"/>
+            <a:ext cx="5876925" cy="771525"/>
           </a:xfrm>
           <a:prstGeom prst="rect">
             <a:avLst/>
           </a:prstGeom>
-          <a:solidFill>
-            <a:schemeClr val="accent4">
-              <a:lumMod val="60000"/>
-              <a:lumOff val="40000"/>
-            </a:schemeClr>
-          </a:solidFill>
+        </p:spPr>
+      </p:pic>
+      <p:pic>
+        <p:nvPicPr>
+          <p:cNvPr id="6" name="Picture 5">
+            <a:extLst>
+              <a:ext uri="{FF2B5EF4-FFF2-40B4-BE49-F238E27FC236}">
+                <a16:creationId xmlns:a16="http://schemas.microsoft.com/office/drawing/2014/main" id="{65557735-6255-48C8-8E23-C31E362590F3}"/>
+              </a:ext>
+            </a:extLst>
+          </p:cNvPr>
+          <p:cNvPicPr>
+            <a:picLocks noChangeAspect="1"/>
+          </p:cNvPicPr>
+          <p:nvPr/>
+        </p:nvPicPr>
+        <p:blipFill>
+          <a:blip r:embed="rId3"/>
+          <a:stretch>
+            <a:fillRect/>
+          </a:stretch>
+        </p:blipFill>
+        <p:spPr>
+          <a:xfrm>
+            <a:off x="1248838" y="4154287"/>
+            <a:ext cx="8239125" cy="1123950"/>
+          </a:xfrm>
+          <a:prstGeom prst="rect">
+            <a:avLst/>
+          </a:prstGeom>
+        </p:spPr>
+      </p:pic>
+    </p:spTree>
+    <p:extLst>
+      <p:ext uri="{BB962C8B-B14F-4D97-AF65-F5344CB8AC3E}">
+        <p14:creationId xmlns:p14="http://schemas.microsoft.com/office/powerpoint/2010/main" val="1909992595"/>
+      </p:ext>
+    </p:extLst>
+  </p:cSld>
+  <p:clrMapOvr>
+    <a:masterClrMapping/>
+  </p:clrMapOvr>
+</p:sld>
+</file>
+
+<file path=ppt/slides/slide24.xml><?xml version="1.0" encoding="utf-8"?>
+<p:sld xmlns:a="http://schemas.openxmlformats.org/drawingml/2006/main" xmlns:r="http://schemas.openxmlformats.org/officeDocument/2006/relationships" xmlns:p="http://schemas.openxmlformats.org/presentationml/2006/main">
+  <p:cSld>
+    <p:spTree>
+      <p:nvGrpSpPr>
+        <p:cNvPr id="1" name=""/>
+        <p:cNvGrpSpPr/>
+        <p:nvPr/>
+      </p:nvGrpSpPr>
+      <p:grpSpPr>
+        <a:xfrm>
+          <a:off x="0" y="0"/>
+          <a:ext cx="0" cy="0"/>
+          <a:chOff x="0" y="0"/>
+          <a:chExt cx="0" cy="0"/>
+        </a:xfrm>
+      </p:grpSpPr>
+      <p:sp>
+        <p:nvSpPr>
+          <p:cNvPr id="2" name="Title 1">
+            <a:extLst>
+              <a:ext uri="{FF2B5EF4-FFF2-40B4-BE49-F238E27FC236}">
+                <a16:creationId xmlns:a16="http://schemas.microsoft.com/office/drawing/2014/main" id="{8FDE79D7-822B-461B-84F2-5BDC07CAE1DD}"/>
+              </a:ext>
+            </a:extLst>
+          </p:cNvPr>
+          <p:cNvSpPr>
+            <a:spLocks noGrp="1"/>
+          </p:cNvSpPr>
+          <p:nvPr>
+            <p:ph type="title"/>
+          </p:nvPr>
+        </p:nvSpPr>
+        <p:spPr/>
+        <p:txBody>
+          <a:bodyPr/>
+          <a:lstStyle/>
+          <a:p>
+            <a:r>
+              <a:rPr lang="en-US" dirty="0"/>
+              <a:t>Build stage docker image (cont.)</a:t>
+            </a:r>
+          </a:p>
+        </p:txBody>
+      </p:sp>
+      <p:sp>
+        <p:nvSpPr>
+          <p:cNvPr id="3" name="Content Placeholder 2">
+            <a:extLst>
+              <a:ext uri="{FF2B5EF4-FFF2-40B4-BE49-F238E27FC236}">
+                <a16:creationId xmlns:a16="http://schemas.microsoft.com/office/drawing/2014/main" id="{9DCC188C-D7F3-43A0-846C-601FD0270913}"/>
+              </a:ext>
+            </a:extLst>
+          </p:cNvPr>
+          <p:cNvSpPr>
+            <a:spLocks noGrp="1"/>
+          </p:cNvSpPr>
+          <p:nvPr>
+            <p:ph sz="quarter" idx="13"/>
+          </p:nvPr>
+        </p:nvSpPr>
+        <p:spPr/>
+        <p:txBody>
+          <a:bodyPr/>
+          <a:lstStyle/>
+          <a:p>
+            <a:r>
+              <a:rPr lang="en-US" dirty="0"/>
+              <a:t>Exit docker and docker commit to generate a new image</a:t>
+            </a:r>
+          </a:p>
+          <a:p>
+            <a:endParaRPr lang="en-US" dirty="0"/>
+          </a:p>
+        </p:txBody>
+      </p:sp>
+      <p:pic>
+        <p:nvPicPr>
+          <p:cNvPr id="6" name="Picture 5">
+            <a:extLst>
+              <a:ext uri="{FF2B5EF4-FFF2-40B4-BE49-F238E27FC236}">
+                <a16:creationId xmlns:a16="http://schemas.microsoft.com/office/drawing/2014/main" id="{2D45B2B2-F48C-405A-B0F2-0B228D00B493}"/>
+              </a:ext>
+            </a:extLst>
+          </p:cNvPr>
+          <p:cNvPicPr>
+            <a:picLocks noChangeAspect="1"/>
+          </p:cNvPicPr>
+          <p:nvPr/>
+        </p:nvPicPr>
+        <p:blipFill>
+          <a:blip r:embed="rId2"/>
+          <a:stretch>
+            <a:fillRect/>
+          </a:stretch>
+        </p:blipFill>
+        <p:spPr>
+          <a:xfrm>
+            <a:off x="798991" y="2940919"/>
+            <a:ext cx="10960036" cy="1924044"/>
+          </a:xfrm>
+          <a:prstGeom prst="rect">
+            <a:avLst/>
+          </a:prstGeom>
+        </p:spPr>
+      </p:pic>
+    </p:spTree>
+    <p:extLst>
+      <p:ext uri="{BB962C8B-B14F-4D97-AF65-F5344CB8AC3E}">
+        <p14:creationId xmlns:p14="http://schemas.microsoft.com/office/powerpoint/2010/main" val="2859512703"/>
+      </p:ext>
+    </p:extLst>
+  </p:cSld>
+  <p:clrMapOvr>
+    <a:masterClrMapping/>
+  </p:clrMapOvr>
+</p:sld>
+</file>
+
+<file path=ppt/slides/slide25.xml><?xml version="1.0" encoding="utf-8"?>
+<p:sld xmlns:a="http://schemas.openxmlformats.org/drawingml/2006/main" xmlns:r="http://schemas.openxmlformats.org/officeDocument/2006/relationships" xmlns:p="http://schemas.openxmlformats.org/presentationml/2006/main">
+  <p:cSld>
+    <p:spTree>
+      <p:nvGrpSpPr>
+        <p:cNvPr id="1" name=""/>
+        <p:cNvGrpSpPr/>
+        <p:nvPr/>
+      </p:nvGrpSpPr>
+      <p:grpSpPr>
+        <a:xfrm>
+          <a:off x="0" y="0"/>
+          <a:ext cx="0" cy="0"/>
+          <a:chOff x="0" y="0"/>
+          <a:chExt cx="0" cy="0"/>
+        </a:xfrm>
+      </p:grpSpPr>
+      <p:sp>
+        <p:nvSpPr>
+          <p:cNvPr id="2" name="Title 1">
+            <a:extLst>
+              <a:ext uri="{FF2B5EF4-FFF2-40B4-BE49-F238E27FC236}">
+                <a16:creationId xmlns:a16="http://schemas.microsoft.com/office/drawing/2014/main" id="{E742ED46-B1C1-401B-80E7-3AC0E52F380A}"/>
+              </a:ext>
+            </a:extLst>
+          </p:cNvPr>
+          <p:cNvSpPr>
+            <a:spLocks noGrp="1"/>
+          </p:cNvSpPr>
+          <p:nvPr>
+            <p:ph type="title"/>
+          </p:nvPr>
+        </p:nvSpPr>
+        <p:spPr/>
+        <p:txBody>
+          <a:bodyPr/>
+          <a:lstStyle/>
+          <a:p>
+            <a:r>
+              <a:rPr lang="en-US" dirty="0"/>
+              <a:t>Commit to docker hub</a:t>
+            </a:r>
+          </a:p>
+        </p:txBody>
+      </p:sp>
+      <p:sp>
+        <p:nvSpPr>
+          <p:cNvPr id="3" name="Content Placeholder 2">
+            <a:extLst>
+              <a:ext uri="{FF2B5EF4-FFF2-40B4-BE49-F238E27FC236}">
+                <a16:creationId xmlns:a16="http://schemas.microsoft.com/office/drawing/2014/main" id="{F6220F29-68CA-4555-AF56-8478F27CA9A4}"/>
+              </a:ext>
+            </a:extLst>
+          </p:cNvPr>
+          <p:cNvSpPr>
+            <a:spLocks noGrp="1"/>
+          </p:cNvSpPr>
+          <p:nvPr>
+            <p:ph sz="quarter" idx="13"/>
+          </p:nvPr>
+        </p:nvSpPr>
+        <p:spPr/>
+        <p:txBody>
+          <a:bodyPr/>
+          <a:lstStyle/>
+          <a:p>
+            <a:r>
+              <a:rPr lang="en-US" dirty="0"/>
+              <a:t>Docker login</a:t>
+            </a:r>
+          </a:p>
+          <a:p>
+            <a:endParaRPr lang="en-US" dirty="0"/>
+          </a:p>
+          <a:p>
+            <a:endParaRPr lang="en-US" dirty="0"/>
+          </a:p>
+          <a:p>
+            <a:endParaRPr lang="en-US" dirty="0"/>
+          </a:p>
+        </p:txBody>
+      </p:sp>
+      <p:pic>
+        <p:nvPicPr>
+          <p:cNvPr id="4" name="Picture 3">
+            <a:extLst>
+              <a:ext uri="{FF2B5EF4-FFF2-40B4-BE49-F238E27FC236}">
+                <a16:creationId xmlns:a16="http://schemas.microsoft.com/office/drawing/2014/main" id="{94CFB5EC-D706-466C-A740-2308CB3F8C16}"/>
+              </a:ext>
+            </a:extLst>
+          </p:cNvPr>
+          <p:cNvPicPr>
+            <a:picLocks noChangeAspect="1"/>
+          </p:cNvPicPr>
+          <p:nvPr/>
+        </p:nvPicPr>
+        <p:blipFill>
+          <a:blip r:embed="rId2"/>
+          <a:stretch>
+            <a:fillRect/>
+          </a:stretch>
+        </p:blipFill>
+        <p:spPr>
+          <a:xfrm>
+            <a:off x="1224657" y="2812417"/>
+            <a:ext cx="8410575" cy="1381125"/>
+          </a:xfrm>
+          <a:prstGeom prst="rect">
+            <a:avLst/>
+          </a:prstGeom>
+        </p:spPr>
+      </p:pic>
+    </p:spTree>
+    <p:extLst>
+      <p:ext uri="{BB962C8B-B14F-4D97-AF65-F5344CB8AC3E}">
+        <p14:creationId xmlns:p14="http://schemas.microsoft.com/office/powerpoint/2010/main" val="3975117136"/>
+      </p:ext>
+    </p:extLst>
+  </p:cSld>
+  <p:clrMapOvr>
+    <a:masterClrMapping/>
+  </p:clrMapOvr>
+</p:sld>
+</file>
+
+<file path=ppt/slides/slide26.xml><?xml version="1.0" encoding="utf-8"?>
+<p:sld xmlns:a="http://schemas.openxmlformats.org/drawingml/2006/main" xmlns:r="http://schemas.openxmlformats.org/officeDocument/2006/relationships" xmlns:p="http://schemas.openxmlformats.org/presentationml/2006/main">
+  <p:cSld>
+    <p:spTree>
+      <p:nvGrpSpPr>
+        <p:cNvPr id="1" name=""/>
+        <p:cNvGrpSpPr/>
+        <p:nvPr/>
+      </p:nvGrpSpPr>
+      <p:grpSpPr>
+        <a:xfrm>
+          <a:off x="0" y="0"/>
+          <a:ext cx="0" cy="0"/>
+          <a:chOff x="0" y="0"/>
+          <a:chExt cx="0" cy="0"/>
+        </a:xfrm>
+      </p:grpSpPr>
+      <p:sp>
+        <p:nvSpPr>
+          <p:cNvPr id="2" name="Title 1">
+            <a:extLst>
+              <a:ext uri="{FF2B5EF4-FFF2-40B4-BE49-F238E27FC236}">
+                <a16:creationId xmlns:a16="http://schemas.microsoft.com/office/drawing/2014/main" id="{CE325664-05D7-488D-8C75-35817B49CFDC}"/>
+              </a:ext>
+            </a:extLst>
+          </p:cNvPr>
+          <p:cNvSpPr>
+            <a:spLocks noGrp="1"/>
+          </p:cNvSpPr>
+          <p:nvPr>
+            <p:ph type="title"/>
+          </p:nvPr>
+        </p:nvSpPr>
+        <p:spPr/>
+        <p:txBody>
+          <a:bodyPr/>
+          <a:lstStyle/>
+          <a:p>
+            <a:r>
+              <a:rPr lang="en-US" dirty="0"/>
+              <a:t>Commit to docker hub (cont.)</a:t>
+            </a:r>
+          </a:p>
+        </p:txBody>
+      </p:sp>
+      <p:sp>
+        <p:nvSpPr>
+          <p:cNvPr id="3" name="Content Placeholder 2">
+            <a:extLst>
+              <a:ext uri="{FF2B5EF4-FFF2-40B4-BE49-F238E27FC236}">
+                <a16:creationId xmlns:a16="http://schemas.microsoft.com/office/drawing/2014/main" id="{29D03633-B460-4041-AD65-DF4D654C9B67}"/>
+              </a:ext>
+            </a:extLst>
+          </p:cNvPr>
+          <p:cNvSpPr>
+            <a:spLocks noGrp="1"/>
+          </p:cNvSpPr>
+          <p:nvPr>
+            <p:ph sz="quarter" idx="13"/>
+          </p:nvPr>
+        </p:nvSpPr>
+        <p:spPr/>
+        <p:txBody>
+          <a:bodyPr/>
+          <a:lstStyle/>
+          <a:p>
+            <a:r>
+              <a:rPr lang="en-US" dirty="0"/>
+              <a:t>Change tag name to match repo</a:t>
+            </a:r>
+          </a:p>
+          <a:p>
+            <a:endParaRPr lang="en-US" dirty="0"/>
+          </a:p>
+        </p:txBody>
+      </p:sp>
+      <p:pic>
+        <p:nvPicPr>
+          <p:cNvPr id="4" name="Picture 3">
+            <a:extLst>
+              <a:ext uri="{FF2B5EF4-FFF2-40B4-BE49-F238E27FC236}">
+                <a16:creationId xmlns:a16="http://schemas.microsoft.com/office/drawing/2014/main" id="{F416FEDB-4ACD-4F0B-B78B-A70FD3FE10C9}"/>
+              </a:ext>
+            </a:extLst>
+          </p:cNvPr>
+          <p:cNvPicPr>
+            <a:picLocks noChangeAspect="1"/>
+          </p:cNvPicPr>
+          <p:nvPr/>
+        </p:nvPicPr>
+        <p:blipFill>
+          <a:blip r:embed="rId2"/>
+          <a:stretch>
+            <a:fillRect/>
+          </a:stretch>
+        </p:blipFill>
+        <p:spPr>
+          <a:xfrm>
+            <a:off x="1007430" y="2770380"/>
+            <a:ext cx="9715500" cy="2228777"/>
+          </a:xfrm>
+          <a:prstGeom prst="rect">
+            <a:avLst/>
+          </a:prstGeom>
+        </p:spPr>
+      </p:pic>
+      <p:pic>
+        <p:nvPicPr>
+          <p:cNvPr id="5" name="Picture 4">
+            <a:extLst>
+              <a:ext uri="{FF2B5EF4-FFF2-40B4-BE49-F238E27FC236}">
+                <a16:creationId xmlns:a16="http://schemas.microsoft.com/office/drawing/2014/main" id="{E02EB8CC-B51E-416D-B297-D9428E1AFDE2}"/>
+              </a:ext>
+            </a:extLst>
+          </p:cNvPr>
+          <p:cNvPicPr>
+            <a:picLocks noChangeAspect="1"/>
+          </p:cNvPicPr>
+          <p:nvPr/>
+        </p:nvPicPr>
+        <p:blipFill>
+          <a:blip r:embed="rId3"/>
+          <a:stretch>
+            <a:fillRect/>
+          </a:stretch>
+        </p:blipFill>
+        <p:spPr>
+          <a:xfrm>
+            <a:off x="1007430" y="5172072"/>
+            <a:ext cx="9715500" cy="1543050"/>
+          </a:xfrm>
+          <a:prstGeom prst="rect">
+            <a:avLst/>
+          </a:prstGeom>
+        </p:spPr>
+      </p:pic>
+    </p:spTree>
+    <p:extLst>
+      <p:ext uri="{BB962C8B-B14F-4D97-AF65-F5344CB8AC3E}">
+        <p14:creationId xmlns:p14="http://schemas.microsoft.com/office/powerpoint/2010/main" val="1277978414"/>
+      </p:ext>
+    </p:extLst>
+  </p:cSld>
+  <p:clrMapOvr>
+    <a:masterClrMapping/>
+  </p:clrMapOvr>
+</p:sld>
+</file>
+
+<file path=ppt/slides/slide27.xml><?xml version="1.0" encoding="utf-8"?>
+<p:sld xmlns:a="http://schemas.openxmlformats.org/drawingml/2006/main" xmlns:r="http://schemas.openxmlformats.org/officeDocument/2006/relationships" xmlns:p="http://schemas.openxmlformats.org/presentationml/2006/main">
+  <p:cSld>
+    <p:spTree>
+      <p:nvGrpSpPr>
+        <p:cNvPr id="1" name=""/>
+        <p:cNvGrpSpPr/>
+        <p:nvPr/>
+      </p:nvGrpSpPr>
+      <p:grpSpPr>
+        <a:xfrm>
+          <a:off x="0" y="0"/>
+          <a:ext cx="0" cy="0"/>
+          <a:chOff x="0" y="0"/>
+          <a:chExt cx="0" cy="0"/>
+        </a:xfrm>
+      </p:grpSpPr>
+      <p:sp>
+        <p:nvSpPr>
+          <p:cNvPr id="2" name="Title 1">
+            <a:extLst>
+              <a:ext uri="{FF2B5EF4-FFF2-40B4-BE49-F238E27FC236}">
+                <a16:creationId xmlns:a16="http://schemas.microsoft.com/office/drawing/2014/main" id="{CCC944B3-521A-4C28-9783-225EDAE59A99}"/>
+              </a:ext>
+            </a:extLst>
+          </p:cNvPr>
+          <p:cNvSpPr>
+            <a:spLocks noGrp="1"/>
+          </p:cNvSpPr>
+          <p:nvPr>
+            <p:ph type="title"/>
+          </p:nvPr>
+        </p:nvSpPr>
+        <p:spPr/>
+        <p:txBody>
+          <a:bodyPr/>
+          <a:lstStyle/>
+          <a:p>
+            <a:r>
+              <a:rPr lang="en-US" dirty="0"/>
+              <a:t>Commit to docker hub (cont.)</a:t>
+            </a:r>
+          </a:p>
+        </p:txBody>
+      </p:sp>
+      <p:sp>
+        <p:nvSpPr>
+          <p:cNvPr id="3" name="Content Placeholder 2">
+            <a:extLst>
+              <a:ext uri="{FF2B5EF4-FFF2-40B4-BE49-F238E27FC236}">
+                <a16:creationId xmlns:a16="http://schemas.microsoft.com/office/drawing/2014/main" id="{0F04C7A8-042E-4393-BE38-BF7789B391C0}"/>
+              </a:ext>
+            </a:extLst>
+          </p:cNvPr>
+          <p:cNvSpPr>
+            <a:spLocks noGrp="1"/>
+          </p:cNvSpPr>
+          <p:nvPr>
+            <p:ph sz="quarter" idx="13"/>
+          </p:nvPr>
+        </p:nvSpPr>
+        <p:spPr/>
+        <p:txBody>
+          <a:bodyPr/>
+          <a:lstStyle/>
+          <a:p>
+            <a:r>
+              <a:rPr lang="en-US" dirty="0"/>
+              <a:t>Verify image from docker hub</a:t>
+            </a:r>
+          </a:p>
+        </p:txBody>
+      </p:sp>
+      <p:pic>
+        <p:nvPicPr>
+          <p:cNvPr id="6" name="Picture 5">
+            <a:extLst>
+              <a:ext uri="{FF2B5EF4-FFF2-40B4-BE49-F238E27FC236}">
+                <a16:creationId xmlns:a16="http://schemas.microsoft.com/office/drawing/2014/main" id="{5EC9BB65-83F3-4BFF-B3E6-093121D5D969}"/>
+              </a:ext>
+            </a:extLst>
+          </p:cNvPr>
+          <p:cNvPicPr>
+            <a:picLocks noChangeAspect="1"/>
+          </p:cNvPicPr>
+          <p:nvPr/>
+        </p:nvPicPr>
+        <p:blipFill>
+          <a:blip r:embed="rId2"/>
+          <a:stretch>
+            <a:fillRect/>
+          </a:stretch>
+        </p:blipFill>
+        <p:spPr>
+          <a:xfrm>
+            <a:off x="1260629" y="2850141"/>
+            <a:ext cx="9945950" cy="1678895"/>
+          </a:xfrm>
+          <a:prstGeom prst="rect">
+            <a:avLst/>
+          </a:prstGeom>
+        </p:spPr>
+      </p:pic>
+      <p:pic>
+        <p:nvPicPr>
+          <p:cNvPr id="7" name="Picture 6">
+            <a:extLst>
+              <a:ext uri="{FF2B5EF4-FFF2-40B4-BE49-F238E27FC236}">
+                <a16:creationId xmlns:a16="http://schemas.microsoft.com/office/drawing/2014/main" id="{4B24E95B-5B9D-4F54-AFAE-65068BA2C281}"/>
+              </a:ext>
+            </a:extLst>
+          </p:cNvPr>
+          <p:cNvPicPr>
+            <a:picLocks noChangeAspect="1"/>
+          </p:cNvPicPr>
+          <p:nvPr/>
+        </p:nvPicPr>
+        <p:blipFill>
+          <a:blip r:embed="rId3"/>
+          <a:stretch>
+            <a:fillRect/>
+          </a:stretch>
+        </p:blipFill>
+        <p:spPr>
+          <a:xfrm>
+            <a:off x="1260629" y="4699755"/>
+            <a:ext cx="6105525" cy="1400175"/>
+          </a:xfrm>
+          <a:prstGeom prst="rect">
+            <a:avLst/>
+          </a:prstGeom>
+        </p:spPr>
+      </p:pic>
+    </p:spTree>
+    <p:extLst>
+      <p:ext uri="{BB962C8B-B14F-4D97-AF65-F5344CB8AC3E}">
+        <p14:creationId xmlns:p14="http://schemas.microsoft.com/office/powerpoint/2010/main" val="739316624"/>
+      </p:ext>
+    </p:extLst>
+  </p:cSld>
+  <p:clrMapOvr>
+    <a:masterClrMapping/>
+  </p:clrMapOvr>
+</p:sld>
+</file>
+
+<file path=ppt/slides/slide28.xml><?xml version="1.0" encoding="utf-8"?>
+<p:sld xmlns:a="http://schemas.openxmlformats.org/drawingml/2006/main" xmlns:r="http://schemas.openxmlformats.org/officeDocument/2006/relationships" xmlns:p="http://schemas.openxmlformats.org/presentationml/2006/main">
+  <p:cSld>
+    <p:spTree>
+      <p:nvGrpSpPr>
+        <p:cNvPr id="1" name=""/>
+        <p:cNvGrpSpPr/>
+        <p:nvPr/>
+      </p:nvGrpSpPr>
+      <p:grpSpPr>
+        <a:xfrm>
+          <a:off x="0" y="0"/>
+          <a:ext cx="0" cy="0"/>
+          <a:chOff x="0" y="0"/>
+          <a:chExt cx="0" cy="0"/>
+        </a:xfrm>
+      </p:grpSpPr>
+      <p:sp>
+        <p:nvSpPr>
+          <p:cNvPr id="2" name="Title 1">
+            <a:extLst>
+              <a:ext uri="{FF2B5EF4-FFF2-40B4-BE49-F238E27FC236}">
+                <a16:creationId xmlns:a16="http://schemas.microsoft.com/office/drawing/2014/main" id="{430C9F8E-B305-424D-8D9A-125E2FE48457}"/>
+              </a:ext>
+            </a:extLst>
+          </p:cNvPr>
+          <p:cNvSpPr>
+            <a:spLocks noGrp="1"/>
+          </p:cNvSpPr>
+          <p:nvPr>
+            <p:ph type="title"/>
+          </p:nvPr>
+        </p:nvSpPr>
+        <p:spPr/>
+        <p:txBody>
+          <a:bodyPr/>
+          <a:lstStyle/>
+          <a:p>
+            <a:r>
+              <a:rPr lang="en-US" dirty="0"/>
+              <a:t>Commit to docker hub (cont.)</a:t>
+            </a:r>
+          </a:p>
+        </p:txBody>
+      </p:sp>
+      <p:sp>
+        <p:nvSpPr>
+          <p:cNvPr id="3" name="Content Placeholder 2">
+            <a:extLst>
+              <a:ext uri="{FF2B5EF4-FFF2-40B4-BE49-F238E27FC236}">
+                <a16:creationId xmlns:a16="http://schemas.microsoft.com/office/drawing/2014/main" id="{CAEB00BE-E1D8-45B8-813B-75985052D525}"/>
+              </a:ext>
+            </a:extLst>
+          </p:cNvPr>
+          <p:cNvSpPr>
+            <a:spLocks noGrp="1"/>
+          </p:cNvSpPr>
+          <p:nvPr>
+            <p:ph sz="quarter" idx="13"/>
+          </p:nvPr>
+        </p:nvSpPr>
+        <p:spPr/>
+        <p:txBody>
+          <a:bodyPr/>
+          <a:lstStyle/>
+          <a:p>
+            <a:r>
+              <a:rPr lang="en-US" dirty="0"/>
+              <a:t>Verify image from docker hub</a:t>
+            </a:r>
+          </a:p>
+          <a:p>
+            <a:endParaRPr lang="en-US" dirty="0"/>
+          </a:p>
+          <a:p>
+            <a:endParaRPr lang="en-US" dirty="0"/>
+          </a:p>
+          <a:p>
+            <a:r>
+              <a:rPr lang="en-US" dirty="0"/>
+              <a:t>Run container from the image</a:t>
+            </a:r>
+          </a:p>
+          <a:p>
+            <a:endParaRPr lang="en-US" dirty="0"/>
+          </a:p>
+        </p:txBody>
+      </p:sp>
+      <p:pic>
+        <p:nvPicPr>
+          <p:cNvPr id="4" name="Picture 3">
+            <a:extLst>
+              <a:ext uri="{FF2B5EF4-FFF2-40B4-BE49-F238E27FC236}">
+                <a16:creationId xmlns:a16="http://schemas.microsoft.com/office/drawing/2014/main" id="{B4A97CBE-E136-4161-AF9C-8CE1AF271054}"/>
+              </a:ext>
+            </a:extLst>
+          </p:cNvPr>
+          <p:cNvPicPr>
+            <a:picLocks noChangeAspect="1"/>
+          </p:cNvPicPr>
+          <p:nvPr/>
+        </p:nvPicPr>
+        <p:blipFill>
+          <a:blip r:embed="rId2"/>
+          <a:stretch>
+            <a:fillRect/>
+          </a:stretch>
+        </p:blipFill>
+        <p:spPr>
+          <a:xfrm>
+            <a:off x="1283146" y="2839698"/>
+            <a:ext cx="8524875" cy="752475"/>
+          </a:xfrm>
+          <a:prstGeom prst="rect">
+            <a:avLst/>
+          </a:prstGeom>
+        </p:spPr>
+      </p:pic>
+      <p:pic>
+        <p:nvPicPr>
+          <p:cNvPr id="5" name="Picture 4">
+            <a:extLst>
+              <a:ext uri="{FF2B5EF4-FFF2-40B4-BE49-F238E27FC236}">
+                <a16:creationId xmlns:a16="http://schemas.microsoft.com/office/drawing/2014/main" id="{294C1943-9EF2-4D59-A2F9-F0C1135CED37}"/>
+              </a:ext>
+            </a:extLst>
+          </p:cNvPr>
+          <p:cNvPicPr>
+            <a:picLocks noChangeAspect="1"/>
+          </p:cNvPicPr>
+          <p:nvPr/>
+        </p:nvPicPr>
+        <p:blipFill>
+          <a:blip r:embed="rId3"/>
+          <a:stretch>
+            <a:fillRect/>
+          </a:stretch>
+        </p:blipFill>
+        <p:spPr>
+          <a:xfrm>
+            <a:off x="1421258" y="4277348"/>
+            <a:ext cx="8248650" cy="828675"/>
+          </a:xfrm>
+          <a:prstGeom prst="rect">
+            <a:avLst/>
+          </a:prstGeom>
+        </p:spPr>
+      </p:pic>
+    </p:spTree>
+    <p:extLst>
+      <p:ext uri="{BB962C8B-B14F-4D97-AF65-F5344CB8AC3E}">
+        <p14:creationId xmlns:p14="http://schemas.microsoft.com/office/powerpoint/2010/main" val="1301299095"/>
+      </p:ext>
+    </p:extLst>
+  </p:cSld>
+  <p:clrMapOvr>
+    <a:masterClrMapping/>
+  </p:clrMapOvr>
+</p:sld>
+</file>
+
+<file path=ppt/slides/slide29.xml><?xml version="1.0" encoding="utf-8"?>
+<p:sld xmlns:a="http://schemas.openxmlformats.org/drawingml/2006/main" xmlns:r="http://schemas.openxmlformats.org/officeDocument/2006/relationships" xmlns:p="http://schemas.openxmlformats.org/presentationml/2006/main">
+  <p:cSld>
+    <p:spTree>
+      <p:nvGrpSpPr>
+        <p:cNvPr id="1" name=""/>
+        <p:cNvGrpSpPr/>
+        <p:nvPr/>
+      </p:nvGrpSpPr>
+      <p:grpSpPr>
+        <a:xfrm>
+          <a:off x="0" y="0"/>
+          <a:ext cx="0" cy="0"/>
+          <a:chOff x="0" y="0"/>
+          <a:chExt cx="0" cy="0"/>
+        </a:xfrm>
+      </p:grpSpPr>
+      <p:sp>
+        <p:nvSpPr>
+          <p:cNvPr id="2" name="Title 1">
+            <a:extLst>
+              <a:ext uri="{FF2B5EF4-FFF2-40B4-BE49-F238E27FC236}">
+                <a16:creationId xmlns:a16="http://schemas.microsoft.com/office/drawing/2014/main" id="{5DAF2345-7743-42B8-808D-E0447817763C}"/>
+              </a:ext>
+            </a:extLst>
+          </p:cNvPr>
+          <p:cNvSpPr>
+            <a:spLocks noGrp="1"/>
+          </p:cNvSpPr>
+          <p:nvPr>
+            <p:ph type="title"/>
+          </p:nvPr>
+        </p:nvSpPr>
+        <p:spPr/>
+        <p:txBody>
+          <a:bodyPr/>
+          <a:lstStyle/>
+          <a:p>
+            <a:r>
+              <a:rPr lang="en-US" dirty="0"/>
+              <a:t>Commit to docker hub (cont.)</a:t>
+            </a:r>
+          </a:p>
+        </p:txBody>
+      </p:sp>
+      <p:sp>
+        <p:nvSpPr>
+          <p:cNvPr id="3" name="Content Placeholder 2">
+            <a:extLst>
+              <a:ext uri="{FF2B5EF4-FFF2-40B4-BE49-F238E27FC236}">
+                <a16:creationId xmlns:a16="http://schemas.microsoft.com/office/drawing/2014/main" id="{BC1CC13C-FFB6-4555-8192-31B249673521}"/>
+              </a:ext>
+            </a:extLst>
+          </p:cNvPr>
+          <p:cNvSpPr>
+            <a:spLocks noGrp="1"/>
+          </p:cNvSpPr>
+          <p:nvPr>
+            <p:ph sz="quarter" idx="13"/>
+          </p:nvPr>
+        </p:nvSpPr>
+        <p:spPr/>
+        <p:txBody>
+          <a:bodyPr/>
+          <a:lstStyle/>
+          <a:p>
+            <a:r>
+              <a:rPr lang="en-US" dirty="0"/>
+              <a:t>Run application</a:t>
+            </a:r>
+          </a:p>
+        </p:txBody>
+      </p:sp>
+      <p:pic>
+        <p:nvPicPr>
+          <p:cNvPr id="5" name="Picture 4">
+            <a:extLst>
+              <a:ext uri="{FF2B5EF4-FFF2-40B4-BE49-F238E27FC236}">
+                <a16:creationId xmlns:a16="http://schemas.microsoft.com/office/drawing/2014/main" id="{34D36EA5-0A04-4FF1-84DE-9992928C6D24}"/>
+              </a:ext>
+            </a:extLst>
+          </p:cNvPr>
+          <p:cNvPicPr>
+            <a:picLocks noChangeAspect="1"/>
+          </p:cNvPicPr>
+          <p:nvPr/>
+        </p:nvPicPr>
+        <p:blipFill>
+          <a:blip r:embed="rId2"/>
+          <a:stretch>
+            <a:fillRect/>
+          </a:stretch>
+        </p:blipFill>
+        <p:spPr>
+          <a:xfrm>
+            <a:off x="1216241" y="2852737"/>
+            <a:ext cx="8534400" cy="1152525"/>
+          </a:xfrm>
+          <a:prstGeom prst="rect">
+            <a:avLst/>
+          </a:prstGeom>
+        </p:spPr>
+      </p:pic>
+    </p:spTree>
+    <p:extLst>
+      <p:ext uri="{BB962C8B-B14F-4D97-AF65-F5344CB8AC3E}">
+        <p14:creationId xmlns:p14="http://schemas.microsoft.com/office/powerpoint/2010/main" val="3049579494"/>
+      </p:ext>
+    </p:extLst>
+  </p:cSld>
+  <p:clrMapOvr>
+    <a:masterClrMapping/>
+  </p:clrMapOvr>
+</p:sld>
+</file>
+
+<file path=ppt/slides/slide3.xml><?xml version="1.0" encoding="utf-8"?>
+<p:sld xmlns:a="http://schemas.openxmlformats.org/drawingml/2006/main" xmlns:r="http://schemas.openxmlformats.org/officeDocument/2006/relationships" xmlns:p="http://schemas.openxmlformats.org/presentationml/2006/main">
+  <p:cSld>
+    <p:spTree>
+      <p:nvGrpSpPr>
+        <p:cNvPr id="1" name=""/>
+        <p:cNvGrpSpPr/>
+        <p:nvPr/>
+      </p:nvGrpSpPr>
+      <p:grpSpPr>
+        <a:xfrm>
+          <a:off x="0" y="0"/>
+          <a:ext cx="0" cy="0"/>
+          <a:chOff x="0" y="0"/>
+          <a:chExt cx="0" cy="0"/>
+        </a:xfrm>
+      </p:grpSpPr>
+      <p:sp>
+        <p:nvSpPr>
+          <p:cNvPr id="2" name="Title 1">
+            <a:extLst>
+              <a:ext uri="{FF2B5EF4-FFF2-40B4-BE49-F238E27FC236}">
+                <a16:creationId xmlns:a16="http://schemas.microsoft.com/office/drawing/2014/main" id="{A03B639C-C4F4-483A-A142-2DE674AF5ABA}"/>
+              </a:ext>
+            </a:extLst>
+          </p:cNvPr>
+          <p:cNvSpPr>
+            <a:spLocks noGrp="1"/>
+          </p:cNvSpPr>
+          <p:nvPr>
+            <p:ph type="title"/>
+          </p:nvPr>
+        </p:nvSpPr>
+        <p:spPr/>
+        <p:txBody>
+          <a:bodyPr/>
+          <a:lstStyle/>
+          <a:p>
+            <a:r>
+              <a:rPr lang="en-US" dirty="0"/>
+              <a:t>install</a:t>
+            </a:r>
+          </a:p>
+        </p:txBody>
+      </p:sp>
+      <p:sp>
+        <p:nvSpPr>
+          <p:cNvPr id="3" name="Content Placeholder 2">
+            <a:extLst>
+              <a:ext uri="{FF2B5EF4-FFF2-40B4-BE49-F238E27FC236}">
+                <a16:creationId xmlns:a16="http://schemas.microsoft.com/office/drawing/2014/main" id="{309479CE-6559-4E3D-BF09-C777B9B509BD}"/>
+              </a:ext>
+            </a:extLst>
+          </p:cNvPr>
+          <p:cNvSpPr>
+            <a:spLocks noGrp="1"/>
+          </p:cNvSpPr>
+          <p:nvPr>
+            <p:ph sz="quarter" idx="13"/>
+          </p:nvPr>
+        </p:nvSpPr>
+        <p:spPr/>
+        <p:txBody>
+          <a:bodyPr/>
+          <a:lstStyle/>
+          <a:p>
+            <a:r>
+              <a:rPr lang="en-US" dirty="0"/>
+              <a:t>Ubuntu 16 </a:t>
+            </a:r>
+            <a:r>
+              <a:rPr lang="en-US" dirty="0" err="1"/>
+              <a:t>lts</a:t>
+            </a:r>
+            <a:endParaRPr lang="en-US" dirty="0"/>
+          </a:p>
+        </p:txBody>
+      </p:sp>
+    </p:spTree>
+    <p:extLst>
+      <p:ext uri="{BB962C8B-B14F-4D97-AF65-F5344CB8AC3E}">
+        <p14:creationId xmlns:p14="http://schemas.microsoft.com/office/powerpoint/2010/main" val="1869058991"/>
+      </p:ext>
+    </p:extLst>
+  </p:cSld>
+  <p:clrMapOvr>
+    <a:masterClrMapping/>
+  </p:clrMapOvr>
+</p:sld>
+</file>
+
+<file path=ppt/slides/slide30.xml><?xml version="1.0" encoding="utf-8"?>
+<p:sld xmlns:a="http://schemas.openxmlformats.org/drawingml/2006/main" xmlns:r="http://schemas.openxmlformats.org/officeDocument/2006/relationships" xmlns:p="http://schemas.openxmlformats.org/presentationml/2006/main">
+  <p:cSld>
+    <p:spTree>
+      <p:nvGrpSpPr>
+        <p:cNvPr id="1" name=""/>
+        <p:cNvGrpSpPr/>
+        <p:nvPr/>
+      </p:nvGrpSpPr>
+      <p:grpSpPr>
+        <a:xfrm>
+          <a:off x="0" y="0"/>
+          <a:ext cx="0" cy="0"/>
+          <a:chOff x="0" y="0"/>
+          <a:chExt cx="0" cy="0"/>
+        </a:xfrm>
+      </p:grpSpPr>
+      <p:sp>
+        <p:nvSpPr>
+          <p:cNvPr id="2" name="Title 1">
+            <a:extLst>
+              <a:ext uri="{FF2B5EF4-FFF2-40B4-BE49-F238E27FC236}">
+                <a16:creationId xmlns:a16="http://schemas.microsoft.com/office/drawing/2014/main" id="{2610DD2F-01B3-45F9-A18D-583CA347B1BF}"/>
+              </a:ext>
+            </a:extLst>
+          </p:cNvPr>
+          <p:cNvSpPr>
+            <a:spLocks noGrp="1"/>
+          </p:cNvSpPr>
+          <p:nvPr>
+            <p:ph type="title"/>
+          </p:nvPr>
+        </p:nvSpPr>
+        <p:spPr/>
+        <p:txBody>
+          <a:bodyPr/>
+          <a:lstStyle/>
+          <a:p>
+            <a:r>
+              <a:rPr lang="en-US" dirty="0"/>
+              <a:t>Use docker file create image</a:t>
+            </a:r>
+          </a:p>
+        </p:txBody>
+      </p:sp>
+      <p:sp>
+        <p:nvSpPr>
+          <p:cNvPr id="3" name="Content Placeholder 2">
+            <a:extLst>
+              <a:ext uri="{FF2B5EF4-FFF2-40B4-BE49-F238E27FC236}">
+                <a16:creationId xmlns:a16="http://schemas.microsoft.com/office/drawing/2014/main" id="{D693EB38-8364-40D6-A27A-A20686730EF4}"/>
+              </a:ext>
+            </a:extLst>
+          </p:cNvPr>
+          <p:cNvSpPr>
+            <a:spLocks noGrp="1"/>
+          </p:cNvSpPr>
+          <p:nvPr>
+            <p:ph sz="quarter" idx="13"/>
+          </p:nvPr>
+        </p:nvSpPr>
+        <p:spPr/>
+        <p:txBody>
+          <a:bodyPr/>
+          <a:lstStyle/>
+          <a:p>
+            <a:r>
+              <a:rPr lang="en-US" dirty="0"/>
+              <a:t>Multi-stage build</a:t>
+            </a:r>
+          </a:p>
+          <a:p>
+            <a:pPr lvl="1"/>
+            <a:r>
+              <a:rPr lang="en-US" dirty="0"/>
+              <a:t>Build stage docker image</a:t>
+            </a:r>
+          </a:p>
+          <a:p>
+            <a:pPr lvl="1"/>
+            <a:r>
+              <a:rPr lang="en-US" dirty="0"/>
+              <a:t>Run-time stage docker image</a:t>
+            </a:r>
+          </a:p>
+          <a:p>
+            <a:pPr lvl="1"/>
+            <a:r>
+              <a:rPr lang="en-US" dirty="0"/>
+              <a:t>TO BE DONE</a:t>
+            </a:r>
+          </a:p>
+        </p:txBody>
+      </p:sp>
+    </p:spTree>
+    <p:extLst>
+      <p:ext uri="{BB962C8B-B14F-4D97-AF65-F5344CB8AC3E}">
+        <p14:creationId xmlns:p14="http://schemas.microsoft.com/office/powerpoint/2010/main" val="2091007274"/>
+      </p:ext>
+    </p:extLst>
+  </p:cSld>
+  <p:clrMapOvr>
+    <a:masterClrMapping/>
+  </p:clrMapOvr>
+</p:sld>
+</file>
+
+<file path=ppt/slides/slide31.xml><?xml version="1.0" encoding="utf-8"?>
+<p:sld xmlns:a="http://schemas.openxmlformats.org/drawingml/2006/main" xmlns:r="http://schemas.openxmlformats.org/officeDocument/2006/relationships" xmlns:p="http://schemas.openxmlformats.org/presentationml/2006/main">
+  <p:cSld>
+    <p:spTree>
+      <p:nvGrpSpPr>
+        <p:cNvPr id="1" name=""/>
+        <p:cNvGrpSpPr/>
+        <p:nvPr/>
+      </p:nvGrpSpPr>
+      <p:grpSpPr>
+        <a:xfrm>
+          <a:off x="0" y="0"/>
+          <a:ext cx="0" cy="0"/>
+          <a:chOff x="0" y="0"/>
+          <a:chExt cx="0" cy="0"/>
+        </a:xfrm>
+      </p:grpSpPr>
+      <p:sp>
+        <p:nvSpPr>
+          <p:cNvPr id="2" name="Title 1">
+            <a:extLst>
+              <a:ext uri="{FF2B5EF4-FFF2-40B4-BE49-F238E27FC236}">
+                <a16:creationId xmlns:a16="http://schemas.microsoft.com/office/drawing/2014/main" id="{8EDF1C7E-D814-48F7-9981-44D4F975D562}"/>
+              </a:ext>
+            </a:extLst>
+          </p:cNvPr>
+          <p:cNvSpPr>
+            <a:spLocks noGrp="1"/>
+          </p:cNvSpPr>
+          <p:nvPr>
+            <p:ph type="title"/>
+          </p:nvPr>
+        </p:nvSpPr>
+        <p:spPr/>
+        <p:txBody>
+          <a:bodyPr/>
+          <a:lstStyle/>
+          <a:p>
+            <a:r>
+              <a:rPr lang="en-US" dirty="0"/>
+              <a:t>MOSQUITTO IMAGE</a:t>
+            </a:r>
+          </a:p>
+        </p:txBody>
+      </p:sp>
+      <p:sp>
+        <p:nvSpPr>
+          <p:cNvPr id="3" name="Content Placeholder 2">
+            <a:extLst>
+              <a:ext uri="{FF2B5EF4-FFF2-40B4-BE49-F238E27FC236}">
+                <a16:creationId xmlns:a16="http://schemas.microsoft.com/office/drawing/2014/main" id="{56F770D0-348E-4177-885A-D90CB165B095}"/>
+              </a:ext>
+            </a:extLst>
+          </p:cNvPr>
+          <p:cNvSpPr>
+            <a:spLocks noGrp="1"/>
+          </p:cNvSpPr>
+          <p:nvPr>
+            <p:ph sz="quarter" idx="13"/>
+          </p:nvPr>
+        </p:nvSpPr>
+        <p:spPr/>
+        <p:txBody>
+          <a:bodyPr/>
+          <a:lstStyle/>
+          <a:p>
+            <a:r>
+              <a:rPr lang="en-US" dirty="0"/>
+              <a:t>Official image from </a:t>
+            </a:r>
+            <a:r>
+              <a:rPr lang="en-US" dirty="0">
+                <a:hlinkClick r:id="rId2"/>
+              </a:rPr>
+              <a:t>https://hub.docker.com/_/eclipse-mosquitto</a:t>
+            </a:r>
+            <a:endParaRPr lang="en-US" dirty="0"/>
+          </a:p>
+        </p:txBody>
+      </p:sp>
+      <p:pic>
+        <p:nvPicPr>
+          <p:cNvPr id="4" name="Picture 3">
+            <a:extLst>
+              <a:ext uri="{FF2B5EF4-FFF2-40B4-BE49-F238E27FC236}">
+                <a16:creationId xmlns:a16="http://schemas.microsoft.com/office/drawing/2014/main" id="{BDCC817E-ECEF-4F2C-A331-74D793634C19}"/>
+              </a:ext>
+            </a:extLst>
+          </p:cNvPr>
+          <p:cNvPicPr>
+            <a:picLocks noChangeAspect="1"/>
+          </p:cNvPicPr>
+          <p:nvPr/>
+        </p:nvPicPr>
+        <p:blipFill>
+          <a:blip r:embed="rId3"/>
+          <a:stretch>
+            <a:fillRect/>
+          </a:stretch>
+        </p:blipFill>
+        <p:spPr>
+          <a:xfrm>
+            <a:off x="1260952" y="2877058"/>
+            <a:ext cx="7610475" cy="1743075"/>
+          </a:xfrm>
+          <a:prstGeom prst="rect">
+            <a:avLst/>
+          </a:prstGeom>
+        </p:spPr>
+      </p:pic>
+      <p:pic>
+        <p:nvPicPr>
+          <p:cNvPr id="5" name="Picture 4">
+            <a:extLst>
+              <a:ext uri="{FF2B5EF4-FFF2-40B4-BE49-F238E27FC236}">
+                <a16:creationId xmlns:a16="http://schemas.microsoft.com/office/drawing/2014/main" id="{A7D166AE-C70A-441F-9A2F-C8A59E3934F3}"/>
+              </a:ext>
+            </a:extLst>
+          </p:cNvPr>
+          <p:cNvPicPr>
+            <a:picLocks noChangeAspect="1"/>
+          </p:cNvPicPr>
+          <p:nvPr/>
+        </p:nvPicPr>
+        <p:blipFill>
+          <a:blip r:embed="rId4"/>
+          <a:stretch>
+            <a:fillRect/>
+          </a:stretch>
+        </p:blipFill>
+        <p:spPr>
+          <a:xfrm>
+            <a:off x="1260952" y="4824666"/>
+            <a:ext cx="8448675" cy="762000"/>
+          </a:xfrm>
+          <a:prstGeom prst="rect">
+            <a:avLst/>
+          </a:prstGeom>
+        </p:spPr>
+      </p:pic>
+    </p:spTree>
+    <p:extLst>
+      <p:ext uri="{BB962C8B-B14F-4D97-AF65-F5344CB8AC3E}">
+        <p14:creationId xmlns:p14="http://schemas.microsoft.com/office/powerpoint/2010/main" val="2484581770"/>
+      </p:ext>
+    </p:extLst>
+  </p:cSld>
+  <p:clrMapOvr>
+    <a:masterClrMapping/>
+  </p:clrMapOvr>
+</p:sld>
+</file>
+
+<file path=ppt/slides/slide32.xml><?xml version="1.0" encoding="utf-8"?>
+<p:sld xmlns:a="http://schemas.openxmlformats.org/drawingml/2006/main" xmlns:r="http://schemas.openxmlformats.org/officeDocument/2006/relationships" xmlns:p="http://schemas.openxmlformats.org/presentationml/2006/main">
+  <p:cSld>
+    <p:spTree>
+      <p:nvGrpSpPr>
+        <p:cNvPr id="1" name=""/>
+        <p:cNvGrpSpPr/>
+        <p:nvPr/>
+      </p:nvGrpSpPr>
+      <p:grpSpPr>
+        <a:xfrm>
+          <a:off x="0" y="0"/>
+          <a:ext cx="0" cy="0"/>
+          <a:chOff x="0" y="0"/>
+          <a:chExt cx="0" cy="0"/>
+        </a:xfrm>
+      </p:grpSpPr>
+      <p:sp>
+        <p:nvSpPr>
+          <p:cNvPr id="2" name="Title 1">
+            <a:extLst>
+              <a:ext uri="{FF2B5EF4-FFF2-40B4-BE49-F238E27FC236}">
+                <a16:creationId xmlns:a16="http://schemas.microsoft.com/office/drawing/2014/main" id="{88210908-C869-4569-9070-950E84F08094}"/>
+              </a:ext>
+            </a:extLst>
+          </p:cNvPr>
+          <p:cNvSpPr>
+            <a:spLocks noGrp="1"/>
+          </p:cNvSpPr>
+          <p:nvPr>
+            <p:ph type="title"/>
+          </p:nvPr>
+        </p:nvSpPr>
+        <p:spPr/>
+        <p:txBody>
+          <a:bodyPr/>
+          <a:lstStyle/>
+          <a:p>
+            <a:r>
+              <a:rPr lang="en-US" dirty="0"/>
+              <a:t>MOSQUITTO IMAGE (cont.)</a:t>
+            </a:r>
+          </a:p>
+        </p:txBody>
+      </p:sp>
+      <p:sp>
+        <p:nvSpPr>
+          <p:cNvPr id="3" name="Content Placeholder 2">
+            <a:extLst>
+              <a:ext uri="{FF2B5EF4-FFF2-40B4-BE49-F238E27FC236}">
+                <a16:creationId xmlns:a16="http://schemas.microsoft.com/office/drawing/2014/main" id="{F4C4F83C-F2AA-4BDE-A861-C23580E6E91A}"/>
+              </a:ext>
+            </a:extLst>
+          </p:cNvPr>
+          <p:cNvSpPr>
+            <a:spLocks noGrp="1"/>
+          </p:cNvSpPr>
+          <p:nvPr>
+            <p:ph sz="quarter" idx="13"/>
+          </p:nvPr>
+        </p:nvSpPr>
+        <p:spPr/>
+        <p:txBody>
+          <a:bodyPr/>
+          <a:lstStyle/>
+          <a:p>
+            <a:r>
+              <a:rPr lang="en-US" dirty="0"/>
+              <a:t>Run mosquito image as container</a:t>
+            </a:r>
+          </a:p>
+        </p:txBody>
+      </p:sp>
+      <p:pic>
+        <p:nvPicPr>
+          <p:cNvPr id="5" name="Picture 4">
+            <a:extLst>
+              <a:ext uri="{FF2B5EF4-FFF2-40B4-BE49-F238E27FC236}">
+                <a16:creationId xmlns:a16="http://schemas.microsoft.com/office/drawing/2014/main" id="{DCBD439F-7613-4354-8116-8189DC1FF9E0}"/>
+              </a:ext>
+            </a:extLst>
+          </p:cNvPr>
+          <p:cNvPicPr>
+            <a:picLocks noChangeAspect="1"/>
+          </p:cNvPicPr>
+          <p:nvPr/>
+        </p:nvPicPr>
+        <p:blipFill>
+          <a:blip r:embed="rId2"/>
+          <a:stretch>
+            <a:fillRect/>
+          </a:stretch>
+        </p:blipFill>
+        <p:spPr>
+          <a:xfrm>
+            <a:off x="1252224" y="2793645"/>
+            <a:ext cx="9686925" cy="1038225"/>
+          </a:xfrm>
+          <a:prstGeom prst="rect">
+            <a:avLst/>
+          </a:prstGeom>
+        </p:spPr>
+      </p:pic>
+      <p:pic>
+        <p:nvPicPr>
+          <p:cNvPr id="6" name="Picture 5">
+            <a:extLst>
+              <a:ext uri="{FF2B5EF4-FFF2-40B4-BE49-F238E27FC236}">
+                <a16:creationId xmlns:a16="http://schemas.microsoft.com/office/drawing/2014/main" id="{A385B47D-53CD-45D4-B28D-2D071B2B6E8C}"/>
+              </a:ext>
+            </a:extLst>
+          </p:cNvPr>
+          <p:cNvPicPr>
+            <a:picLocks noChangeAspect="1"/>
+          </p:cNvPicPr>
+          <p:nvPr/>
+        </p:nvPicPr>
+        <p:blipFill>
+          <a:blip r:embed="rId3"/>
+          <a:stretch>
+            <a:fillRect/>
+          </a:stretch>
+        </p:blipFill>
+        <p:spPr>
+          <a:xfrm>
+            <a:off x="253171" y="4079145"/>
+            <a:ext cx="11809946" cy="610984"/>
+          </a:xfrm>
+          <a:prstGeom prst="rect">
+            <a:avLst/>
+          </a:prstGeom>
+        </p:spPr>
+      </p:pic>
+    </p:spTree>
+    <p:extLst>
+      <p:ext uri="{BB962C8B-B14F-4D97-AF65-F5344CB8AC3E}">
+        <p14:creationId xmlns:p14="http://schemas.microsoft.com/office/powerpoint/2010/main" val="436193310"/>
+      </p:ext>
+    </p:extLst>
+  </p:cSld>
+  <p:clrMapOvr>
+    <a:masterClrMapping/>
+  </p:clrMapOvr>
+</p:sld>
+</file>
+
+<file path=ppt/slides/slide33.xml><?xml version="1.0" encoding="utf-8"?>
+<p:sld xmlns:a="http://schemas.openxmlformats.org/drawingml/2006/main" xmlns:r="http://schemas.openxmlformats.org/officeDocument/2006/relationships" xmlns:p="http://schemas.openxmlformats.org/presentationml/2006/main">
+  <p:cSld>
+    <p:spTree>
+      <p:nvGrpSpPr>
+        <p:cNvPr id="1" name=""/>
+        <p:cNvGrpSpPr/>
+        <p:nvPr/>
+      </p:nvGrpSpPr>
+      <p:grpSpPr>
+        <a:xfrm>
+          <a:off x="0" y="0"/>
+          <a:ext cx="0" cy="0"/>
+          <a:chOff x="0" y="0"/>
+          <a:chExt cx="0" cy="0"/>
+        </a:xfrm>
+      </p:grpSpPr>
+      <p:sp>
+        <p:nvSpPr>
+          <p:cNvPr id="2" name="Title 1">
+            <a:extLst>
+              <a:ext uri="{FF2B5EF4-FFF2-40B4-BE49-F238E27FC236}">
+                <a16:creationId xmlns:a16="http://schemas.microsoft.com/office/drawing/2014/main" id="{822E9155-6338-486A-B6D5-131EAB5147BC}"/>
+              </a:ext>
+            </a:extLst>
+          </p:cNvPr>
+          <p:cNvSpPr>
+            <a:spLocks noGrp="1"/>
+          </p:cNvSpPr>
+          <p:nvPr>
+            <p:ph type="title"/>
+          </p:nvPr>
+        </p:nvSpPr>
+        <p:spPr/>
+        <p:txBody>
+          <a:bodyPr/>
+          <a:lstStyle/>
+          <a:p>
+            <a:r>
+              <a:rPr lang="en-US" dirty="0"/>
+              <a:t>Connect mosquito with hyacinth</a:t>
+            </a:r>
+          </a:p>
+        </p:txBody>
+      </p:sp>
+      <p:sp>
+        <p:nvSpPr>
+          <p:cNvPr id="3" name="Content Placeholder 2">
+            <a:extLst>
+              <a:ext uri="{FF2B5EF4-FFF2-40B4-BE49-F238E27FC236}">
+                <a16:creationId xmlns:a16="http://schemas.microsoft.com/office/drawing/2014/main" id="{4D0026AA-717F-4C83-9DBB-6502E755666A}"/>
+              </a:ext>
+            </a:extLst>
+          </p:cNvPr>
+          <p:cNvSpPr>
+            <a:spLocks noGrp="1"/>
+          </p:cNvSpPr>
+          <p:nvPr>
+            <p:ph sz="quarter" idx="13"/>
+          </p:nvPr>
+        </p:nvSpPr>
+        <p:spPr/>
+        <p:txBody>
+          <a:bodyPr/>
+          <a:lstStyle/>
+          <a:p>
+            <a:r>
+              <a:rPr lang="en-US" dirty="0"/>
+              <a:t>Create a network</a:t>
+            </a:r>
+          </a:p>
+          <a:p>
+            <a:pPr lvl="1"/>
+            <a:endParaRPr lang="en-US" dirty="0"/>
+          </a:p>
+        </p:txBody>
+      </p:sp>
+      <p:pic>
+        <p:nvPicPr>
+          <p:cNvPr id="5" name="Picture 4">
+            <a:extLst>
+              <a:ext uri="{FF2B5EF4-FFF2-40B4-BE49-F238E27FC236}">
+                <a16:creationId xmlns:a16="http://schemas.microsoft.com/office/drawing/2014/main" id="{F3512451-8804-40AC-8D22-685BDF3B186B}"/>
+              </a:ext>
+            </a:extLst>
+          </p:cNvPr>
+          <p:cNvPicPr>
+            <a:picLocks noChangeAspect="1"/>
+          </p:cNvPicPr>
+          <p:nvPr/>
+        </p:nvPicPr>
+        <p:blipFill>
+          <a:blip r:embed="rId2"/>
+          <a:stretch>
+            <a:fillRect/>
+          </a:stretch>
+        </p:blipFill>
+        <p:spPr>
+          <a:xfrm>
+            <a:off x="1227245" y="2842149"/>
+            <a:ext cx="6381750" cy="1333500"/>
+          </a:xfrm>
+          <a:prstGeom prst="rect">
+            <a:avLst/>
+          </a:prstGeom>
+        </p:spPr>
+      </p:pic>
+    </p:spTree>
+    <p:extLst>
+      <p:ext uri="{BB962C8B-B14F-4D97-AF65-F5344CB8AC3E}">
+        <p14:creationId xmlns:p14="http://schemas.microsoft.com/office/powerpoint/2010/main" val="2057718427"/>
+      </p:ext>
+    </p:extLst>
+  </p:cSld>
+  <p:clrMapOvr>
+    <a:masterClrMapping/>
+  </p:clrMapOvr>
+</p:sld>
+</file>
+
+<file path=ppt/slides/slide34.xml><?xml version="1.0" encoding="utf-8"?>
+<p:sld xmlns:a="http://schemas.openxmlformats.org/drawingml/2006/main" xmlns:r="http://schemas.openxmlformats.org/officeDocument/2006/relationships" xmlns:p="http://schemas.openxmlformats.org/presentationml/2006/main">
+  <p:cSld>
+    <p:spTree>
+      <p:nvGrpSpPr>
+        <p:cNvPr id="1" name=""/>
+        <p:cNvGrpSpPr/>
+        <p:nvPr/>
+      </p:nvGrpSpPr>
+      <p:grpSpPr>
+        <a:xfrm>
+          <a:off x="0" y="0"/>
+          <a:ext cx="0" cy="0"/>
+          <a:chOff x="0" y="0"/>
+          <a:chExt cx="0" cy="0"/>
+        </a:xfrm>
+      </p:grpSpPr>
+      <p:sp>
+        <p:nvSpPr>
+          <p:cNvPr id="2" name="Title 1">
+            <a:extLst>
+              <a:ext uri="{FF2B5EF4-FFF2-40B4-BE49-F238E27FC236}">
+                <a16:creationId xmlns:a16="http://schemas.microsoft.com/office/drawing/2014/main" id="{CDAF1F85-EB65-4973-B3EC-583DD88DB5F4}"/>
+              </a:ext>
+            </a:extLst>
+          </p:cNvPr>
+          <p:cNvSpPr>
+            <a:spLocks noGrp="1"/>
+          </p:cNvSpPr>
+          <p:nvPr>
+            <p:ph type="title"/>
+          </p:nvPr>
+        </p:nvSpPr>
+        <p:spPr/>
+        <p:txBody>
+          <a:bodyPr/>
+          <a:lstStyle/>
+          <a:p>
+            <a:r>
+              <a:rPr lang="en-US" dirty="0"/>
+              <a:t>Connect mosquito with hyacinth</a:t>
+            </a:r>
+          </a:p>
+        </p:txBody>
+      </p:sp>
+      <p:sp>
+        <p:nvSpPr>
+          <p:cNvPr id="3" name="Content Placeholder 2">
+            <a:extLst>
+              <a:ext uri="{FF2B5EF4-FFF2-40B4-BE49-F238E27FC236}">
+                <a16:creationId xmlns:a16="http://schemas.microsoft.com/office/drawing/2014/main" id="{D6F0CB84-D8FB-4A39-9405-79C82EBDE5DC}"/>
+              </a:ext>
+            </a:extLst>
+          </p:cNvPr>
+          <p:cNvSpPr>
+            <a:spLocks noGrp="1"/>
+          </p:cNvSpPr>
+          <p:nvPr>
+            <p:ph sz="quarter" idx="13"/>
+          </p:nvPr>
+        </p:nvSpPr>
+        <p:spPr/>
+        <p:txBody>
+          <a:bodyPr/>
+          <a:lstStyle/>
+          <a:p>
+            <a:r>
+              <a:rPr lang="en-US" dirty="0"/>
+              <a:t>Create a network (cont.)</a:t>
+            </a:r>
+          </a:p>
+        </p:txBody>
+      </p:sp>
+      <p:pic>
+        <p:nvPicPr>
+          <p:cNvPr id="4" name="Picture 3">
+            <a:extLst>
+              <a:ext uri="{FF2B5EF4-FFF2-40B4-BE49-F238E27FC236}">
+                <a16:creationId xmlns:a16="http://schemas.microsoft.com/office/drawing/2014/main" id="{1A824A10-FAAF-45A6-96A8-6FF6697A5656}"/>
+              </a:ext>
+            </a:extLst>
+          </p:cNvPr>
+          <p:cNvPicPr>
+            <a:picLocks noChangeAspect="1"/>
+          </p:cNvPicPr>
+          <p:nvPr/>
+        </p:nvPicPr>
+        <p:blipFill>
+          <a:blip r:embed="rId2"/>
+          <a:stretch>
+            <a:fillRect/>
+          </a:stretch>
+        </p:blipFill>
+        <p:spPr>
+          <a:xfrm>
+            <a:off x="1233996" y="2821502"/>
+            <a:ext cx="5758105" cy="3747974"/>
+          </a:xfrm>
+          <a:prstGeom prst="rect">
+            <a:avLst/>
+          </a:prstGeom>
+        </p:spPr>
+      </p:pic>
+      <p:sp>
+        <p:nvSpPr>
+          <p:cNvPr id="5" name="TextBox 4">
+            <a:extLst>
+              <a:ext uri="{FF2B5EF4-FFF2-40B4-BE49-F238E27FC236}">
+                <a16:creationId xmlns:a16="http://schemas.microsoft.com/office/drawing/2014/main" id="{22B2008B-4337-44F2-84B1-F4E1455E54BF}"/>
+              </a:ext>
+            </a:extLst>
+          </p:cNvPr>
+          <p:cNvSpPr txBox="1"/>
+          <p:nvPr/>
+        </p:nvSpPr>
+        <p:spPr>
+          <a:xfrm>
+            <a:off x="7324078" y="2876365"/>
+            <a:ext cx="4634143" cy="646331"/>
+          </a:xfrm>
+          <a:prstGeom prst="rect">
+            <a:avLst/>
+          </a:prstGeom>
+          <a:noFill/>
+        </p:spPr>
+        <p:txBody>
+          <a:bodyPr wrap="square" rtlCol="0">
+            <a:spAutoFit/>
+          </a:bodyPr>
+          <a:lstStyle/>
+          <a:p>
+            <a:r>
+              <a:rPr lang="en-US" dirty="0"/>
+              <a:t>By default use bridge (docker0), so </a:t>
+            </a:r>
+            <a:r>
+              <a:rPr lang="en-US" dirty="0" err="1"/>
+              <a:t>ip</a:t>
+            </a:r>
+            <a:r>
+              <a:rPr lang="en-US" dirty="0"/>
+              <a:t> </a:t>
+            </a:r>
+            <a:r>
+              <a:rPr lang="en-US" dirty="0" err="1"/>
+              <a:t>addr</a:t>
+            </a:r>
+            <a:r>
+              <a:rPr lang="en-US" dirty="0"/>
+              <a:t> range is 172.17.x.x</a:t>
+            </a:r>
+          </a:p>
+        </p:txBody>
+      </p:sp>
+    </p:spTree>
+    <p:extLst>
+      <p:ext uri="{BB962C8B-B14F-4D97-AF65-F5344CB8AC3E}">
+        <p14:creationId xmlns:p14="http://schemas.microsoft.com/office/powerpoint/2010/main" val="50825471"/>
+      </p:ext>
+    </p:extLst>
+  </p:cSld>
+  <p:clrMapOvr>
+    <a:masterClrMapping/>
+  </p:clrMapOvr>
+</p:sld>
+</file>
+
+<file path=ppt/slides/slide35.xml><?xml version="1.0" encoding="utf-8"?>
+<p:sld xmlns:a="http://schemas.openxmlformats.org/drawingml/2006/main" xmlns:r="http://schemas.openxmlformats.org/officeDocument/2006/relationships" xmlns:p="http://schemas.openxmlformats.org/presentationml/2006/main">
+  <p:cSld>
+    <p:spTree>
+      <p:nvGrpSpPr>
+        <p:cNvPr id="1" name=""/>
+        <p:cNvGrpSpPr/>
+        <p:nvPr/>
+      </p:nvGrpSpPr>
+      <p:grpSpPr>
+        <a:xfrm>
+          <a:off x="0" y="0"/>
+          <a:ext cx="0" cy="0"/>
+          <a:chOff x="0" y="0"/>
+          <a:chExt cx="0" cy="0"/>
+        </a:xfrm>
+      </p:grpSpPr>
+      <p:sp>
+        <p:nvSpPr>
+          <p:cNvPr id="2" name="Title 1">
+            <a:extLst>
+              <a:ext uri="{FF2B5EF4-FFF2-40B4-BE49-F238E27FC236}">
+                <a16:creationId xmlns:a16="http://schemas.microsoft.com/office/drawing/2014/main" id="{1663DBF1-B09B-4D1C-A8E2-41A1819E4DA8}"/>
+              </a:ext>
+            </a:extLst>
+          </p:cNvPr>
+          <p:cNvSpPr>
+            <a:spLocks noGrp="1"/>
+          </p:cNvSpPr>
+          <p:nvPr>
+            <p:ph type="title"/>
+          </p:nvPr>
+        </p:nvSpPr>
+        <p:spPr/>
+        <p:txBody>
+          <a:bodyPr/>
+          <a:lstStyle/>
+          <a:p>
+            <a:r>
+              <a:rPr lang="en-US" dirty="0"/>
+              <a:t>Connect mosquito with hyacinth</a:t>
+            </a:r>
+          </a:p>
+        </p:txBody>
+      </p:sp>
+      <p:sp>
+        <p:nvSpPr>
+          <p:cNvPr id="3" name="Content Placeholder 2">
+            <a:extLst>
+              <a:ext uri="{FF2B5EF4-FFF2-40B4-BE49-F238E27FC236}">
+                <a16:creationId xmlns:a16="http://schemas.microsoft.com/office/drawing/2014/main" id="{BEEFF326-A84D-48CC-B2C4-766F52BCC8E5}"/>
+              </a:ext>
+            </a:extLst>
+          </p:cNvPr>
+          <p:cNvSpPr>
+            <a:spLocks noGrp="1"/>
+          </p:cNvSpPr>
+          <p:nvPr>
+            <p:ph sz="quarter" idx="13"/>
+          </p:nvPr>
+        </p:nvSpPr>
+        <p:spPr/>
+        <p:txBody>
+          <a:bodyPr/>
+          <a:lstStyle/>
+          <a:p>
+            <a:r>
+              <a:rPr lang="en-US" dirty="0"/>
+              <a:t>ASSIGN mosquito container with </a:t>
+            </a:r>
+            <a:r>
+              <a:rPr lang="en-US" dirty="0" err="1"/>
+              <a:t>ip</a:t>
+            </a:r>
+            <a:r>
+              <a:rPr lang="en-US" dirty="0"/>
+              <a:t> </a:t>
+            </a:r>
+            <a:r>
+              <a:rPr lang="en-US" dirty="0" err="1"/>
+              <a:t>addr</a:t>
+            </a:r>
+            <a:endParaRPr lang="en-US" dirty="0"/>
+          </a:p>
+          <a:p>
+            <a:endParaRPr lang="en-US" dirty="0"/>
+          </a:p>
+          <a:p>
+            <a:endParaRPr lang="en-US" dirty="0"/>
+          </a:p>
+          <a:p>
+            <a:endParaRPr lang="en-US" dirty="0"/>
+          </a:p>
+          <a:p>
+            <a:r>
+              <a:rPr lang="en-US" dirty="0"/>
+              <a:t>ASSIGN HYACINTH CONTAINER WITH IP ADDR</a:t>
+            </a:r>
+          </a:p>
+        </p:txBody>
+      </p:sp>
+      <p:pic>
+        <p:nvPicPr>
+          <p:cNvPr id="4" name="Picture 3">
+            <a:extLst>
+              <a:ext uri="{FF2B5EF4-FFF2-40B4-BE49-F238E27FC236}">
+                <a16:creationId xmlns:a16="http://schemas.microsoft.com/office/drawing/2014/main" id="{A6118F67-80B5-4278-833E-E605262058D2}"/>
+              </a:ext>
+            </a:extLst>
+          </p:cNvPr>
+          <p:cNvPicPr>
+            <a:picLocks noChangeAspect="1"/>
+          </p:cNvPicPr>
+          <p:nvPr/>
+        </p:nvPicPr>
+        <p:blipFill>
+          <a:blip r:embed="rId2"/>
+          <a:stretch>
+            <a:fillRect/>
+          </a:stretch>
+        </p:blipFill>
+        <p:spPr>
+          <a:xfrm>
+            <a:off x="494987" y="2914650"/>
+            <a:ext cx="11201400" cy="1028700"/>
+          </a:xfrm>
+          <a:prstGeom prst="rect">
+            <a:avLst/>
+          </a:prstGeom>
+        </p:spPr>
+      </p:pic>
+      <p:pic>
+        <p:nvPicPr>
+          <p:cNvPr id="6" name="Picture 5">
+            <a:extLst>
+              <a:ext uri="{FF2B5EF4-FFF2-40B4-BE49-F238E27FC236}">
+                <a16:creationId xmlns:a16="http://schemas.microsoft.com/office/drawing/2014/main" id="{33623893-6FD7-4F45-9B0D-24576041AB42}"/>
+              </a:ext>
+            </a:extLst>
+          </p:cNvPr>
+          <p:cNvPicPr>
+            <a:picLocks noChangeAspect="1"/>
+          </p:cNvPicPr>
+          <p:nvPr/>
+        </p:nvPicPr>
+        <p:blipFill>
+          <a:blip r:embed="rId3"/>
+          <a:stretch>
+            <a:fillRect/>
+          </a:stretch>
+        </p:blipFill>
+        <p:spPr>
+          <a:xfrm>
+            <a:off x="1020932" y="4796338"/>
+            <a:ext cx="9228348" cy="1989722"/>
+          </a:xfrm>
+          <a:prstGeom prst="rect">
+            <a:avLst/>
+          </a:prstGeom>
+        </p:spPr>
+      </p:pic>
+    </p:spTree>
+    <p:extLst>
+      <p:ext uri="{BB962C8B-B14F-4D97-AF65-F5344CB8AC3E}">
+        <p14:creationId xmlns:p14="http://schemas.microsoft.com/office/powerpoint/2010/main" val="3512213717"/>
+      </p:ext>
+    </p:extLst>
+  </p:cSld>
+  <p:clrMapOvr>
+    <a:masterClrMapping/>
+  </p:clrMapOvr>
+</p:sld>
+</file>
+
+<file path=ppt/slides/slide36.xml><?xml version="1.0" encoding="utf-8"?>
+<p:sld xmlns:a="http://schemas.openxmlformats.org/drawingml/2006/main" xmlns:r="http://schemas.openxmlformats.org/officeDocument/2006/relationships" xmlns:p="http://schemas.openxmlformats.org/presentationml/2006/main">
+  <p:cSld>
+    <p:spTree>
+      <p:nvGrpSpPr>
+        <p:cNvPr id="1" name=""/>
+        <p:cNvGrpSpPr/>
+        <p:nvPr/>
+      </p:nvGrpSpPr>
+      <p:grpSpPr>
+        <a:xfrm>
+          <a:off x="0" y="0"/>
+          <a:ext cx="0" cy="0"/>
+          <a:chOff x="0" y="0"/>
+          <a:chExt cx="0" cy="0"/>
+        </a:xfrm>
+      </p:grpSpPr>
+      <p:sp>
+        <p:nvSpPr>
+          <p:cNvPr id="2" name="Title 1">
+            <a:extLst>
+              <a:ext uri="{FF2B5EF4-FFF2-40B4-BE49-F238E27FC236}">
+                <a16:creationId xmlns:a16="http://schemas.microsoft.com/office/drawing/2014/main" id="{535D73D5-E32D-47E1-88B6-D23B99202AD1}"/>
+              </a:ext>
+            </a:extLst>
+          </p:cNvPr>
+          <p:cNvSpPr>
+            <a:spLocks noGrp="1"/>
+          </p:cNvSpPr>
+          <p:nvPr>
+            <p:ph type="title"/>
+          </p:nvPr>
+        </p:nvSpPr>
+        <p:spPr/>
+        <p:txBody>
+          <a:bodyPr/>
+          <a:lstStyle/>
+          <a:p>
+            <a:r>
+              <a:rPr lang="en-US" dirty="0"/>
+              <a:t>Connect mosquito with hyacinth</a:t>
+            </a:r>
+          </a:p>
+        </p:txBody>
+      </p:sp>
+      <p:sp>
+        <p:nvSpPr>
+          <p:cNvPr id="3" name="Content Placeholder 2">
+            <a:extLst>
+              <a:ext uri="{FF2B5EF4-FFF2-40B4-BE49-F238E27FC236}">
+                <a16:creationId xmlns:a16="http://schemas.microsoft.com/office/drawing/2014/main" id="{7B8682B5-2F0B-4246-8293-57D7C6381127}"/>
+              </a:ext>
+            </a:extLst>
+          </p:cNvPr>
+          <p:cNvSpPr>
+            <a:spLocks noGrp="1"/>
+          </p:cNvSpPr>
+          <p:nvPr>
+            <p:ph sz="quarter" idx="13"/>
+          </p:nvPr>
+        </p:nvSpPr>
+        <p:spPr/>
+        <p:txBody>
+          <a:bodyPr/>
+          <a:lstStyle/>
+          <a:p>
+            <a:r>
+              <a:rPr lang="en-US" dirty="0"/>
+              <a:t>Chang hyacinth </a:t>
+            </a:r>
+            <a:r>
+              <a:rPr lang="en-US" dirty="0" err="1"/>
+              <a:t>ip</a:t>
+            </a:r>
+            <a:r>
+              <a:rPr lang="en-US" dirty="0"/>
+              <a:t> </a:t>
+            </a:r>
+            <a:r>
+              <a:rPr lang="en-US" dirty="0" err="1"/>
+              <a:t>addr</a:t>
+            </a:r>
+            <a:r>
+              <a:rPr lang="en-US" dirty="0"/>
+              <a:t> to connect </a:t>
+            </a:r>
+            <a:r>
+              <a:rPr lang="en-US" dirty="0" err="1"/>
+              <a:t>mosquitto</a:t>
+            </a:r>
+            <a:endParaRPr lang="en-US" dirty="0"/>
+          </a:p>
+        </p:txBody>
+      </p:sp>
+      <p:pic>
+        <p:nvPicPr>
+          <p:cNvPr id="4" name="Picture 3">
+            <a:extLst>
+              <a:ext uri="{FF2B5EF4-FFF2-40B4-BE49-F238E27FC236}">
+                <a16:creationId xmlns:a16="http://schemas.microsoft.com/office/drawing/2014/main" id="{E4746B89-2900-47A4-9B83-93AFC106AB1B}"/>
+              </a:ext>
+            </a:extLst>
+          </p:cNvPr>
+          <p:cNvPicPr>
+            <a:picLocks noChangeAspect="1"/>
+          </p:cNvPicPr>
+          <p:nvPr/>
+        </p:nvPicPr>
+        <p:blipFill>
+          <a:blip r:embed="rId2"/>
+          <a:stretch>
+            <a:fillRect/>
+          </a:stretch>
+        </p:blipFill>
+        <p:spPr>
+          <a:xfrm>
+            <a:off x="1339187" y="2986087"/>
+            <a:ext cx="6353175" cy="885825"/>
+          </a:xfrm>
+          <a:prstGeom prst="rect">
+            <a:avLst/>
+          </a:prstGeom>
+        </p:spPr>
+      </p:pic>
+    </p:spTree>
+    <p:extLst>
+      <p:ext uri="{BB962C8B-B14F-4D97-AF65-F5344CB8AC3E}">
+        <p14:creationId xmlns:p14="http://schemas.microsoft.com/office/powerpoint/2010/main" val="2768604412"/>
+      </p:ext>
+    </p:extLst>
+  </p:cSld>
+  <p:clrMapOvr>
+    <a:masterClrMapping/>
+  </p:clrMapOvr>
+</p:sld>
+</file>
+
+<file path=ppt/slides/slide37.xml><?xml version="1.0" encoding="utf-8"?>
+<p:sld xmlns:a="http://schemas.openxmlformats.org/drawingml/2006/main" xmlns:r="http://schemas.openxmlformats.org/officeDocument/2006/relationships" xmlns:p="http://schemas.openxmlformats.org/presentationml/2006/main">
+  <p:cSld>
+    <p:spTree>
+      <p:nvGrpSpPr>
+        <p:cNvPr id="1" name=""/>
+        <p:cNvGrpSpPr/>
+        <p:nvPr/>
+      </p:nvGrpSpPr>
+      <p:grpSpPr>
+        <a:xfrm>
+          <a:off x="0" y="0"/>
+          <a:ext cx="0" cy="0"/>
+          <a:chOff x="0" y="0"/>
+          <a:chExt cx="0" cy="0"/>
+        </a:xfrm>
+      </p:grpSpPr>
+      <p:sp>
+        <p:nvSpPr>
+          <p:cNvPr id="2" name="Title 1">
+            <a:extLst>
+              <a:ext uri="{FF2B5EF4-FFF2-40B4-BE49-F238E27FC236}">
+                <a16:creationId xmlns:a16="http://schemas.microsoft.com/office/drawing/2014/main" id="{816B830A-E5F6-4EED-B6FC-A72E1496F94B}"/>
+              </a:ext>
+            </a:extLst>
+          </p:cNvPr>
+          <p:cNvSpPr>
+            <a:spLocks noGrp="1"/>
+          </p:cNvSpPr>
+          <p:nvPr>
+            <p:ph type="title"/>
+          </p:nvPr>
+        </p:nvSpPr>
+        <p:spPr/>
+        <p:txBody>
+          <a:bodyPr/>
+          <a:lstStyle/>
+          <a:p>
+            <a:r>
+              <a:rPr lang="en-US" dirty="0"/>
+              <a:t>Connect mosquito with hyacinth</a:t>
+            </a:r>
+          </a:p>
+        </p:txBody>
+      </p:sp>
+      <p:pic>
+        <p:nvPicPr>
+          <p:cNvPr id="4" name="Picture 3">
+            <a:extLst>
+              <a:ext uri="{FF2B5EF4-FFF2-40B4-BE49-F238E27FC236}">
+                <a16:creationId xmlns:a16="http://schemas.microsoft.com/office/drawing/2014/main" id="{ADD32F49-5AE0-4B42-8DAB-72E11750841B}"/>
+              </a:ext>
+            </a:extLst>
+          </p:cNvPr>
+          <p:cNvPicPr>
+            <a:picLocks noChangeAspect="1"/>
+          </p:cNvPicPr>
+          <p:nvPr/>
+        </p:nvPicPr>
+        <p:blipFill>
+          <a:blip r:embed="rId2"/>
+          <a:stretch>
+            <a:fillRect/>
+          </a:stretch>
+        </p:blipFill>
+        <p:spPr>
+          <a:xfrm>
+            <a:off x="557442" y="3972613"/>
+            <a:ext cx="11201400" cy="2190750"/>
+          </a:xfrm>
+          <a:prstGeom prst="rect">
+            <a:avLst/>
+          </a:prstGeom>
+        </p:spPr>
+      </p:pic>
+      <p:pic>
+        <p:nvPicPr>
+          <p:cNvPr id="5" name="Picture 4">
+            <a:extLst>
+              <a:ext uri="{FF2B5EF4-FFF2-40B4-BE49-F238E27FC236}">
+                <a16:creationId xmlns:a16="http://schemas.microsoft.com/office/drawing/2014/main" id="{C3CF7D82-C6E8-48BC-9877-D0D2D0836D4B}"/>
+              </a:ext>
+            </a:extLst>
+          </p:cNvPr>
+          <p:cNvPicPr>
+            <a:picLocks noChangeAspect="1"/>
+          </p:cNvPicPr>
+          <p:nvPr/>
+        </p:nvPicPr>
+        <p:blipFill>
+          <a:blip r:embed="rId3"/>
+          <a:stretch>
+            <a:fillRect/>
+          </a:stretch>
+        </p:blipFill>
+        <p:spPr>
+          <a:xfrm>
+            <a:off x="501587" y="2520575"/>
+            <a:ext cx="11313111" cy="1252689"/>
+          </a:xfrm>
+          <a:prstGeom prst="rect">
+            <a:avLst/>
+          </a:prstGeom>
+        </p:spPr>
+      </p:pic>
+    </p:spTree>
+    <p:extLst>
+      <p:ext uri="{BB962C8B-B14F-4D97-AF65-F5344CB8AC3E}">
+        <p14:creationId xmlns:p14="http://schemas.microsoft.com/office/powerpoint/2010/main" val="3358637050"/>
+      </p:ext>
+    </p:extLst>
+  </p:cSld>
+  <p:clrMapOvr>
+    <a:masterClrMapping/>
+  </p:clrMapOvr>
+</p:sld>
+</file>
+
+<file path=ppt/slides/slide38.xml><?xml version="1.0" encoding="utf-8"?>
+<p:sld xmlns:a="http://schemas.openxmlformats.org/drawingml/2006/main" xmlns:r="http://schemas.openxmlformats.org/officeDocument/2006/relationships" xmlns:p="http://schemas.openxmlformats.org/presentationml/2006/main">
+  <p:cSld>
+    <p:spTree>
+      <p:nvGrpSpPr>
+        <p:cNvPr id="1" name=""/>
+        <p:cNvGrpSpPr/>
+        <p:nvPr/>
+      </p:nvGrpSpPr>
+      <p:grpSpPr>
+        <a:xfrm>
+          <a:off x="0" y="0"/>
+          <a:ext cx="0" cy="0"/>
+          <a:chOff x="0" y="0"/>
+          <a:chExt cx="0" cy="0"/>
+        </a:xfrm>
+      </p:grpSpPr>
+      <p:sp>
+        <p:nvSpPr>
+          <p:cNvPr id="2" name="Title 1">
+            <a:extLst>
+              <a:ext uri="{FF2B5EF4-FFF2-40B4-BE49-F238E27FC236}">
+                <a16:creationId xmlns:a16="http://schemas.microsoft.com/office/drawing/2014/main" id="{2114AAF3-5D61-431F-9F2B-A50E3544B281}"/>
+              </a:ext>
+            </a:extLst>
+          </p:cNvPr>
+          <p:cNvSpPr>
+            <a:spLocks noGrp="1"/>
+          </p:cNvSpPr>
+          <p:nvPr>
+            <p:ph type="title"/>
+          </p:nvPr>
+        </p:nvSpPr>
+        <p:spPr/>
+        <p:txBody>
+          <a:bodyPr/>
+          <a:lstStyle/>
+          <a:p>
+            <a:r>
+              <a:rPr lang="en-US" dirty="0"/>
+              <a:t>Connect mosquito with hyacinth</a:t>
+            </a:r>
+          </a:p>
+        </p:txBody>
+      </p:sp>
+      <p:grpSp>
+        <p:nvGrpSpPr>
+          <p:cNvPr id="20" name="Group 19">
+            <a:extLst>
+              <a:ext uri="{FF2B5EF4-FFF2-40B4-BE49-F238E27FC236}">
+                <a16:creationId xmlns:a16="http://schemas.microsoft.com/office/drawing/2014/main" id="{3AF2BC1F-A80E-4B8D-92F4-09F041B5E66A}"/>
+              </a:ext>
+            </a:extLst>
+          </p:cNvPr>
+          <p:cNvGrpSpPr/>
+          <p:nvPr/>
+        </p:nvGrpSpPr>
+        <p:grpSpPr>
+          <a:xfrm>
+            <a:off x="4751025" y="2463556"/>
+            <a:ext cx="5250225" cy="3448972"/>
+            <a:chOff x="769575" y="2463556"/>
+            <a:chExt cx="5250225" cy="3448972"/>
+          </a:xfrm>
+        </p:grpSpPr>
+        <p:sp>
+          <p:nvSpPr>
+            <p:cNvPr id="6" name="Rectangle 5">
+              <a:extLst>
+                <a:ext uri="{FF2B5EF4-FFF2-40B4-BE49-F238E27FC236}">
+                  <a16:creationId xmlns:a16="http://schemas.microsoft.com/office/drawing/2014/main" id="{1C2F3CAD-F9F7-4148-BB47-DD392E373C6C}"/>
+                </a:ext>
+              </a:extLst>
+            </p:cNvPr>
+            <p:cNvSpPr/>
+            <p:nvPr/>
+          </p:nvSpPr>
+          <p:spPr>
+            <a:xfrm>
+              <a:off x="1242871" y="2463556"/>
+              <a:ext cx="4776929" cy="3448972"/>
+            </a:xfrm>
+            <a:prstGeom prst="rect">
+              <a:avLst/>
+            </a:prstGeom>
+            <a:solidFill>
+              <a:schemeClr val="accent4">
+                <a:lumMod val="60000"/>
+                <a:lumOff val="40000"/>
+              </a:schemeClr>
+            </a:solidFill>
+          </p:spPr>
+          <p:style>
+            <a:lnRef idx="2">
+              <a:schemeClr val="accent1">
+                <a:shade val="50000"/>
+              </a:schemeClr>
+            </a:lnRef>
+            <a:fillRef idx="1">
+              <a:schemeClr val="accent1"/>
+            </a:fillRef>
+            <a:effectRef idx="0">
+              <a:schemeClr val="accent1"/>
+            </a:effectRef>
+            <a:fontRef idx="minor">
+              <a:schemeClr val="lt1"/>
+            </a:fontRef>
+          </p:style>
+          <p:txBody>
+            <a:bodyPr rtlCol="0" anchor="ctr"/>
+            <a:lstStyle/>
+            <a:p>
+              <a:pPr algn="ctr"/>
+              <a:r>
+                <a:rPr lang="en-US" dirty="0"/>
+                <a:t>Host 127.0.0.1</a:t>
+              </a:r>
+            </a:p>
+            <a:p>
+              <a:pPr algn="ctr"/>
+              <a:endParaRPr lang="en-US" dirty="0"/>
+            </a:p>
+            <a:p>
+              <a:pPr algn="ctr"/>
+              <a:endParaRPr lang="en-US" dirty="0"/>
+            </a:p>
+            <a:p>
+              <a:pPr algn="ctr"/>
+              <a:endParaRPr lang="en-US" dirty="0"/>
+            </a:p>
+            <a:p>
+              <a:pPr algn="ctr"/>
+              <a:endParaRPr lang="en-US" dirty="0"/>
+            </a:p>
+            <a:p>
+              <a:pPr algn="ctr"/>
+              <a:endParaRPr lang="en-US" dirty="0"/>
+            </a:p>
+            <a:p>
+              <a:pPr algn="ctr"/>
+              <a:endParaRPr lang="en-US" dirty="0"/>
+            </a:p>
+            <a:p>
+              <a:pPr algn="ctr"/>
+              <a:endParaRPr lang="en-US" dirty="0"/>
+            </a:p>
+            <a:p>
+              <a:pPr algn="ctr"/>
+              <a:endParaRPr lang="en-US" dirty="0"/>
+            </a:p>
+            <a:p>
+              <a:pPr algn="ctr"/>
+              <a:endParaRPr lang="en-US" dirty="0"/>
+            </a:p>
+            <a:p>
+              <a:pPr algn="ctr"/>
+              <a:endParaRPr lang="en-US" dirty="0"/>
+            </a:p>
+          </p:txBody>
+        </p:sp>
+        <p:sp>
+          <p:nvSpPr>
+            <p:cNvPr id="4" name="Rectangle 3">
+              <a:extLst>
+                <a:ext uri="{FF2B5EF4-FFF2-40B4-BE49-F238E27FC236}">
+                  <a16:creationId xmlns:a16="http://schemas.microsoft.com/office/drawing/2014/main" id="{33DAA075-61F6-425E-926F-DD9239EEFE90}"/>
+                </a:ext>
+              </a:extLst>
+            </p:cNvPr>
+            <p:cNvSpPr/>
+            <p:nvPr/>
+          </p:nvSpPr>
+          <p:spPr>
+            <a:xfrm>
+              <a:off x="3485776" y="3265175"/>
+              <a:ext cx="1979720" cy="1116367"/>
+            </a:xfrm>
+            <a:prstGeom prst="rect">
+              <a:avLst/>
+            </a:prstGeom>
+          </p:spPr>
+          <p:style>
+            <a:lnRef idx="2">
+              <a:schemeClr val="accent1">
+                <a:shade val="50000"/>
+              </a:schemeClr>
+            </a:lnRef>
+            <a:fillRef idx="1">
+              <a:schemeClr val="accent1"/>
+            </a:fillRef>
+            <a:effectRef idx="0">
+              <a:schemeClr val="accent1"/>
+            </a:effectRef>
+            <a:fontRef idx="minor">
+              <a:schemeClr val="lt1"/>
+            </a:fontRef>
+          </p:style>
+          <p:txBody>
+            <a:bodyPr rtlCol="0" anchor="ctr"/>
+            <a:lstStyle/>
+            <a:p>
+              <a:pPr algn="ctr"/>
+              <a:r>
+                <a:rPr lang="en-US" dirty="0" err="1"/>
+                <a:t>Mosquitto</a:t>
+              </a:r>
+              <a:r>
+                <a:rPr lang="en-US" dirty="0"/>
+                <a:t> container</a:t>
+              </a:r>
+            </a:p>
+            <a:p>
+              <a:pPr algn="ctr"/>
+              <a:endParaRPr lang="en-US" dirty="0"/>
+            </a:p>
+            <a:p>
+              <a:pPr algn="ctr"/>
+              <a:r>
+                <a:rPr lang="en-US" dirty="0"/>
+                <a:t>172.17.0.2</a:t>
+              </a:r>
+            </a:p>
+            <a:p>
+              <a:pPr algn="ctr"/>
+              <a:endParaRPr lang="en-US" dirty="0"/>
+            </a:p>
+          </p:txBody>
+        </p:sp>
+        <p:sp>
+          <p:nvSpPr>
+            <p:cNvPr id="7" name="Rectangle 6">
+              <a:extLst>
+                <a:ext uri="{FF2B5EF4-FFF2-40B4-BE49-F238E27FC236}">
+                  <a16:creationId xmlns:a16="http://schemas.microsoft.com/office/drawing/2014/main" id="{31278BE7-1919-4F2F-8696-98E1BE9DD867}"/>
+                </a:ext>
+              </a:extLst>
+            </p:cNvPr>
+            <p:cNvSpPr/>
+            <p:nvPr/>
+          </p:nvSpPr>
+          <p:spPr>
+            <a:xfrm>
+              <a:off x="3176351" y="3683537"/>
+              <a:ext cx="743139" cy="363985"/>
+            </a:xfrm>
+            <a:prstGeom prst="rect">
+              <a:avLst/>
+            </a:prstGeom>
+            <a:solidFill>
+              <a:schemeClr val="accent6">
+                <a:lumMod val="75000"/>
+              </a:schemeClr>
+            </a:solidFill>
+          </p:spPr>
+          <p:style>
+            <a:lnRef idx="3">
+              <a:schemeClr val="lt1"/>
+            </a:lnRef>
+            <a:fillRef idx="1">
+              <a:schemeClr val="accent3"/>
+            </a:fillRef>
+            <a:effectRef idx="1">
+              <a:schemeClr val="accent3"/>
+            </a:effectRef>
+            <a:fontRef idx="minor">
+              <a:schemeClr val="lt1"/>
+            </a:fontRef>
+          </p:style>
+          <p:txBody>
+            <a:bodyPr rtlCol="0" anchor="ctr"/>
+            <a:lstStyle/>
+            <a:p>
+              <a:pPr algn="ctr"/>
+              <a:r>
+                <a:rPr lang="en-US" dirty="0"/>
+                <a:t>1883</a:t>
+              </a:r>
+            </a:p>
+          </p:txBody>
+        </p:sp>
+        <p:sp>
+          <p:nvSpPr>
+            <p:cNvPr id="11" name="Rectangle 10">
+              <a:extLst>
+                <a:ext uri="{FF2B5EF4-FFF2-40B4-BE49-F238E27FC236}">
+                  <a16:creationId xmlns:a16="http://schemas.microsoft.com/office/drawing/2014/main" id="{4C0B1844-A629-46F7-AF82-C749A35075D6}"/>
+                </a:ext>
+              </a:extLst>
+            </p:cNvPr>
+            <p:cNvSpPr/>
+            <p:nvPr/>
+          </p:nvSpPr>
+          <p:spPr>
+            <a:xfrm>
+              <a:off x="769575" y="3683537"/>
+              <a:ext cx="743139" cy="363985"/>
+            </a:xfrm>
+            <a:prstGeom prst="rect">
+              <a:avLst/>
+            </a:prstGeom>
+            <a:solidFill>
+              <a:schemeClr val="accent6">
+                <a:lumMod val="75000"/>
+              </a:schemeClr>
+            </a:solidFill>
+          </p:spPr>
+          <p:style>
+            <a:lnRef idx="3">
+              <a:schemeClr val="lt1"/>
+            </a:lnRef>
+            <a:fillRef idx="1">
+              <a:schemeClr val="accent3"/>
+            </a:fillRef>
+            <a:effectRef idx="1">
+              <a:schemeClr val="accent3"/>
+            </a:effectRef>
+            <a:fontRef idx="minor">
+              <a:schemeClr val="lt1"/>
+            </a:fontRef>
+          </p:style>
+          <p:txBody>
+            <a:bodyPr rtlCol="0" anchor="ctr"/>
+            <a:lstStyle/>
+            <a:p>
+              <a:pPr algn="ctr"/>
+              <a:r>
+                <a:rPr lang="en-US" dirty="0"/>
+                <a:t>1883</a:t>
+              </a:r>
+            </a:p>
+          </p:txBody>
+        </p:sp>
+        <p:cxnSp>
+          <p:nvCxnSpPr>
+            <p:cNvPr id="13" name="Straight Arrow Connector 12">
+              <a:extLst>
+                <a:ext uri="{FF2B5EF4-FFF2-40B4-BE49-F238E27FC236}">
+                  <a16:creationId xmlns:a16="http://schemas.microsoft.com/office/drawing/2014/main" id="{96057BA7-9266-4CB7-8CDF-9525F4964DFE}"/>
+                </a:ext>
+              </a:extLst>
+            </p:cNvPr>
+            <p:cNvCxnSpPr>
+              <a:stCxn id="7" idx="1"/>
+              <a:endCxn id="11" idx="3"/>
+            </p:cNvCxnSpPr>
+            <p:nvPr/>
+          </p:nvCxnSpPr>
+          <p:spPr>
+            <a:xfrm flipH="1">
+              <a:off x="1512714" y="3865530"/>
+              <a:ext cx="1663637" cy="0"/>
+            </a:xfrm>
+            <a:prstGeom prst="straightConnector1">
+              <a:avLst/>
+            </a:prstGeom>
+            <a:ln>
+              <a:headEnd type="triangle"/>
+              <a:tailEnd type="triangle"/>
+            </a:ln>
+          </p:spPr>
+          <p:style>
+            <a:lnRef idx="1">
+              <a:schemeClr val="accent1"/>
+            </a:lnRef>
+            <a:fillRef idx="0">
+              <a:schemeClr val="accent1"/>
+            </a:fillRef>
+            <a:effectRef idx="0">
+              <a:schemeClr val="accent1"/>
+            </a:effectRef>
+            <a:fontRef idx="minor">
+              <a:schemeClr val="tx1"/>
+            </a:fontRef>
+          </p:style>
+        </p:cxnSp>
+        <p:sp>
+          <p:nvSpPr>
+            <p:cNvPr id="14" name="Rectangle 13">
+              <a:extLst>
+                <a:ext uri="{FF2B5EF4-FFF2-40B4-BE49-F238E27FC236}">
+                  <a16:creationId xmlns:a16="http://schemas.microsoft.com/office/drawing/2014/main" id="{F08E460E-DB4B-44BB-A4B6-304ABD335F68}"/>
+                </a:ext>
+              </a:extLst>
+            </p:cNvPr>
+            <p:cNvSpPr/>
+            <p:nvPr/>
+          </p:nvSpPr>
+          <p:spPr>
+            <a:xfrm>
+              <a:off x="3485776" y="4624977"/>
+              <a:ext cx="1979720" cy="1116367"/>
+            </a:xfrm>
+            <a:prstGeom prst="rect">
+              <a:avLst/>
+            </a:prstGeom>
+          </p:spPr>
+          <p:style>
+            <a:lnRef idx="2">
+              <a:schemeClr val="accent1">
+                <a:shade val="50000"/>
+              </a:schemeClr>
+            </a:lnRef>
+            <a:fillRef idx="1">
+              <a:schemeClr val="accent1"/>
+            </a:fillRef>
+            <a:effectRef idx="0">
+              <a:schemeClr val="accent1"/>
+            </a:effectRef>
+            <a:fontRef idx="minor">
+              <a:schemeClr val="lt1"/>
+            </a:fontRef>
+          </p:style>
+          <p:txBody>
+            <a:bodyPr rtlCol="0" anchor="ctr"/>
+            <a:lstStyle/>
+            <a:p>
+              <a:pPr algn="ctr"/>
+              <a:r>
+                <a:rPr lang="en-US" dirty="0"/>
+                <a:t>Hyacinth container</a:t>
+              </a:r>
+            </a:p>
+            <a:p>
+              <a:pPr algn="ctr"/>
+              <a:endParaRPr lang="en-US" dirty="0"/>
+            </a:p>
+            <a:p>
+              <a:pPr algn="ctr"/>
+              <a:r>
+                <a:rPr lang="en-US" dirty="0"/>
+                <a:t>172.17.0.3</a:t>
+              </a:r>
+            </a:p>
+            <a:p>
+              <a:pPr algn="ctr"/>
+              <a:endParaRPr lang="en-US" dirty="0"/>
+            </a:p>
+          </p:txBody>
+        </p:sp>
+        <p:cxnSp>
+          <p:nvCxnSpPr>
+            <p:cNvPr id="16" name="Straight Connector 15">
+              <a:extLst>
+                <a:ext uri="{FF2B5EF4-FFF2-40B4-BE49-F238E27FC236}">
+                  <a16:creationId xmlns:a16="http://schemas.microsoft.com/office/drawing/2014/main" id="{FB7CFC78-84C1-4057-840F-D6825F5FF05D}"/>
+                </a:ext>
+              </a:extLst>
+            </p:cNvPr>
+            <p:cNvCxnSpPr/>
+            <p:nvPr/>
+          </p:nvCxnSpPr>
+          <p:spPr>
+            <a:xfrm>
+              <a:off x="2382175" y="3865529"/>
+              <a:ext cx="0" cy="1317632"/>
+            </a:xfrm>
+            <a:prstGeom prst="line">
+              <a:avLst/>
+            </a:prstGeom>
+          </p:spPr>
+          <p:style>
+            <a:lnRef idx="1">
+              <a:schemeClr val="accent1"/>
+            </a:lnRef>
+            <a:fillRef idx="0">
+              <a:schemeClr val="accent1"/>
+            </a:fillRef>
+            <a:effectRef idx="0">
+              <a:schemeClr val="accent1"/>
+            </a:effectRef>
+            <a:fontRef idx="minor">
+              <a:schemeClr val="tx1"/>
+            </a:fontRef>
+          </p:style>
+        </p:cxnSp>
+        <p:sp>
+          <p:nvSpPr>
+            <p:cNvPr id="17" name="Rectangle 16">
+              <a:extLst>
+                <a:ext uri="{FF2B5EF4-FFF2-40B4-BE49-F238E27FC236}">
+                  <a16:creationId xmlns:a16="http://schemas.microsoft.com/office/drawing/2014/main" id="{90AFAE3B-BD9A-4675-AFBE-6EFA97B66D2A}"/>
+                </a:ext>
+              </a:extLst>
+            </p:cNvPr>
+            <p:cNvSpPr/>
+            <p:nvPr/>
+          </p:nvSpPr>
+          <p:spPr>
+            <a:xfrm>
+              <a:off x="3176350" y="5001167"/>
+              <a:ext cx="743139" cy="363985"/>
+            </a:xfrm>
+            <a:prstGeom prst="rect">
+              <a:avLst/>
+            </a:prstGeom>
+            <a:solidFill>
+              <a:srgbClr val="92D050"/>
+            </a:solidFill>
+          </p:spPr>
+          <p:style>
+            <a:lnRef idx="3">
+              <a:schemeClr val="lt1"/>
+            </a:lnRef>
+            <a:fillRef idx="1">
+              <a:schemeClr val="accent3"/>
+            </a:fillRef>
+            <a:effectRef idx="1">
+              <a:schemeClr val="accent3"/>
+            </a:effectRef>
+            <a:fontRef idx="minor">
+              <a:schemeClr val="lt1"/>
+            </a:fontRef>
+          </p:style>
+          <p:txBody>
+            <a:bodyPr rtlCol="0" anchor="ctr"/>
+            <a:lstStyle/>
+            <a:p>
+              <a:pPr algn="ctr"/>
+              <a:r>
+                <a:rPr lang="en-US" dirty="0"/>
+                <a:t>client</a:t>
+              </a:r>
+            </a:p>
+          </p:txBody>
+        </p:sp>
+        <p:cxnSp>
+          <p:nvCxnSpPr>
+            <p:cNvPr id="19" name="Straight Arrow Connector 18">
+              <a:extLst>
+                <a:ext uri="{FF2B5EF4-FFF2-40B4-BE49-F238E27FC236}">
+                  <a16:creationId xmlns:a16="http://schemas.microsoft.com/office/drawing/2014/main" id="{FE1CAB48-489A-422C-B947-C36617B354CF}"/>
+                </a:ext>
+              </a:extLst>
+            </p:cNvPr>
+            <p:cNvCxnSpPr>
+              <a:cxnSpLocks/>
+            </p:cNvCxnSpPr>
+            <p:nvPr/>
+          </p:nvCxnSpPr>
+          <p:spPr>
+            <a:xfrm>
+              <a:off x="2382175" y="5183160"/>
+              <a:ext cx="794176" cy="0"/>
+            </a:xfrm>
+            <a:prstGeom prst="straightConnector1">
+              <a:avLst/>
+            </a:prstGeom>
+            <a:ln>
+              <a:tailEnd type="triangle"/>
+            </a:ln>
+          </p:spPr>
+          <p:style>
+            <a:lnRef idx="1">
+              <a:schemeClr val="accent1"/>
+            </a:lnRef>
+            <a:fillRef idx="0">
+              <a:schemeClr val="accent1"/>
+            </a:fillRef>
+            <a:effectRef idx="0">
+              <a:schemeClr val="accent1"/>
+            </a:effectRef>
+            <a:fontRef idx="minor">
+              <a:schemeClr val="tx1"/>
+            </a:fontRef>
+          </p:style>
+        </p:cxnSp>
+      </p:grpSp>
+      <p:sp>
+        <p:nvSpPr>
+          <p:cNvPr id="21" name="Rectangle 20">
+            <a:extLst>
+              <a:ext uri="{FF2B5EF4-FFF2-40B4-BE49-F238E27FC236}">
+                <a16:creationId xmlns:a16="http://schemas.microsoft.com/office/drawing/2014/main" id="{C9B36952-D970-4DA8-B695-14B1058C6528}"/>
+              </a:ext>
+            </a:extLst>
+          </p:cNvPr>
+          <p:cNvSpPr/>
+          <p:nvPr/>
+        </p:nvSpPr>
+        <p:spPr>
+          <a:xfrm>
+            <a:off x="1784774" y="3307345"/>
+            <a:ext cx="1979720" cy="1116367"/>
+          </a:xfrm>
+          <a:prstGeom prst="rect">
+            <a:avLst/>
+          </a:prstGeom>
         </p:spPr>
         <p:style>
           <a:lnRef idx="2">
@@ -8076,7 +10900,7 @@
             <a:pPr algn="ctr"/>
             <a:r>
               <a:rPr lang="en-US" dirty="0"/>
-              <a:t>Host</a:t>
+              <a:t>MQTT Lens</a:t>
             </a:r>
           </a:p>
           <a:p>
@@ -8090,274 +10914,33 @@
           <a:p>
             <a:pPr algn="ctr"/>
             <a:endParaRPr lang="en-US" dirty="0"/>
-          </a:p>
-          <a:p>
-            <a:pPr algn="ctr"/>
-            <a:endParaRPr lang="en-US" dirty="0"/>
-          </a:p>
-          <a:p>
-            <a:pPr algn="ctr"/>
-            <a:endParaRPr lang="en-US" dirty="0"/>
-          </a:p>
-          <a:p>
-            <a:pPr algn="ctr"/>
-            <a:endParaRPr lang="en-US" dirty="0"/>
-          </a:p>
-        </p:txBody>
-      </p:sp>
-      <p:sp>
-        <p:nvSpPr>
-          <p:cNvPr id="2" name="Title 1">
-            <a:extLst>
-              <a:ext uri="{FF2B5EF4-FFF2-40B4-BE49-F238E27FC236}">
-                <a16:creationId xmlns:a16="http://schemas.microsoft.com/office/drawing/2014/main" id="{2114AAF3-5D61-431F-9F2B-A50E3544B281}"/>
-              </a:ext>
-            </a:extLst>
-          </p:cNvPr>
-          <p:cNvSpPr>
-            <a:spLocks noGrp="1"/>
-          </p:cNvSpPr>
-          <p:nvPr>
-            <p:ph type="title"/>
-          </p:nvPr>
-        </p:nvSpPr>
-        <p:spPr/>
-        <p:txBody>
-          <a:bodyPr/>
-          <a:lstStyle/>
-          <a:p>
-            <a:r>
-              <a:rPr lang="en-US" dirty="0"/>
-              <a:t>Assign port</a:t>
-            </a:r>
-          </a:p>
-        </p:txBody>
-      </p:sp>
-      <p:sp>
-        <p:nvSpPr>
-          <p:cNvPr id="3" name="Content Placeholder 2">
-            <a:extLst>
-              <a:ext uri="{FF2B5EF4-FFF2-40B4-BE49-F238E27FC236}">
-                <a16:creationId xmlns:a16="http://schemas.microsoft.com/office/drawing/2014/main" id="{32F415E3-D964-4CE1-A2E3-7AA0BE11D0A4}"/>
-              </a:ext>
-            </a:extLst>
-          </p:cNvPr>
-          <p:cNvSpPr>
-            <a:spLocks noGrp="1"/>
-          </p:cNvSpPr>
-          <p:nvPr>
-            <p:ph sz="quarter" idx="13"/>
-          </p:nvPr>
-        </p:nvSpPr>
-        <p:spPr/>
-        <p:txBody>
-          <a:bodyPr/>
-          <a:lstStyle/>
-          <a:p>
-            <a:r>
-              <a:rPr lang="en-US" dirty="0" err="1"/>
-              <a:t>Mqtt</a:t>
-            </a:r>
-            <a:r>
-              <a:rPr lang="en-US" dirty="0"/>
-              <a:t> default port is 1883</a:t>
-            </a:r>
-          </a:p>
-          <a:p>
-            <a:pPr lvl="1"/>
-            <a:r>
-              <a:rPr lang="en-US" dirty="0"/>
-              <a:t>Host </a:t>
-            </a:r>
-            <a:r>
-              <a:rPr lang="en-US" dirty="0" err="1"/>
-              <a:t>mqtt</a:t>
-            </a:r>
-            <a:r>
-              <a:rPr lang="en-US" dirty="0"/>
-              <a:t> default </a:t>
-            </a:r>
-            <a:r>
-              <a:rPr lang="en-US"/>
-              <a:t>port is 1883</a:t>
-            </a:r>
-            <a:endParaRPr lang="en-US" dirty="0"/>
-          </a:p>
-        </p:txBody>
-      </p:sp>
-      <p:sp>
-        <p:nvSpPr>
-          <p:cNvPr id="4" name="Rectangle 3">
-            <a:extLst>
-              <a:ext uri="{FF2B5EF4-FFF2-40B4-BE49-F238E27FC236}">
-                <a16:creationId xmlns:a16="http://schemas.microsoft.com/office/drawing/2014/main" id="{33DAA075-61F6-425E-926F-DD9239EEFE90}"/>
-              </a:ext>
-            </a:extLst>
-          </p:cNvPr>
-          <p:cNvSpPr/>
-          <p:nvPr/>
-        </p:nvSpPr>
-        <p:spPr>
-          <a:xfrm>
-            <a:off x="2228295" y="3987183"/>
-            <a:ext cx="1979720" cy="1116367"/>
-          </a:xfrm>
-          <a:prstGeom prst="rect">
-            <a:avLst/>
-          </a:prstGeom>
-        </p:spPr>
-        <p:style>
-          <a:lnRef idx="2">
-            <a:schemeClr val="accent1">
-              <a:shade val="50000"/>
-            </a:schemeClr>
-          </a:lnRef>
-          <a:fillRef idx="1">
-            <a:schemeClr val="accent1"/>
-          </a:fillRef>
-          <a:effectRef idx="0">
-            <a:schemeClr val="accent1"/>
-          </a:effectRef>
-          <a:fontRef idx="minor">
-            <a:schemeClr val="lt1"/>
-          </a:fontRef>
-        </p:style>
-        <p:txBody>
-          <a:bodyPr rtlCol="0" anchor="ctr"/>
-          <a:lstStyle/>
-          <a:p>
-            <a:pPr algn="ctr"/>
-            <a:r>
-              <a:rPr lang="en-US" dirty="0"/>
-              <a:t>container</a:t>
-            </a:r>
-          </a:p>
-        </p:txBody>
-      </p:sp>
-      <p:sp>
-        <p:nvSpPr>
-          <p:cNvPr id="5" name="Rectangle 4">
-            <a:extLst>
-              <a:ext uri="{FF2B5EF4-FFF2-40B4-BE49-F238E27FC236}">
-                <a16:creationId xmlns:a16="http://schemas.microsoft.com/office/drawing/2014/main" id="{7476597E-BEEB-4C03-B2CA-D1290DC8AEB5}"/>
-              </a:ext>
-            </a:extLst>
-          </p:cNvPr>
-          <p:cNvSpPr/>
-          <p:nvPr/>
-        </p:nvSpPr>
-        <p:spPr>
-          <a:xfrm>
-            <a:off x="3762278" y="4394445"/>
-            <a:ext cx="743139" cy="363985"/>
-          </a:xfrm>
-          <a:prstGeom prst="rect">
-            <a:avLst/>
-          </a:prstGeom>
-        </p:spPr>
-        <p:style>
-          <a:lnRef idx="3">
-            <a:schemeClr val="lt1"/>
-          </a:lnRef>
-          <a:fillRef idx="1">
-            <a:schemeClr val="accent3"/>
-          </a:fillRef>
-          <a:effectRef idx="1">
-            <a:schemeClr val="accent3"/>
-          </a:effectRef>
-          <a:fontRef idx="minor">
-            <a:schemeClr val="lt1"/>
-          </a:fontRef>
-        </p:style>
-        <p:txBody>
-          <a:bodyPr rtlCol="0" anchor="ctr"/>
-          <a:lstStyle/>
-          <a:p>
-            <a:pPr algn="ctr"/>
-            <a:r>
-              <a:rPr lang="en-US" dirty="0"/>
-              <a:t>client</a:t>
-            </a:r>
-          </a:p>
-        </p:txBody>
-      </p:sp>
-      <p:sp>
-        <p:nvSpPr>
-          <p:cNvPr id="7" name="Rectangle 6">
-            <a:extLst>
-              <a:ext uri="{FF2B5EF4-FFF2-40B4-BE49-F238E27FC236}">
-                <a16:creationId xmlns:a16="http://schemas.microsoft.com/office/drawing/2014/main" id="{31278BE7-1919-4F2F-8696-98E1BE9DD867}"/>
-              </a:ext>
-            </a:extLst>
-          </p:cNvPr>
-          <p:cNvSpPr/>
-          <p:nvPr/>
-        </p:nvSpPr>
-        <p:spPr>
-          <a:xfrm>
-            <a:off x="4857560" y="4394444"/>
-            <a:ext cx="743139" cy="363985"/>
-          </a:xfrm>
-          <a:prstGeom prst="rect">
-            <a:avLst/>
-          </a:prstGeom>
-          <a:solidFill>
-            <a:schemeClr val="accent6">
-              <a:lumMod val="75000"/>
-            </a:schemeClr>
-          </a:solidFill>
-        </p:spPr>
-        <p:style>
-          <a:lnRef idx="3">
-            <a:schemeClr val="lt1"/>
-          </a:lnRef>
-          <a:fillRef idx="1">
-            <a:schemeClr val="accent3"/>
-          </a:fillRef>
-          <a:effectRef idx="1">
-            <a:schemeClr val="accent3"/>
-          </a:effectRef>
-          <a:fontRef idx="minor">
-            <a:schemeClr val="lt1"/>
-          </a:fontRef>
-        </p:style>
-        <p:txBody>
-          <a:bodyPr rtlCol="0" anchor="ctr"/>
-          <a:lstStyle/>
-          <a:p>
-            <a:pPr algn="ctr"/>
-            <a:r>
-              <a:rPr lang="en-US" dirty="0"/>
-              <a:t>1883</a:t>
-            </a:r>
           </a:p>
         </p:txBody>
       </p:sp>
       <p:cxnSp>
         <p:nvCxnSpPr>
-          <p:cNvPr id="9" name="Straight Arrow Connector 8">
-            <a:extLst>
-              <a:ext uri="{FF2B5EF4-FFF2-40B4-BE49-F238E27FC236}">
-                <a16:creationId xmlns:a16="http://schemas.microsoft.com/office/drawing/2014/main" id="{F6B8AD03-ED2F-4EEA-AF8D-D442C3E1FDA4}"/>
+          <p:cNvPr id="23" name="Straight Arrow Connector 22">
+            <a:extLst>
+              <a:ext uri="{FF2B5EF4-FFF2-40B4-BE49-F238E27FC236}">
+                <a16:creationId xmlns:a16="http://schemas.microsoft.com/office/drawing/2014/main" id="{FE29EA7D-5460-4AB9-B60E-94B225308278}"/>
               </a:ext>
             </a:extLst>
           </p:cNvPr>
           <p:cNvCxnSpPr>
-            <a:cxnSpLocks/>
-            <a:stCxn id="5" idx="3"/>
+            <a:stCxn id="11" idx="1"/>
+            <a:endCxn id="21" idx="3"/>
           </p:cNvCxnSpPr>
           <p:nvPr/>
         </p:nvCxnSpPr>
         <p:spPr>
-          <a:xfrm flipV="1">
-            <a:off x="4505417" y="4576436"/>
-            <a:ext cx="352144" cy="2"/>
+          <a:xfrm flipH="1" flipV="1">
+            <a:off x="3764494" y="3865529"/>
+            <a:ext cx="986531" cy="1"/>
           </a:xfrm>
           <a:prstGeom prst="straightConnector1">
             <a:avLst/>
           </a:prstGeom>
           <a:ln>
-            <a:headEnd type="triangle"/>
             <a:tailEnd type="triangle"/>
           </a:ln>
         </p:spPr>
@@ -8389,7 +10972,7 @@
 </p:sld>
 </file>
 
-<file path=ppt/slides/slide24.xml><?xml version="1.0" encoding="utf-8"?>
+<file path=ppt/slides/slide39.xml><?xml version="1.0" encoding="utf-8"?>
 <p:sld xmlns:a="http://schemas.openxmlformats.org/drawingml/2006/main" xmlns:r="http://schemas.openxmlformats.org/officeDocument/2006/relationships" xmlns:p="http://schemas.openxmlformats.org/presentationml/2006/main">
   <p:cSld>
     <p:spTree>
@@ -8411,106 +10994,6 @@
           <p:cNvPr id="2" name="Title 1">
             <a:extLst>
               <a:ext uri="{FF2B5EF4-FFF2-40B4-BE49-F238E27FC236}">
-                <a16:creationId xmlns:a16="http://schemas.microsoft.com/office/drawing/2014/main" id="{2610DD2F-01B3-45F9-A18D-583CA347B1BF}"/>
-              </a:ext>
-            </a:extLst>
-          </p:cNvPr>
-          <p:cNvSpPr>
-            <a:spLocks noGrp="1"/>
-          </p:cNvSpPr>
-          <p:nvPr>
-            <p:ph type="title"/>
-          </p:nvPr>
-        </p:nvSpPr>
-        <p:spPr/>
-        <p:txBody>
-          <a:bodyPr/>
-          <a:lstStyle/>
-          <a:p>
-            <a:r>
-              <a:rPr lang="en-US" dirty="0"/>
-              <a:t>Use docker file create image</a:t>
-            </a:r>
-          </a:p>
-        </p:txBody>
-      </p:sp>
-      <p:sp>
-        <p:nvSpPr>
-          <p:cNvPr id="3" name="Content Placeholder 2">
-            <a:extLst>
-              <a:ext uri="{FF2B5EF4-FFF2-40B4-BE49-F238E27FC236}">
-                <a16:creationId xmlns:a16="http://schemas.microsoft.com/office/drawing/2014/main" id="{D693EB38-8364-40D6-A27A-A20686730EF4}"/>
-              </a:ext>
-            </a:extLst>
-          </p:cNvPr>
-          <p:cNvSpPr>
-            <a:spLocks noGrp="1"/>
-          </p:cNvSpPr>
-          <p:nvPr>
-            <p:ph sz="quarter" idx="13"/>
-          </p:nvPr>
-        </p:nvSpPr>
-        <p:spPr/>
-        <p:txBody>
-          <a:bodyPr/>
-          <a:lstStyle/>
-          <a:p>
-            <a:r>
-              <a:rPr lang="en-US" dirty="0"/>
-              <a:t>Multi-stage build</a:t>
-            </a:r>
-          </a:p>
-          <a:p>
-            <a:pPr lvl="1"/>
-            <a:r>
-              <a:rPr lang="en-US" dirty="0"/>
-              <a:t>Build stage docker image</a:t>
-            </a:r>
-          </a:p>
-          <a:p>
-            <a:pPr lvl="1"/>
-            <a:r>
-              <a:rPr lang="en-US" dirty="0"/>
-              <a:t>Run-time stage docker image</a:t>
-            </a:r>
-          </a:p>
-        </p:txBody>
-      </p:sp>
-    </p:spTree>
-    <p:extLst>
-      <p:ext uri="{BB962C8B-B14F-4D97-AF65-F5344CB8AC3E}">
-        <p14:creationId xmlns:p14="http://schemas.microsoft.com/office/powerpoint/2010/main" val="2091007274"/>
-      </p:ext>
-    </p:extLst>
-  </p:cSld>
-  <p:clrMapOvr>
-    <a:masterClrMapping/>
-  </p:clrMapOvr>
-</p:sld>
-</file>
-
-<file path=ppt/slides/slide25.xml><?xml version="1.0" encoding="utf-8"?>
-<p:sld xmlns:a="http://schemas.openxmlformats.org/drawingml/2006/main" xmlns:r="http://schemas.openxmlformats.org/officeDocument/2006/relationships" xmlns:p="http://schemas.openxmlformats.org/presentationml/2006/main">
-  <p:cSld>
-    <p:spTree>
-      <p:nvGrpSpPr>
-        <p:cNvPr id="1" name=""/>
-        <p:cNvGrpSpPr/>
-        <p:nvPr/>
-      </p:nvGrpSpPr>
-      <p:grpSpPr>
-        <a:xfrm>
-          <a:off x="0" y="0"/>
-          <a:ext cx="0" cy="0"/>
-          <a:chOff x="0" y="0"/>
-          <a:chExt cx="0" cy="0"/>
-        </a:xfrm>
-      </p:grpSpPr>
-      <p:sp>
-        <p:nvSpPr>
-          <p:cNvPr id="2" name="Title 1">
-            <a:extLst>
-              <a:ext uri="{FF2B5EF4-FFF2-40B4-BE49-F238E27FC236}">
                 <a16:creationId xmlns:a16="http://schemas.microsoft.com/office/drawing/2014/main" id="{6EE111B4-E6ED-4BEF-95A2-BE2F4EC7B7B6}"/>
               </a:ext>
             </a:extLst>
@@ -8600,97 +11083,6 @@
     <p:extLst>
       <p:ext uri="{BB962C8B-B14F-4D97-AF65-F5344CB8AC3E}">
         <p14:creationId xmlns:p14="http://schemas.microsoft.com/office/powerpoint/2010/main" val="2286989010"/>
-      </p:ext>
-    </p:extLst>
-  </p:cSld>
-  <p:clrMapOvr>
-    <a:masterClrMapping/>
-  </p:clrMapOvr>
-</p:sld>
-</file>
-
-<file path=ppt/slides/slide3.xml><?xml version="1.0" encoding="utf-8"?>
-<p:sld xmlns:a="http://schemas.openxmlformats.org/drawingml/2006/main" xmlns:r="http://schemas.openxmlformats.org/officeDocument/2006/relationships" xmlns:p="http://schemas.openxmlformats.org/presentationml/2006/main">
-  <p:cSld>
-    <p:spTree>
-      <p:nvGrpSpPr>
-        <p:cNvPr id="1" name=""/>
-        <p:cNvGrpSpPr/>
-        <p:nvPr/>
-      </p:nvGrpSpPr>
-      <p:grpSpPr>
-        <a:xfrm>
-          <a:off x="0" y="0"/>
-          <a:ext cx="0" cy="0"/>
-          <a:chOff x="0" y="0"/>
-          <a:chExt cx="0" cy="0"/>
-        </a:xfrm>
-      </p:grpSpPr>
-      <p:sp>
-        <p:nvSpPr>
-          <p:cNvPr id="2" name="Title 1">
-            <a:extLst>
-              <a:ext uri="{FF2B5EF4-FFF2-40B4-BE49-F238E27FC236}">
-                <a16:creationId xmlns:a16="http://schemas.microsoft.com/office/drawing/2014/main" id="{A03B639C-C4F4-483A-A142-2DE674AF5ABA}"/>
-              </a:ext>
-            </a:extLst>
-          </p:cNvPr>
-          <p:cNvSpPr>
-            <a:spLocks noGrp="1"/>
-          </p:cNvSpPr>
-          <p:nvPr>
-            <p:ph type="title"/>
-          </p:nvPr>
-        </p:nvSpPr>
-        <p:spPr/>
-        <p:txBody>
-          <a:bodyPr/>
-          <a:lstStyle/>
-          <a:p>
-            <a:r>
-              <a:rPr lang="en-US" dirty="0"/>
-              <a:t>install</a:t>
-            </a:r>
-          </a:p>
-        </p:txBody>
-      </p:sp>
-      <p:sp>
-        <p:nvSpPr>
-          <p:cNvPr id="3" name="Content Placeholder 2">
-            <a:extLst>
-              <a:ext uri="{FF2B5EF4-FFF2-40B4-BE49-F238E27FC236}">
-                <a16:creationId xmlns:a16="http://schemas.microsoft.com/office/drawing/2014/main" id="{309479CE-6559-4E3D-BF09-C777B9B509BD}"/>
-              </a:ext>
-            </a:extLst>
-          </p:cNvPr>
-          <p:cNvSpPr>
-            <a:spLocks noGrp="1"/>
-          </p:cNvSpPr>
-          <p:nvPr>
-            <p:ph sz="quarter" idx="13"/>
-          </p:nvPr>
-        </p:nvSpPr>
-        <p:spPr/>
-        <p:txBody>
-          <a:bodyPr/>
-          <a:lstStyle/>
-          <a:p>
-            <a:r>
-              <a:rPr lang="en-US" dirty="0"/>
-              <a:t>Ubuntu 16 </a:t>
-            </a:r>
-            <a:r>
-              <a:rPr lang="en-US" dirty="0" err="1"/>
-              <a:t>lts</a:t>
-            </a:r>
-            <a:endParaRPr lang="en-US" dirty="0"/>
-          </a:p>
-        </p:txBody>
-      </p:sp>
-    </p:spTree>
-    <p:extLst>
-      <p:ext uri="{BB962C8B-B14F-4D97-AF65-F5344CB8AC3E}">
-        <p14:creationId xmlns:p14="http://schemas.microsoft.com/office/powerpoint/2010/main" val="1869058991"/>
       </p:ext>
     </p:extLst>
   </p:cSld>
@@ -8765,6 +11157,12 @@
         <p:txBody>
           <a:bodyPr/>
           <a:lstStyle/>
+          <a:p>
+            <a:r>
+              <a:rPr lang="en-US" dirty="0"/>
+              <a:t>ubuntu</a:t>
+            </a:r>
+          </a:p>
           <a:p>
             <a:r>
               <a:rPr lang="en-US" dirty="0"/>

</xml_diff>

<commit_message>
Add Redis and node docker
Signed-off-by: Liu Haixiang <haixiang1977@gmail.com>
</commit_message>
<xml_diff>
--- a/Docker Practice.pptx
+++ b/Docker Practice.pptx
@@ -43,7 +43,9 @@
     <p:sldId id="294" r:id="rId37"/>
     <p:sldId id="295" r:id="rId38"/>
     <p:sldId id="280" r:id="rId39"/>
-    <p:sldId id="265" r:id="rId40"/>
+    <p:sldId id="296" r:id="rId40"/>
+    <p:sldId id="297" r:id="rId41"/>
+    <p:sldId id="265" r:id="rId42"/>
   </p:sldIdLst>
   <p:sldSz cx="12192000" cy="6858000"/>
   <p:notesSz cx="6858000" cy="9144000"/>
@@ -185,6 +187,8 @@
             <p14:sldId id="294"/>
             <p14:sldId id="295"/>
             <p14:sldId id="280"/>
+            <p14:sldId id="296"/>
+            <p14:sldId id="297"/>
             <p14:sldId id="265"/>
           </p14:sldIdLst>
         </p14:section>
@@ -10994,7 +10998,7 @@
           <p:cNvPr id="2" name="Title 1">
             <a:extLst>
               <a:ext uri="{FF2B5EF4-FFF2-40B4-BE49-F238E27FC236}">
-                <a16:creationId xmlns:a16="http://schemas.microsoft.com/office/drawing/2014/main" id="{6EE111B4-E6ED-4BEF-95A2-BE2F4EC7B7B6}"/>
+                <a16:creationId xmlns:a16="http://schemas.microsoft.com/office/drawing/2014/main" id="{240989F2-475D-486F-B226-E0DA76CDEAEF}"/>
               </a:ext>
             </a:extLst>
           </p:cNvPr>
@@ -11012,56 +11016,34 @@
           <a:p>
             <a:r>
               <a:rPr lang="en-US" dirty="0"/>
-              <a:t>search alpine image</a:t>
-            </a:r>
-          </a:p>
-        </p:txBody>
-      </p:sp>
-      <p:sp>
-        <p:nvSpPr>
-          <p:cNvPr id="3" name="Content Placeholder 2">
-            <a:extLst>
-              <a:ext uri="{FF2B5EF4-FFF2-40B4-BE49-F238E27FC236}">
-                <a16:creationId xmlns:a16="http://schemas.microsoft.com/office/drawing/2014/main" id="{6DA82F44-40AA-4077-914B-E895EC72259C}"/>
-              </a:ext>
-            </a:extLst>
-          </p:cNvPr>
-          <p:cNvSpPr>
-            <a:spLocks noGrp="1"/>
-          </p:cNvSpPr>
-          <p:nvPr>
-            <p:ph sz="quarter" idx="13"/>
-          </p:nvPr>
-        </p:nvSpPr>
-        <p:spPr/>
-        <p:txBody>
-          <a:bodyPr/>
-          <a:lstStyle/>
-          <a:p>
+              <a:t>Install </a:t>
+            </a:r>
             <a:r>
               <a:rPr lang="en-US" dirty="0" err="1"/>
-              <a:t>sudo</a:t>
-            </a:r>
-            <a:r>
-              <a:rPr lang="en-US" dirty="0"/>
-              <a:t> docker search alpine</a:t>
+              <a:t>redis</a:t>
+            </a:r>
+            <a:r>
+              <a:rPr lang="en-US" dirty="0"/>
+              <a:t> and node docker</a:t>
             </a:r>
           </a:p>
         </p:txBody>
       </p:sp>
       <p:pic>
         <p:nvPicPr>
-          <p:cNvPr id="4" name="Picture 3">
-            <a:extLst>
-              <a:ext uri="{FF2B5EF4-FFF2-40B4-BE49-F238E27FC236}">
-                <a16:creationId xmlns:a16="http://schemas.microsoft.com/office/drawing/2014/main" id="{F4DA52F7-9BF1-4F79-800B-4D374B5C321E}"/>
+          <p:cNvPr id="4" name="Content Placeholder 3">
+            <a:extLst>
+              <a:ext uri="{FF2B5EF4-FFF2-40B4-BE49-F238E27FC236}">
+                <a16:creationId xmlns:a16="http://schemas.microsoft.com/office/drawing/2014/main" id="{2463090E-6F31-4A37-AC9D-1A01057DC78D}"/>
               </a:ext>
             </a:extLst>
           </p:cNvPr>
           <p:cNvPicPr>
-            <a:picLocks noChangeAspect="1"/>
+            <a:picLocks noGrp="1" noChangeAspect="1"/>
           </p:cNvPicPr>
-          <p:nvPr/>
+          <p:nvPr>
+            <p:ph sz="quarter" idx="13"/>
+          </p:nvPr>
         </p:nvPicPr>
         <p:blipFill>
           <a:blip r:embed="rId2"/>
@@ -11071,8 +11053,68 @@
         </p:blipFill>
         <p:spPr>
           <a:xfrm>
-            <a:off x="1189608" y="2834807"/>
-            <a:ext cx="9502066" cy="3911396"/>
+            <a:off x="1004887" y="2312194"/>
+            <a:ext cx="4162425" cy="561975"/>
+          </a:xfrm>
+          <a:prstGeom prst="rect">
+            <a:avLst/>
+          </a:prstGeom>
+        </p:spPr>
+      </p:pic>
+      <p:pic>
+        <p:nvPicPr>
+          <p:cNvPr id="5" name="Picture 4">
+            <a:extLst>
+              <a:ext uri="{FF2B5EF4-FFF2-40B4-BE49-F238E27FC236}">
+                <a16:creationId xmlns:a16="http://schemas.microsoft.com/office/drawing/2014/main" id="{01B5CCB8-25B3-425D-9DCE-828A8705A6C0}"/>
+              </a:ext>
+            </a:extLst>
+          </p:cNvPr>
+          <p:cNvPicPr>
+            <a:picLocks noChangeAspect="1"/>
+          </p:cNvPicPr>
+          <p:nvPr/>
+        </p:nvPicPr>
+        <p:blipFill>
+          <a:blip r:embed="rId3"/>
+          <a:stretch>
+            <a:fillRect/>
+          </a:stretch>
+        </p:blipFill>
+        <p:spPr>
+          <a:xfrm>
+            <a:off x="1004887" y="3119437"/>
+            <a:ext cx="4067175" cy="619125"/>
+          </a:xfrm>
+          <a:prstGeom prst="rect">
+            <a:avLst/>
+          </a:prstGeom>
+        </p:spPr>
+      </p:pic>
+      <p:pic>
+        <p:nvPicPr>
+          <p:cNvPr id="6" name="Picture 5">
+            <a:extLst>
+              <a:ext uri="{FF2B5EF4-FFF2-40B4-BE49-F238E27FC236}">
+                <a16:creationId xmlns:a16="http://schemas.microsoft.com/office/drawing/2014/main" id="{993A7E7F-2A2E-4C19-BCDB-A8909F4B5072}"/>
+              </a:ext>
+            </a:extLst>
+          </p:cNvPr>
+          <p:cNvPicPr>
+            <a:picLocks noChangeAspect="1"/>
+          </p:cNvPicPr>
+          <p:nvPr/>
+        </p:nvPicPr>
+        <p:blipFill>
+          <a:blip r:embed="rId4"/>
+          <a:stretch>
+            <a:fillRect/>
+          </a:stretch>
+        </p:blipFill>
+        <p:spPr>
+          <a:xfrm>
+            <a:off x="1004887" y="3983830"/>
+            <a:ext cx="8477250" cy="1181100"/>
           </a:xfrm>
           <a:prstGeom prst="rect">
             <a:avLst/>
@@ -11082,7 +11124,7 @@
     </p:spTree>
     <p:extLst>
       <p:ext uri="{BB962C8B-B14F-4D97-AF65-F5344CB8AC3E}">
-        <p14:creationId xmlns:p14="http://schemas.microsoft.com/office/powerpoint/2010/main" val="2286989010"/>
+        <p14:creationId xmlns:p14="http://schemas.microsoft.com/office/powerpoint/2010/main" val="1721768763"/>
       </p:ext>
     </p:extLst>
   </p:cSld>
@@ -11175,6 +11217,221 @@
     <p:extLst>
       <p:ext uri="{BB962C8B-B14F-4D97-AF65-F5344CB8AC3E}">
         <p14:creationId xmlns:p14="http://schemas.microsoft.com/office/powerpoint/2010/main" val="2742157492"/>
+      </p:ext>
+    </p:extLst>
+  </p:cSld>
+  <p:clrMapOvr>
+    <a:masterClrMapping/>
+  </p:clrMapOvr>
+</p:sld>
+</file>
+
+<file path=ppt/slides/slide40.xml><?xml version="1.0" encoding="utf-8"?>
+<p:sld xmlns:a="http://schemas.openxmlformats.org/drawingml/2006/main" xmlns:r="http://schemas.openxmlformats.org/officeDocument/2006/relationships" xmlns:p="http://schemas.openxmlformats.org/presentationml/2006/main">
+  <p:cSld>
+    <p:spTree>
+      <p:nvGrpSpPr>
+        <p:cNvPr id="1" name=""/>
+        <p:cNvGrpSpPr/>
+        <p:nvPr/>
+      </p:nvGrpSpPr>
+      <p:grpSpPr>
+        <a:xfrm>
+          <a:off x="0" y="0"/>
+          <a:ext cx="0" cy="0"/>
+          <a:chOff x="0" y="0"/>
+          <a:chExt cx="0" cy="0"/>
+        </a:xfrm>
+      </p:grpSpPr>
+      <p:sp>
+        <p:nvSpPr>
+          <p:cNvPr id="2" name="Title 1">
+            <a:extLst>
+              <a:ext uri="{FF2B5EF4-FFF2-40B4-BE49-F238E27FC236}">
+                <a16:creationId xmlns:a16="http://schemas.microsoft.com/office/drawing/2014/main" id="{2A1AD830-4096-48C3-A823-B45F0D2C613D}"/>
+              </a:ext>
+            </a:extLst>
+          </p:cNvPr>
+          <p:cNvSpPr>
+            <a:spLocks noGrp="1"/>
+          </p:cNvSpPr>
+          <p:nvPr>
+            <p:ph type="title"/>
+          </p:nvPr>
+        </p:nvSpPr>
+        <p:spPr/>
+        <p:txBody>
+          <a:bodyPr/>
+          <a:lstStyle/>
+          <a:p>
+            <a:r>
+              <a:rPr lang="en-US" dirty="0"/>
+              <a:t>Use </a:t>
+            </a:r>
+            <a:r>
+              <a:rPr lang="en-US" dirty="0" err="1"/>
+              <a:t>dockfile</a:t>
+            </a:r>
+            <a:r>
+              <a:rPr lang="en-US" dirty="0"/>
+              <a:t> </a:t>
+            </a:r>
+            <a:r>
+              <a:rPr lang="en-US"/>
+              <a:t>for Petunia</a:t>
+            </a:r>
+          </a:p>
+        </p:txBody>
+      </p:sp>
+      <p:sp>
+        <p:nvSpPr>
+          <p:cNvPr id="3" name="Content Placeholder 2">
+            <a:extLst>
+              <a:ext uri="{FF2B5EF4-FFF2-40B4-BE49-F238E27FC236}">
+                <a16:creationId xmlns:a16="http://schemas.microsoft.com/office/drawing/2014/main" id="{48F24904-7290-4244-BA55-13E37A47AF07}"/>
+              </a:ext>
+            </a:extLst>
+          </p:cNvPr>
+          <p:cNvSpPr>
+            <a:spLocks noGrp="1"/>
+          </p:cNvSpPr>
+          <p:nvPr>
+            <p:ph sz="quarter" idx="13"/>
+          </p:nvPr>
+        </p:nvSpPr>
+        <p:spPr/>
+        <p:txBody>
+          <a:bodyPr/>
+          <a:lstStyle/>
+          <a:p>
+            <a:endParaRPr lang="en-US"/>
+          </a:p>
+        </p:txBody>
+      </p:sp>
+    </p:spTree>
+    <p:extLst>
+      <p:ext uri="{BB962C8B-B14F-4D97-AF65-F5344CB8AC3E}">
+        <p14:creationId xmlns:p14="http://schemas.microsoft.com/office/powerpoint/2010/main" val="2196681128"/>
+      </p:ext>
+    </p:extLst>
+  </p:cSld>
+  <p:clrMapOvr>
+    <a:masterClrMapping/>
+  </p:clrMapOvr>
+</p:sld>
+</file>
+
+<file path=ppt/slides/slide41.xml><?xml version="1.0" encoding="utf-8"?>
+<p:sld xmlns:a="http://schemas.openxmlformats.org/drawingml/2006/main" xmlns:r="http://schemas.openxmlformats.org/officeDocument/2006/relationships" xmlns:p="http://schemas.openxmlformats.org/presentationml/2006/main">
+  <p:cSld>
+    <p:spTree>
+      <p:nvGrpSpPr>
+        <p:cNvPr id="1" name=""/>
+        <p:cNvGrpSpPr/>
+        <p:nvPr/>
+      </p:nvGrpSpPr>
+      <p:grpSpPr>
+        <a:xfrm>
+          <a:off x="0" y="0"/>
+          <a:ext cx="0" cy="0"/>
+          <a:chOff x="0" y="0"/>
+          <a:chExt cx="0" cy="0"/>
+        </a:xfrm>
+      </p:grpSpPr>
+      <p:sp>
+        <p:nvSpPr>
+          <p:cNvPr id="2" name="Title 1">
+            <a:extLst>
+              <a:ext uri="{FF2B5EF4-FFF2-40B4-BE49-F238E27FC236}">
+                <a16:creationId xmlns:a16="http://schemas.microsoft.com/office/drawing/2014/main" id="{6EE111B4-E6ED-4BEF-95A2-BE2F4EC7B7B6}"/>
+              </a:ext>
+            </a:extLst>
+          </p:cNvPr>
+          <p:cNvSpPr>
+            <a:spLocks noGrp="1"/>
+          </p:cNvSpPr>
+          <p:nvPr>
+            <p:ph type="title"/>
+          </p:nvPr>
+        </p:nvSpPr>
+        <p:spPr/>
+        <p:txBody>
+          <a:bodyPr/>
+          <a:lstStyle/>
+          <a:p>
+            <a:r>
+              <a:rPr lang="en-US" dirty="0"/>
+              <a:t>search alpine image</a:t>
+            </a:r>
+          </a:p>
+        </p:txBody>
+      </p:sp>
+      <p:sp>
+        <p:nvSpPr>
+          <p:cNvPr id="3" name="Content Placeholder 2">
+            <a:extLst>
+              <a:ext uri="{FF2B5EF4-FFF2-40B4-BE49-F238E27FC236}">
+                <a16:creationId xmlns:a16="http://schemas.microsoft.com/office/drawing/2014/main" id="{6DA82F44-40AA-4077-914B-E895EC72259C}"/>
+              </a:ext>
+            </a:extLst>
+          </p:cNvPr>
+          <p:cNvSpPr>
+            <a:spLocks noGrp="1"/>
+          </p:cNvSpPr>
+          <p:nvPr>
+            <p:ph sz="quarter" idx="13"/>
+          </p:nvPr>
+        </p:nvSpPr>
+        <p:spPr/>
+        <p:txBody>
+          <a:bodyPr/>
+          <a:lstStyle/>
+          <a:p>
+            <a:r>
+              <a:rPr lang="en-US" dirty="0" err="1"/>
+              <a:t>sudo</a:t>
+            </a:r>
+            <a:r>
+              <a:rPr lang="en-US" dirty="0"/>
+              <a:t> docker search alpine</a:t>
+            </a:r>
+          </a:p>
+        </p:txBody>
+      </p:sp>
+      <p:pic>
+        <p:nvPicPr>
+          <p:cNvPr id="4" name="Picture 3">
+            <a:extLst>
+              <a:ext uri="{FF2B5EF4-FFF2-40B4-BE49-F238E27FC236}">
+                <a16:creationId xmlns:a16="http://schemas.microsoft.com/office/drawing/2014/main" id="{F4DA52F7-9BF1-4F79-800B-4D374B5C321E}"/>
+              </a:ext>
+            </a:extLst>
+          </p:cNvPr>
+          <p:cNvPicPr>
+            <a:picLocks noChangeAspect="1"/>
+          </p:cNvPicPr>
+          <p:nvPr/>
+        </p:nvPicPr>
+        <p:blipFill>
+          <a:blip r:embed="rId2"/>
+          <a:stretch>
+            <a:fillRect/>
+          </a:stretch>
+        </p:blipFill>
+        <p:spPr>
+          <a:xfrm>
+            <a:off x="1189608" y="2834807"/>
+            <a:ext cx="9502066" cy="3911396"/>
+          </a:xfrm>
+          <a:prstGeom prst="rect">
+            <a:avLst/>
+          </a:prstGeom>
+        </p:spPr>
+      </p:pic>
+    </p:spTree>
+    <p:extLst>
+      <p:ext uri="{BB962C8B-B14F-4D97-AF65-F5344CB8AC3E}">
+        <p14:creationId xmlns:p14="http://schemas.microsoft.com/office/powerpoint/2010/main" val="2286989010"/>
       </p:ext>
     </p:extLst>
   </p:cSld>

</xml_diff>

<commit_message>
Add docker for petunia
Signed-off-by: Liu Haixiang <haixiang1977@gmail.com>
</commit_message>
<xml_diff>
--- a/Docker Practice.pptx
+++ b/Docker Practice.pptx
@@ -44,8 +44,15 @@
     <p:sldId id="295" r:id="rId38"/>
     <p:sldId id="280" r:id="rId39"/>
     <p:sldId id="296" r:id="rId40"/>
-    <p:sldId id="297" r:id="rId41"/>
-    <p:sldId id="265" r:id="rId42"/>
+    <p:sldId id="298" r:id="rId41"/>
+    <p:sldId id="297" r:id="rId42"/>
+    <p:sldId id="299" r:id="rId43"/>
+    <p:sldId id="300" r:id="rId44"/>
+    <p:sldId id="301" r:id="rId45"/>
+    <p:sldId id="302" r:id="rId46"/>
+    <p:sldId id="303" r:id="rId47"/>
+    <p:sldId id="304" r:id="rId48"/>
+    <p:sldId id="265" r:id="rId49"/>
   </p:sldIdLst>
   <p:sldSz cx="12192000" cy="6858000"/>
   <p:notesSz cx="6858000" cy="9144000"/>
@@ -188,7 +195,14 @@
             <p14:sldId id="295"/>
             <p14:sldId id="280"/>
             <p14:sldId id="296"/>
+            <p14:sldId id="298"/>
             <p14:sldId id="297"/>
+            <p14:sldId id="299"/>
+            <p14:sldId id="300"/>
+            <p14:sldId id="301"/>
+            <p14:sldId id="302"/>
+            <p14:sldId id="303"/>
+            <p14:sldId id="304"/>
             <p14:sldId id="265"/>
           </p14:sldIdLst>
         </p14:section>
@@ -11248,6 +11262,165 @@
           <p:cNvPr id="2" name="Title 1">
             <a:extLst>
               <a:ext uri="{FF2B5EF4-FFF2-40B4-BE49-F238E27FC236}">
+                <a16:creationId xmlns:a16="http://schemas.microsoft.com/office/drawing/2014/main" id="{2FE31F5E-1428-4C82-AD38-E728ECF70120}"/>
+              </a:ext>
+            </a:extLst>
+          </p:cNvPr>
+          <p:cNvSpPr>
+            <a:spLocks noGrp="1"/>
+          </p:cNvSpPr>
+          <p:nvPr>
+            <p:ph type="title"/>
+          </p:nvPr>
+        </p:nvSpPr>
+        <p:spPr/>
+        <p:txBody>
+          <a:bodyPr/>
+          <a:lstStyle/>
+          <a:p>
+            <a:r>
+              <a:rPr lang="en-US" dirty="0"/>
+              <a:t>Install </a:t>
+            </a:r>
+            <a:r>
+              <a:rPr lang="en-US" dirty="0" err="1"/>
+              <a:t>redis</a:t>
+            </a:r>
+            <a:r>
+              <a:rPr lang="en-US" dirty="0"/>
+              <a:t> and node docker</a:t>
+            </a:r>
+          </a:p>
+        </p:txBody>
+      </p:sp>
+      <p:sp>
+        <p:nvSpPr>
+          <p:cNvPr id="3" name="Content Placeholder 2">
+            <a:extLst>
+              <a:ext uri="{FF2B5EF4-FFF2-40B4-BE49-F238E27FC236}">
+                <a16:creationId xmlns:a16="http://schemas.microsoft.com/office/drawing/2014/main" id="{BD12475A-9F26-4DB2-BE67-D642C28B0B95}"/>
+              </a:ext>
+            </a:extLst>
+          </p:cNvPr>
+          <p:cNvSpPr>
+            <a:spLocks noGrp="1"/>
+          </p:cNvSpPr>
+          <p:nvPr>
+            <p:ph sz="quarter" idx="13"/>
+          </p:nvPr>
+        </p:nvSpPr>
+        <p:spPr/>
+        <p:txBody>
+          <a:bodyPr/>
+          <a:lstStyle/>
+          <a:p>
+            <a:r>
+              <a:rPr lang="en-US" dirty="0"/>
+              <a:t>Run </a:t>
+            </a:r>
+            <a:r>
+              <a:rPr lang="en-US" dirty="0" err="1"/>
+              <a:t>redis</a:t>
+            </a:r>
+            <a:endParaRPr lang="en-US" dirty="0"/>
+          </a:p>
+        </p:txBody>
+      </p:sp>
+      <p:pic>
+        <p:nvPicPr>
+          <p:cNvPr id="4" name="Picture 3">
+            <a:extLst>
+              <a:ext uri="{FF2B5EF4-FFF2-40B4-BE49-F238E27FC236}">
+                <a16:creationId xmlns:a16="http://schemas.microsoft.com/office/drawing/2014/main" id="{361AA993-1B0D-4F8B-B727-F45753CE1829}"/>
+              </a:ext>
+            </a:extLst>
+          </p:cNvPr>
+          <p:cNvPicPr>
+            <a:picLocks noChangeAspect="1"/>
+          </p:cNvPicPr>
+          <p:nvPr/>
+        </p:nvPicPr>
+        <p:blipFill>
+          <a:blip r:embed="rId2"/>
+          <a:stretch>
+            <a:fillRect/>
+          </a:stretch>
+        </p:blipFill>
+        <p:spPr>
+          <a:xfrm>
+            <a:off x="487959" y="2907125"/>
+            <a:ext cx="11215456" cy="1043750"/>
+          </a:xfrm>
+          <a:prstGeom prst="rect">
+            <a:avLst/>
+          </a:prstGeom>
+        </p:spPr>
+      </p:pic>
+      <p:pic>
+        <p:nvPicPr>
+          <p:cNvPr id="5" name="Picture 4">
+            <a:extLst>
+              <a:ext uri="{FF2B5EF4-FFF2-40B4-BE49-F238E27FC236}">
+                <a16:creationId xmlns:a16="http://schemas.microsoft.com/office/drawing/2014/main" id="{9C0A4A85-1E4F-45C3-927A-0051FA88D9CE}"/>
+              </a:ext>
+            </a:extLst>
+          </p:cNvPr>
+          <p:cNvPicPr>
+            <a:picLocks noChangeAspect="1"/>
+          </p:cNvPicPr>
+          <p:nvPr/>
+        </p:nvPicPr>
+        <p:blipFill>
+          <a:blip r:embed="rId3"/>
+          <a:stretch>
+            <a:fillRect/>
+          </a:stretch>
+        </p:blipFill>
+        <p:spPr>
+          <a:xfrm>
+            <a:off x="487959" y="4229193"/>
+            <a:ext cx="4762500" cy="1009650"/>
+          </a:xfrm>
+          <a:prstGeom prst="rect">
+            <a:avLst/>
+          </a:prstGeom>
+        </p:spPr>
+      </p:pic>
+    </p:spTree>
+    <p:extLst>
+      <p:ext uri="{BB962C8B-B14F-4D97-AF65-F5344CB8AC3E}">
+        <p14:creationId xmlns:p14="http://schemas.microsoft.com/office/powerpoint/2010/main" val="3416628897"/>
+      </p:ext>
+    </p:extLst>
+  </p:cSld>
+  <p:clrMapOvr>
+    <a:masterClrMapping/>
+  </p:clrMapOvr>
+</p:sld>
+</file>
+
+<file path=ppt/slides/slide41.xml><?xml version="1.0" encoding="utf-8"?>
+<p:sld xmlns:a="http://schemas.openxmlformats.org/drawingml/2006/main" xmlns:r="http://schemas.openxmlformats.org/officeDocument/2006/relationships" xmlns:p="http://schemas.openxmlformats.org/presentationml/2006/main">
+  <p:cSld>
+    <p:spTree>
+      <p:nvGrpSpPr>
+        <p:cNvPr id="1" name=""/>
+        <p:cNvGrpSpPr/>
+        <p:nvPr/>
+      </p:nvGrpSpPr>
+      <p:grpSpPr>
+        <a:xfrm>
+          <a:off x="0" y="0"/>
+          <a:ext cx="0" cy="0"/>
+          <a:chOff x="0" y="0"/>
+          <a:chExt cx="0" cy="0"/>
+        </a:xfrm>
+      </p:grpSpPr>
+      <p:sp>
+        <p:nvSpPr>
+          <p:cNvPr id="2" name="Title 1">
+            <a:extLst>
+              <a:ext uri="{FF2B5EF4-FFF2-40B4-BE49-F238E27FC236}">
                 <a16:creationId xmlns:a16="http://schemas.microsoft.com/office/drawing/2014/main" id="{2A1AD830-4096-48C3-A823-B45F0D2C613D}"/>
               </a:ext>
             </a:extLst>
@@ -11274,11 +11447,7 @@
             </a:r>
             <a:r>
               <a:rPr lang="en-US" dirty="0"/>
-              <a:t> </a:t>
-            </a:r>
-            <a:r>
-              <a:rPr lang="en-US"/>
-              <a:t>for Petunia</a:t>
+              <a:t> for Petunia</a:t>
             </a:r>
           </a:p>
         </p:txBody>
@@ -11304,10 +11473,103 @@
           <a:bodyPr/>
           <a:lstStyle/>
           <a:p>
-            <a:endParaRPr lang="en-US"/>
-          </a:p>
-        </p:txBody>
-      </p:sp>
+            <a:r>
+              <a:rPr lang="en-US" dirty="0"/>
+              <a:t>Download the node version 10.20.1, same as the node version in host</a:t>
+            </a:r>
+          </a:p>
+        </p:txBody>
+      </p:sp>
+      <p:pic>
+        <p:nvPicPr>
+          <p:cNvPr id="4" name="Picture 3">
+            <a:extLst>
+              <a:ext uri="{FF2B5EF4-FFF2-40B4-BE49-F238E27FC236}">
+                <a16:creationId xmlns:a16="http://schemas.microsoft.com/office/drawing/2014/main" id="{1BEAEC2E-C6C7-4BB4-9843-D69DDB206603}"/>
+              </a:ext>
+            </a:extLst>
+          </p:cNvPr>
+          <p:cNvPicPr>
+            <a:picLocks noChangeAspect="1"/>
+          </p:cNvPicPr>
+          <p:nvPr/>
+        </p:nvPicPr>
+        <p:blipFill>
+          <a:blip r:embed="rId2"/>
+          <a:stretch>
+            <a:fillRect/>
+          </a:stretch>
+        </p:blipFill>
+        <p:spPr>
+          <a:xfrm>
+            <a:off x="1224748" y="2981325"/>
+            <a:ext cx="5410200" cy="447675"/>
+          </a:xfrm>
+          <a:prstGeom prst="rect">
+            <a:avLst/>
+          </a:prstGeom>
+        </p:spPr>
+      </p:pic>
+      <p:pic>
+        <p:nvPicPr>
+          <p:cNvPr id="5" name="Picture 4">
+            <a:extLst>
+              <a:ext uri="{FF2B5EF4-FFF2-40B4-BE49-F238E27FC236}">
+                <a16:creationId xmlns:a16="http://schemas.microsoft.com/office/drawing/2014/main" id="{56B531C0-EE90-4EB5-B0D8-7E2705E94D19}"/>
+              </a:ext>
+            </a:extLst>
+          </p:cNvPr>
+          <p:cNvPicPr>
+            <a:picLocks noChangeAspect="1"/>
+          </p:cNvPicPr>
+          <p:nvPr/>
+        </p:nvPicPr>
+        <p:blipFill>
+          <a:blip r:embed="rId3"/>
+          <a:stretch>
+            <a:fillRect/>
+          </a:stretch>
+        </p:blipFill>
+        <p:spPr>
+          <a:xfrm>
+            <a:off x="1224748" y="4259991"/>
+            <a:ext cx="8486775" cy="1314450"/>
+          </a:xfrm>
+          <a:prstGeom prst="rect">
+            <a:avLst/>
+          </a:prstGeom>
+        </p:spPr>
+      </p:pic>
+      <p:pic>
+        <p:nvPicPr>
+          <p:cNvPr id="6" name="Picture 5">
+            <a:extLst>
+              <a:ext uri="{FF2B5EF4-FFF2-40B4-BE49-F238E27FC236}">
+                <a16:creationId xmlns:a16="http://schemas.microsoft.com/office/drawing/2014/main" id="{121983A2-A653-40D0-BD84-56D37B05829D}"/>
+              </a:ext>
+            </a:extLst>
+          </p:cNvPr>
+          <p:cNvPicPr>
+            <a:picLocks noChangeAspect="1"/>
+          </p:cNvPicPr>
+          <p:nvPr/>
+        </p:nvPicPr>
+        <p:blipFill>
+          <a:blip r:embed="rId4"/>
+          <a:stretch>
+            <a:fillRect/>
+          </a:stretch>
+        </p:blipFill>
+        <p:spPr>
+          <a:xfrm>
+            <a:off x="1224748" y="3624133"/>
+            <a:ext cx="6181725" cy="419100"/>
+          </a:xfrm>
+          <a:prstGeom prst="rect">
+            <a:avLst/>
+          </a:prstGeom>
+        </p:spPr>
+      </p:pic>
     </p:spTree>
     <p:extLst>
       <p:ext uri="{BB962C8B-B14F-4D97-AF65-F5344CB8AC3E}">
@@ -11321,7 +11583,941 @@
 </p:sld>
 </file>
 
-<file path=ppt/slides/slide41.xml><?xml version="1.0" encoding="utf-8"?>
+<file path=ppt/slides/slide42.xml><?xml version="1.0" encoding="utf-8"?>
+<p:sld xmlns:a="http://schemas.openxmlformats.org/drawingml/2006/main" xmlns:r="http://schemas.openxmlformats.org/officeDocument/2006/relationships" xmlns:p="http://schemas.openxmlformats.org/presentationml/2006/main">
+  <p:cSld>
+    <p:spTree>
+      <p:nvGrpSpPr>
+        <p:cNvPr id="1" name=""/>
+        <p:cNvGrpSpPr/>
+        <p:nvPr/>
+      </p:nvGrpSpPr>
+      <p:grpSpPr>
+        <a:xfrm>
+          <a:off x="0" y="0"/>
+          <a:ext cx="0" cy="0"/>
+          <a:chOff x="0" y="0"/>
+          <a:chExt cx="0" cy="0"/>
+        </a:xfrm>
+      </p:grpSpPr>
+      <p:sp>
+        <p:nvSpPr>
+          <p:cNvPr id="2" name="Title 1">
+            <a:extLst>
+              <a:ext uri="{FF2B5EF4-FFF2-40B4-BE49-F238E27FC236}">
+                <a16:creationId xmlns:a16="http://schemas.microsoft.com/office/drawing/2014/main" id="{B572CC02-9D44-48A5-870C-96143837D060}"/>
+              </a:ext>
+            </a:extLst>
+          </p:cNvPr>
+          <p:cNvSpPr>
+            <a:spLocks noGrp="1"/>
+          </p:cNvSpPr>
+          <p:nvPr>
+            <p:ph type="title"/>
+          </p:nvPr>
+        </p:nvSpPr>
+        <p:spPr/>
+        <p:txBody>
+          <a:bodyPr/>
+          <a:lstStyle/>
+          <a:p>
+            <a:r>
+              <a:rPr lang="en-US" dirty="0"/>
+              <a:t>Use </a:t>
+            </a:r>
+            <a:r>
+              <a:rPr lang="en-US" dirty="0" err="1"/>
+              <a:t>dockfile</a:t>
+            </a:r>
+            <a:r>
+              <a:rPr lang="en-US" dirty="0"/>
+              <a:t> for Petunia (cont.)</a:t>
+            </a:r>
+          </a:p>
+        </p:txBody>
+      </p:sp>
+      <p:sp>
+        <p:nvSpPr>
+          <p:cNvPr id="3" name="Content Placeholder 2">
+            <a:extLst>
+              <a:ext uri="{FF2B5EF4-FFF2-40B4-BE49-F238E27FC236}">
+                <a16:creationId xmlns:a16="http://schemas.microsoft.com/office/drawing/2014/main" id="{BD4CBD10-B659-43D6-87FD-447405D4AF31}"/>
+              </a:ext>
+            </a:extLst>
+          </p:cNvPr>
+          <p:cNvSpPr>
+            <a:spLocks noGrp="1"/>
+          </p:cNvSpPr>
+          <p:nvPr>
+            <p:ph sz="quarter" idx="13"/>
+          </p:nvPr>
+        </p:nvSpPr>
+        <p:spPr/>
+        <p:txBody>
+          <a:bodyPr/>
+          <a:lstStyle/>
+          <a:p>
+            <a:r>
+              <a:rPr lang="en-US" dirty="0"/>
+              <a:t>Run bash command environment</a:t>
+            </a:r>
+          </a:p>
+        </p:txBody>
+      </p:sp>
+      <p:pic>
+        <p:nvPicPr>
+          <p:cNvPr id="4" name="Picture 3">
+            <a:extLst>
+              <a:ext uri="{FF2B5EF4-FFF2-40B4-BE49-F238E27FC236}">
+                <a16:creationId xmlns:a16="http://schemas.microsoft.com/office/drawing/2014/main" id="{C5677519-8E65-4AD7-9CF3-372CC10C3007}"/>
+              </a:ext>
+            </a:extLst>
+          </p:cNvPr>
+          <p:cNvPicPr>
+            <a:picLocks noChangeAspect="1"/>
+          </p:cNvPicPr>
+          <p:nvPr/>
+        </p:nvPicPr>
+        <p:blipFill>
+          <a:blip r:embed="rId2"/>
+          <a:stretch>
+            <a:fillRect/>
+          </a:stretch>
+        </p:blipFill>
+        <p:spPr>
+          <a:xfrm>
+            <a:off x="814074" y="2838450"/>
+            <a:ext cx="10563225" cy="1181100"/>
+          </a:xfrm>
+          <a:prstGeom prst="rect">
+            <a:avLst/>
+          </a:prstGeom>
+        </p:spPr>
+      </p:pic>
+      <p:pic>
+        <p:nvPicPr>
+          <p:cNvPr id="5" name="Picture 4">
+            <a:extLst>
+              <a:ext uri="{FF2B5EF4-FFF2-40B4-BE49-F238E27FC236}">
+                <a16:creationId xmlns:a16="http://schemas.microsoft.com/office/drawing/2014/main" id="{545E429D-BD73-4DD4-A251-3F1BBFDF69E2}"/>
+              </a:ext>
+            </a:extLst>
+          </p:cNvPr>
+          <p:cNvPicPr>
+            <a:picLocks noChangeAspect="1"/>
+          </p:cNvPicPr>
+          <p:nvPr/>
+        </p:nvPicPr>
+        <p:blipFill>
+          <a:blip r:embed="rId3"/>
+          <a:stretch>
+            <a:fillRect/>
+          </a:stretch>
+        </p:blipFill>
+        <p:spPr>
+          <a:xfrm>
+            <a:off x="814074" y="4171948"/>
+            <a:ext cx="3800475" cy="561975"/>
+          </a:xfrm>
+          <a:prstGeom prst="rect">
+            <a:avLst/>
+          </a:prstGeom>
+        </p:spPr>
+      </p:pic>
+    </p:spTree>
+    <p:extLst>
+      <p:ext uri="{BB962C8B-B14F-4D97-AF65-F5344CB8AC3E}">
+        <p14:creationId xmlns:p14="http://schemas.microsoft.com/office/powerpoint/2010/main" val="3841872749"/>
+      </p:ext>
+    </p:extLst>
+  </p:cSld>
+  <p:clrMapOvr>
+    <a:masterClrMapping/>
+  </p:clrMapOvr>
+</p:sld>
+</file>
+
+<file path=ppt/slides/slide43.xml><?xml version="1.0" encoding="utf-8"?>
+<p:sld xmlns:a="http://schemas.openxmlformats.org/drawingml/2006/main" xmlns:r="http://schemas.openxmlformats.org/officeDocument/2006/relationships" xmlns:p="http://schemas.openxmlformats.org/presentationml/2006/main">
+  <p:cSld>
+    <p:spTree>
+      <p:nvGrpSpPr>
+        <p:cNvPr id="1" name=""/>
+        <p:cNvGrpSpPr/>
+        <p:nvPr/>
+      </p:nvGrpSpPr>
+      <p:grpSpPr>
+        <a:xfrm>
+          <a:off x="0" y="0"/>
+          <a:ext cx="0" cy="0"/>
+          <a:chOff x="0" y="0"/>
+          <a:chExt cx="0" cy="0"/>
+        </a:xfrm>
+      </p:grpSpPr>
+      <p:sp>
+        <p:nvSpPr>
+          <p:cNvPr id="2" name="Title 1">
+            <a:extLst>
+              <a:ext uri="{FF2B5EF4-FFF2-40B4-BE49-F238E27FC236}">
+                <a16:creationId xmlns:a16="http://schemas.microsoft.com/office/drawing/2014/main" id="{5C8DEA4E-22DB-4DD6-AD84-F76D4C49FFFB}"/>
+              </a:ext>
+            </a:extLst>
+          </p:cNvPr>
+          <p:cNvSpPr>
+            <a:spLocks noGrp="1"/>
+          </p:cNvSpPr>
+          <p:nvPr>
+            <p:ph type="title"/>
+          </p:nvPr>
+        </p:nvSpPr>
+        <p:spPr/>
+        <p:txBody>
+          <a:bodyPr/>
+          <a:lstStyle/>
+          <a:p>
+            <a:r>
+              <a:rPr lang="en-US" dirty="0"/>
+              <a:t>Use </a:t>
+            </a:r>
+            <a:r>
+              <a:rPr lang="en-US" dirty="0" err="1"/>
+              <a:t>dockfile</a:t>
+            </a:r>
+            <a:r>
+              <a:rPr lang="en-US" dirty="0"/>
+              <a:t> for Petunia (cont.)</a:t>
+            </a:r>
+          </a:p>
+        </p:txBody>
+      </p:sp>
+      <p:sp>
+        <p:nvSpPr>
+          <p:cNvPr id="3" name="Content Placeholder 2">
+            <a:extLst>
+              <a:ext uri="{FF2B5EF4-FFF2-40B4-BE49-F238E27FC236}">
+                <a16:creationId xmlns:a16="http://schemas.microsoft.com/office/drawing/2014/main" id="{DD1A2AE0-E3E8-4AE0-AF7C-9D4E853B10C7}"/>
+              </a:ext>
+            </a:extLst>
+          </p:cNvPr>
+          <p:cNvSpPr>
+            <a:spLocks noGrp="1"/>
+          </p:cNvSpPr>
+          <p:nvPr>
+            <p:ph sz="quarter" idx="13"/>
+          </p:nvPr>
+        </p:nvSpPr>
+        <p:spPr/>
+        <p:txBody>
+          <a:bodyPr/>
+          <a:lstStyle/>
+          <a:p>
+            <a:r>
+              <a:rPr lang="en-US" dirty="0"/>
+              <a:t>Install petunia</a:t>
+            </a:r>
+          </a:p>
+        </p:txBody>
+      </p:sp>
+      <p:pic>
+        <p:nvPicPr>
+          <p:cNvPr id="4" name="Picture 3">
+            <a:extLst>
+              <a:ext uri="{FF2B5EF4-FFF2-40B4-BE49-F238E27FC236}">
+                <a16:creationId xmlns:a16="http://schemas.microsoft.com/office/drawing/2014/main" id="{FD1AF8A7-BA72-47BA-A4B7-846DBB485384}"/>
+              </a:ext>
+            </a:extLst>
+          </p:cNvPr>
+          <p:cNvPicPr>
+            <a:picLocks noChangeAspect="1"/>
+          </p:cNvPicPr>
+          <p:nvPr/>
+        </p:nvPicPr>
+        <p:blipFill>
+          <a:blip r:embed="rId2"/>
+          <a:stretch>
+            <a:fillRect/>
+          </a:stretch>
+        </p:blipFill>
+        <p:spPr>
+          <a:xfrm>
+            <a:off x="1047565" y="2901321"/>
+            <a:ext cx="10842594" cy="759232"/>
+          </a:xfrm>
+          <a:prstGeom prst="rect">
+            <a:avLst/>
+          </a:prstGeom>
+        </p:spPr>
+      </p:pic>
+      <p:pic>
+        <p:nvPicPr>
+          <p:cNvPr id="5" name="Picture 4">
+            <a:extLst>
+              <a:ext uri="{FF2B5EF4-FFF2-40B4-BE49-F238E27FC236}">
+                <a16:creationId xmlns:a16="http://schemas.microsoft.com/office/drawing/2014/main" id="{2B151C86-0609-4A33-9536-7142D4B26C00}"/>
+              </a:ext>
+            </a:extLst>
+          </p:cNvPr>
+          <p:cNvPicPr>
+            <a:picLocks noChangeAspect="1"/>
+          </p:cNvPicPr>
+          <p:nvPr/>
+        </p:nvPicPr>
+        <p:blipFill>
+          <a:blip r:embed="rId3"/>
+          <a:stretch>
+            <a:fillRect/>
+          </a:stretch>
+        </p:blipFill>
+        <p:spPr>
+          <a:xfrm>
+            <a:off x="1047565" y="3915135"/>
+            <a:ext cx="6029325" cy="228600"/>
+          </a:xfrm>
+          <a:prstGeom prst="rect">
+            <a:avLst/>
+          </a:prstGeom>
+        </p:spPr>
+      </p:pic>
+      <p:pic>
+        <p:nvPicPr>
+          <p:cNvPr id="6" name="Picture 5">
+            <a:extLst>
+              <a:ext uri="{FF2B5EF4-FFF2-40B4-BE49-F238E27FC236}">
+                <a16:creationId xmlns:a16="http://schemas.microsoft.com/office/drawing/2014/main" id="{645CA265-FDB8-42BF-946E-DA152366C788}"/>
+              </a:ext>
+            </a:extLst>
+          </p:cNvPr>
+          <p:cNvPicPr>
+            <a:picLocks noChangeAspect="1"/>
+          </p:cNvPicPr>
+          <p:nvPr/>
+        </p:nvPicPr>
+        <p:blipFill>
+          <a:blip r:embed="rId4"/>
+          <a:stretch>
+            <a:fillRect/>
+          </a:stretch>
+        </p:blipFill>
+        <p:spPr>
+          <a:xfrm>
+            <a:off x="1047565" y="4403167"/>
+            <a:ext cx="10842594" cy="409476"/>
+          </a:xfrm>
+          <a:prstGeom prst="rect">
+            <a:avLst/>
+          </a:prstGeom>
+        </p:spPr>
+      </p:pic>
+    </p:spTree>
+    <p:extLst>
+      <p:ext uri="{BB962C8B-B14F-4D97-AF65-F5344CB8AC3E}">
+        <p14:creationId xmlns:p14="http://schemas.microsoft.com/office/powerpoint/2010/main" val="1888147173"/>
+      </p:ext>
+    </p:extLst>
+  </p:cSld>
+  <p:clrMapOvr>
+    <a:masterClrMapping/>
+  </p:clrMapOvr>
+</p:sld>
+</file>
+
+<file path=ppt/slides/slide44.xml><?xml version="1.0" encoding="utf-8"?>
+<p:sld xmlns:a="http://schemas.openxmlformats.org/drawingml/2006/main" xmlns:r="http://schemas.openxmlformats.org/officeDocument/2006/relationships" xmlns:p="http://schemas.openxmlformats.org/presentationml/2006/main">
+  <p:cSld>
+    <p:spTree>
+      <p:nvGrpSpPr>
+        <p:cNvPr id="1" name=""/>
+        <p:cNvGrpSpPr/>
+        <p:nvPr/>
+      </p:nvGrpSpPr>
+      <p:grpSpPr>
+        <a:xfrm>
+          <a:off x="0" y="0"/>
+          <a:ext cx="0" cy="0"/>
+          <a:chOff x="0" y="0"/>
+          <a:chExt cx="0" cy="0"/>
+        </a:xfrm>
+      </p:grpSpPr>
+      <p:sp>
+        <p:nvSpPr>
+          <p:cNvPr id="2" name="Title 1">
+            <a:extLst>
+              <a:ext uri="{FF2B5EF4-FFF2-40B4-BE49-F238E27FC236}">
+                <a16:creationId xmlns:a16="http://schemas.microsoft.com/office/drawing/2014/main" id="{FE4705E0-AC09-4F37-900B-3DA20ED33D25}"/>
+              </a:ext>
+            </a:extLst>
+          </p:cNvPr>
+          <p:cNvSpPr>
+            <a:spLocks noGrp="1"/>
+          </p:cNvSpPr>
+          <p:nvPr>
+            <p:ph type="title"/>
+          </p:nvPr>
+        </p:nvSpPr>
+        <p:spPr/>
+        <p:txBody>
+          <a:bodyPr/>
+          <a:lstStyle/>
+          <a:p>
+            <a:r>
+              <a:rPr lang="en-US" dirty="0"/>
+              <a:t>Use </a:t>
+            </a:r>
+            <a:r>
+              <a:rPr lang="en-US" dirty="0" err="1"/>
+              <a:t>dockfile</a:t>
+            </a:r>
+            <a:r>
+              <a:rPr lang="en-US" dirty="0"/>
+              <a:t> for Petunia (cont.)</a:t>
+            </a:r>
+          </a:p>
+        </p:txBody>
+      </p:sp>
+      <p:sp>
+        <p:nvSpPr>
+          <p:cNvPr id="3" name="Content Placeholder 2">
+            <a:extLst>
+              <a:ext uri="{FF2B5EF4-FFF2-40B4-BE49-F238E27FC236}">
+                <a16:creationId xmlns:a16="http://schemas.microsoft.com/office/drawing/2014/main" id="{C21B68C4-FB10-4EEA-AC24-A0077748549A}"/>
+              </a:ext>
+            </a:extLst>
+          </p:cNvPr>
+          <p:cNvSpPr>
+            <a:spLocks noGrp="1"/>
+          </p:cNvSpPr>
+          <p:nvPr>
+            <p:ph sz="quarter" idx="13"/>
+          </p:nvPr>
+        </p:nvSpPr>
+        <p:spPr/>
+        <p:txBody>
+          <a:bodyPr/>
+          <a:lstStyle/>
+          <a:p>
+            <a:r>
+              <a:rPr lang="en-US" dirty="0"/>
+              <a:t>Run petunia</a:t>
+            </a:r>
+          </a:p>
+        </p:txBody>
+      </p:sp>
+      <p:pic>
+        <p:nvPicPr>
+          <p:cNvPr id="4" name="Picture 3">
+            <a:extLst>
+              <a:ext uri="{FF2B5EF4-FFF2-40B4-BE49-F238E27FC236}">
+                <a16:creationId xmlns:a16="http://schemas.microsoft.com/office/drawing/2014/main" id="{9C5EFCDA-7A98-4CFA-81A8-594608EDCBB3}"/>
+              </a:ext>
+            </a:extLst>
+          </p:cNvPr>
+          <p:cNvPicPr>
+            <a:picLocks noChangeAspect="1"/>
+          </p:cNvPicPr>
+          <p:nvPr/>
+        </p:nvPicPr>
+        <p:blipFill>
+          <a:blip r:embed="rId2"/>
+          <a:stretch>
+            <a:fillRect/>
+          </a:stretch>
+        </p:blipFill>
+        <p:spPr>
+          <a:xfrm>
+            <a:off x="1235152" y="2861800"/>
+            <a:ext cx="5495925" cy="2714625"/>
+          </a:xfrm>
+          <a:prstGeom prst="rect">
+            <a:avLst/>
+          </a:prstGeom>
+        </p:spPr>
+      </p:pic>
+    </p:spTree>
+    <p:extLst>
+      <p:ext uri="{BB962C8B-B14F-4D97-AF65-F5344CB8AC3E}">
+        <p14:creationId xmlns:p14="http://schemas.microsoft.com/office/powerpoint/2010/main" val="240581549"/>
+      </p:ext>
+    </p:extLst>
+  </p:cSld>
+  <p:clrMapOvr>
+    <a:masterClrMapping/>
+  </p:clrMapOvr>
+</p:sld>
+</file>
+
+<file path=ppt/slides/slide45.xml><?xml version="1.0" encoding="utf-8"?>
+<p:sld xmlns:a="http://schemas.openxmlformats.org/drawingml/2006/main" xmlns:r="http://schemas.openxmlformats.org/officeDocument/2006/relationships" xmlns:p="http://schemas.openxmlformats.org/presentationml/2006/main">
+  <p:cSld>
+    <p:spTree>
+      <p:nvGrpSpPr>
+        <p:cNvPr id="1" name=""/>
+        <p:cNvGrpSpPr/>
+        <p:nvPr/>
+      </p:nvGrpSpPr>
+      <p:grpSpPr>
+        <a:xfrm>
+          <a:off x="0" y="0"/>
+          <a:ext cx="0" cy="0"/>
+          <a:chOff x="0" y="0"/>
+          <a:chExt cx="0" cy="0"/>
+        </a:xfrm>
+      </p:grpSpPr>
+      <p:sp>
+        <p:nvSpPr>
+          <p:cNvPr id="2" name="Title 1">
+            <a:extLst>
+              <a:ext uri="{FF2B5EF4-FFF2-40B4-BE49-F238E27FC236}">
+                <a16:creationId xmlns:a16="http://schemas.microsoft.com/office/drawing/2014/main" id="{D417696C-587A-4302-AC08-B93943F38907}"/>
+              </a:ext>
+            </a:extLst>
+          </p:cNvPr>
+          <p:cNvSpPr>
+            <a:spLocks noGrp="1"/>
+          </p:cNvSpPr>
+          <p:nvPr>
+            <p:ph type="title"/>
+          </p:nvPr>
+        </p:nvSpPr>
+        <p:spPr/>
+        <p:txBody>
+          <a:bodyPr/>
+          <a:lstStyle/>
+          <a:p>
+            <a:r>
+              <a:rPr lang="en-US" dirty="0"/>
+              <a:t>Use </a:t>
+            </a:r>
+            <a:r>
+              <a:rPr lang="en-US" dirty="0" err="1"/>
+              <a:t>dockfile</a:t>
+            </a:r>
+            <a:r>
+              <a:rPr lang="en-US" dirty="0"/>
+              <a:t> for Petunia (cont.)</a:t>
+            </a:r>
+          </a:p>
+        </p:txBody>
+      </p:sp>
+      <p:sp>
+        <p:nvSpPr>
+          <p:cNvPr id="3" name="Content Placeholder 2">
+            <a:extLst>
+              <a:ext uri="{FF2B5EF4-FFF2-40B4-BE49-F238E27FC236}">
+                <a16:creationId xmlns:a16="http://schemas.microsoft.com/office/drawing/2014/main" id="{1D7337E5-0360-431E-85C3-954B9C3BF394}"/>
+              </a:ext>
+            </a:extLst>
+          </p:cNvPr>
+          <p:cNvSpPr>
+            <a:spLocks noGrp="1"/>
+          </p:cNvSpPr>
+          <p:nvPr>
+            <p:ph sz="quarter" idx="13"/>
+          </p:nvPr>
+        </p:nvSpPr>
+        <p:spPr/>
+        <p:txBody>
+          <a:bodyPr/>
+          <a:lstStyle/>
+          <a:p>
+            <a:r>
+              <a:rPr lang="en-US" dirty="0"/>
+              <a:t>Check with </a:t>
+            </a:r>
+            <a:r>
+              <a:rPr lang="en-US" dirty="0" err="1"/>
+              <a:t>restapi</a:t>
+            </a:r>
+            <a:endParaRPr lang="en-US" dirty="0"/>
+          </a:p>
+        </p:txBody>
+      </p:sp>
+      <p:pic>
+        <p:nvPicPr>
+          <p:cNvPr id="4" name="Picture 3">
+            <a:extLst>
+              <a:ext uri="{FF2B5EF4-FFF2-40B4-BE49-F238E27FC236}">
+                <a16:creationId xmlns:a16="http://schemas.microsoft.com/office/drawing/2014/main" id="{7CF2F76B-E4FB-4D08-9AF8-BECD23C51C6B}"/>
+              </a:ext>
+            </a:extLst>
+          </p:cNvPr>
+          <p:cNvPicPr>
+            <a:picLocks noChangeAspect="1"/>
+          </p:cNvPicPr>
+          <p:nvPr/>
+        </p:nvPicPr>
+        <p:blipFill>
+          <a:blip r:embed="rId2"/>
+          <a:stretch>
+            <a:fillRect/>
+          </a:stretch>
+        </p:blipFill>
+        <p:spPr>
+          <a:xfrm>
+            <a:off x="558667" y="2914732"/>
+            <a:ext cx="11278226" cy="1254464"/>
+          </a:xfrm>
+          <a:prstGeom prst="rect">
+            <a:avLst/>
+          </a:prstGeom>
+        </p:spPr>
+      </p:pic>
+    </p:spTree>
+    <p:extLst>
+      <p:ext uri="{BB962C8B-B14F-4D97-AF65-F5344CB8AC3E}">
+        <p14:creationId xmlns:p14="http://schemas.microsoft.com/office/powerpoint/2010/main" val="22274285"/>
+      </p:ext>
+    </p:extLst>
+  </p:cSld>
+  <p:clrMapOvr>
+    <a:masterClrMapping/>
+  </p:clrMapOvr>
+</p:sld>
+</file>
+
+<file path=ppt/slides/slide46.xml><?xml version="1.0" encoding="utf-8"?>
+<p:sld xmlns:a="http://schemas.openxmlformats.org/drawingml/2006/main" xmlns:r="http://schemas.openxmlformats.org/officeDocument/2006/relationships" xmlns:p="http://schemas.openxmlformats.org/presentationml/2006/main">
+  <p:cSld>
+    <p:spTree>
+      <p:nvGrpSpPr>
+        <p:cNvPr id="1" name=""/>
+        <p:cNvGrpSpPr/>
+        <p:nvPr/>
+      </p:nvGrpSpPr>
+      <p:grpSpPr>
+        <a:xfrm>
+          <a:off x="0" y="0"/>
+          <a:ext cx="0" cy="0"/>
+          <a:chOff x="0" y="0"/>
+          <a:chExt cx="0" cy="0"/>
+        </a:xfrm>
+      </p:grpSpPr>
+      <p:sp>
+        <p:nvSpPr>
+          <p:cNvPr id="2" name="Title 1">
+            <a:extLst>
+              <a:ext uri="{FF2B5EF4-FFF2-40B4-BE49-F238E27FC236}">
+                <a16:creationId xmlns:a16="http://schemas.microsoft.com/office/drawing/2014/main" id="{A99B0C72-86E7-42A5-A37F-7F78A50E168E}"/>
+              </a:ext>
+            </a:extLst>
+          </p:cNvPr>
+          <p:cNvSpPr>
+            <a:spLocks noGrp="1"/>
+          </p:cNvSpPr>
+          <p:nvPr>
+            <p:ph type="title"/>
+          </p:nvPr>
+        </p:nvSpPr>
+        <p:spPr/>
+        <p:txBody>
+          <a:bodyPr/>
+          <a:lstStyle/>
+          <a:p>
+            <a:r>
+              <a:rPr lang="en-US" dirty="0"/>
+              <a:t>Use </a:t>
+            </a:r>
+            <a:r>
+              <a:rPr lang="en-US" dirty="0" err="1"/>
+              <a:t>dockfile</a:t>
+            </a:r>
+            <a:r>
+              <a:rPr lang="en-US" dirty="0"/>
+              <a:t> for Petunia (cont.)</a:t>
+            </a:r>
+          </a:p>
+        </p:txBody>
+      </p:sp>
+      <p:sp>
+        <p:nvSpPr>
+          <p:cNvPr id="3" name="Content Placeholder 2">
+            <a:extLst>
+              <a:ext uri="{FF2B5EF4-FFF2-40B4-BE49-F238E27FC236}">
+                <a16:creationId xmlns:a16="http://schemas.microsoft.com/office/drawing/2014/main" id="{EE805BB8-DC99-4B25-BB46-38DF3B78459D}"/>
+              </a:ext>
+            </a:extLst>
+          </p:cNvPr>
+          <p:cNvSpPr>
+            <a:spLocks noGrp="1"/>
+          </p:cNvSpPr>
+          <p:nvPr>
+            <p:ph sz="quarter" idx="13"/>
+          </p:nvPr>
+        </p:nvSpPr>
+        <p:spPr/>
+        <p:txBody>
+          <a:bodyPr/>
+          <a:lstStyle/>
+          <a:p>
+            <a:r>
+              <a:rPr lang="en-US" dirty="0"/>
+              <a:t>Commit and push to </a:t>
+            </a:r>
+            <a:r>
+              <a:rPr lang="en-US" dirty="0" err="1"/>
+              <a:t>dockhub</a:t>
+            </a:r>
+            <a:endParaRPr lang="en-US" dirty="0"/>
+          </a:p>
+        </p:txBody>
+      </p:sp>
+      <p:pic>
+        <p:nvPicPr>
+          <p:cNvPr id="4" name="Picture 3">
+            <a:extLst>
+              <a:ext uri="{FF2B5EF4-FFF2-40B4-BE49-F238E27FC236}">
+                <a16:creationId xmlns:a16="http://schemas.microsoft.com/office/drawing/2014/main" id="{B70C3ACC-9592-465A-B56E-7059978EEBEF}"/>
+              </a:ext>
+            </a:extLst>
+          </p:cNvPr>
+          <p:cNvPicPr>
+            <a:picLocks noChangeAspect="1"/>
+          </p:cNvPicPr>
+          <p:nvPr/>
+        </p:nvPicPr>
+        <p:blipFill>
+          <a:blip r:embed="rId2"/>
+          <a:stretch>
+            <a:fillRect/>
+          </a:stretch>
+        </p:blipFill>
+        <p:spPr>
+          <a:xfrm>
+            <a:off x="496836" y="2902109"/>
+            <a:ext cx="11197701" cy="338075"/>
+          </a:xfrm>
+          <a:prstGeom prst="rect">
+            <a:avLst/>
+          </a:prstGeom>
+        </p:spPr>
+      </p:pic>
+      <p:pic>
+        <p:nvPicPr>
+          <p:cNvPr id="5" name="Picture 4">
+            <a:extLst>
+              <a:ext uri="{FF2B5EF4-FFF2-40B4-BE49-F238E27FC236}">
+                <a16:creationId xmlns:a16="http://schemas.microsoft.com/office/drawing/2014/main" id="{A8F499B8-29FF-4676-AF72-48CE4B0511EC}"/>
+              </a:ext>
+            </a:extLst>
+          </p:cNvPr>
+          <p:cNvPicPr>
+            <a:picLocks noChangeAspect="1"/>
+          </p:cNvPicPr>
+          <p:nvPr/>
+        </p:nvPicPr>
+        <p:blipFill>
+          <a:blip r:embed="rId3"/>
+          <a:stretch>
+            <a:fillRect/>
+          </a:stretch>
+        </p:blipFill>
+        <p:spPr>
+          <a:xfrm>
+            <a:off x="998275" y="3429000"/>
+            <a:ext cx="9201150" cy="2514600"/>
+          </a:xfrm>
+          <a:prstGeom prst="rect">
+            <a:avLst/>
+          </a:prstGeom>
+        </p:spPr>
+      </p:pic>
+    </p:spTree>
+    <p:extLst>
+      <p:ext uri="{BB962C8B-B14F-4D97-AF65-F5344CB8AC3E}">
+        <p14:creationId xmlns:p14="http://schemas.microsoft.com/office/powerpoint/2010/main" val="166544688"/>
+      </p:ext>
+    </p:extLst>
+  </p:cSld>
+  <p:clrMapOvr>
+    <a:masterClrMapping/>
+  </p:clrMapOvr>
+</p:sld>
+</file>
+
+<file path=ppt/slides/slide47.xml><?xml version="1.0" encoding="utf-8"?>
+<p:sld xmlns:a="http://schemas.openxmlformats.org/drawingml/2006/main" xmlns:r="http://schemas.openxmlformats.org/officeDocument/2006/relationships" xmlns:p="http://schemas.openxmlformats.org/presentationml/2006/main">
+  <p:cSld>
+    <p:spTree>
+      <p:nvGrpSpPr>
+        <p:cNvPr id="1" name=""/>
+        <p:cNvGrpSpPr/>
+        <p:nvPr/>
+      </p:nvGrpSpPr>
+      <p:grpSpPr>
+        <a:xfrm>
+          <a:off x="0" y="0"/>
+          <a:ext cx="0" cy="0"/>
+          <a:chOff x="0" y="0"/>
+          <a:chExt cx="0" cy="0"/>
+        </a:xfrm>
+      </p:grpSpPr>
+      <p:sp>
+        <p:nvSpPr>
+          <p:cNvPr id="2" name="Title 1">
+            <a:extLst>
+              <a:ext uri="{FF2B5EF4-FFF2-40B4-BE49-F238E27FC236}">
+                <a16:creationId xmlns:a16="http://schemas.microsoft.com/office/drawing/2014/main" id="{4F9A4A2B-AAC0-44A7-AA55-8C1043B8C3E9}"/>
+              </a:ext>
+            </a:extLst>
+          </p:cNvPr>
+          <p:cNvSpPr>
+            <a:spLocks noGrp="1"/>
+          </p:cNvSpPr>
+          <p:nvPr>
+            <p:ph type="title"/>
+          </p:nvPr>
+        </p:nvSpPr>
+        <p:spPr/>
+        <p:txBody>
+          <a:bodyPr/>
+          <a:lstStyle/>
+          <a:p>
+            <a:r>
+              <a:rPr lang="en-US" dirty="0"/>
+              <a:t>Use </a:t>
+            </a:r>
+            <a:r>
+              <a:rPr lang="en-US" dirty="0" err="1"/>
+              <a:t>dockfile</a:t>
+            </a:r>
+            <a:r>
+              <a:rPr lang="en-US" dirty="0"/>
+              <a:t> for Petunia (cont.)</a:t>
+            </a:r>
+          </a:p>
+        </p:txBody>
+      </p:sp>
+      <p:sp>
+        <p:nvSpPr>
+          <p:cNvPr id="3" name="Content Placeholder 2">
+            <a:extLst>
+              <a:ext uri="{FF2B5EF4-FFF2-40B4-BE49-F238E27FC236}">
+                <a16:creationId xmlns:a16="http://schemas.microsoft.com/office/drawing/2014/main" id="{A13B0D75-9B43-4519-93EC-EB05F211832D}"/>
+              </a:ext>
+            </a:extLst>
+          </p:cNvPr>
+          <p:cNvSpPr>
+            <a:spLocks noGrp="1"/>
+          </p:cNvSpPr>
+          <p:nvPr>
+            <p:ph sz="quarter" idx="13"/>
+          </p:nvPr>
+        </p:nvSpPr>
+        <p:spPr/>
+        <p:txBody>
+          <a:bodyPr/>
+          <a:lstStyle/>
+          <a:p>
+            <a:r>
+              <a:rPr lang="en-US" dirty="0"/>
+              <a:t>Verify docker image</a:t>
+            </a:r>
+          </a:p>
+        </p:txBody>
+      </p:sp>
+      <p:pic>
+        <p:nvPicPr>
+          <p:cNvPr id="4" name="Picture 3">
+            <a:extLst>
+              <a:ext uri="{FF2B5EF4-FFF2-40B4-BE49-F238E27FC236}">
+                <a16:creationId xmlns:a16="http://schemas.microsoft.com/office/drawing/2014/main" id="{80AA7151-933A-4B6F-A709-44BE84312496}"/>
+              </a:ext>
+            </a:extLst>
+          </p:cNvPr>
+          <p:cNvPicPr>
+            <a:picLocks noChangeAspect="1"/>
+          </p:cNvPicPr>
+          <p:nvPr/>
+        </p:nvPicPr>
+        <p:blipFill>
+          <a:blip r:embed="rId2"/>
+          <a:stretch>
+            <a:fillRect/>
+          </a:stretch>
+        </p:blipFill>
+        <p:spPr>
+          <a:xfrm>
+            <a:off x="370411" y="2924175"/>
+            <a:ext cx="11610975" cy="1009650"/>
+          </a:xfrm>
+          <a:prstGeom prst="rect">
+            <a:avLst/>
+          </a:prstGeom>
+        </p:spPr>
+      </p:pic>
+      <p:pic>
+        <p:nvPicPr>
+          <p:cNvPr id="5" name="Picture 4">
+            <a:extLst>
+              <a:ext uri="{FF2B5EF4-FFF2-40B4-BE49-F238E27FC236}">
+                <a16:creationId xmlns:a16="http://schemas.microsoft.com/office/drawing/2014/main" id="{1E04248E-E619-41F5-B49C-7C94680FF466}"/>
+              </a:ext>
+            </a:extLst>
+          </p:cNvPr>
+          <p:cNvPicPr>
+            <a:picLocks noChangeAspect="1"/>
+          </p:cNvPicPr>
+          <p:nvPr/>
+        </p:nvPicPr>
+        <p:blipFill>
+          <a:blip r:embed="rId3"/>
+          <a:stretch>
+            <a:fillRect/>
+          </a:stretch>
+        </p:blipFill>
+        <p:spPr>
+          <a:xfrm>
+            <a:off x="408510" y="4086223"/>
+            <a:ext cx="11534775" cy="257175"/>
+          </a:xfrm>
+          <a:prstGeom prst="rect">
+            <a:avLst/>
+          </a:prstGeom>
+        </p:spPr>
+      </p:pic>
+      <p:pic>
+        <p:nvPicPr>
+          <p:cNvPr id="6" name="Picture 5">
+            <a:extLst>
+              <a:ext uri="{FF2B5EF4-FFF2-40B4-BE49-F238E27FC236}">
+                <a16:creationId xmlns:a16="http://schemas.microsoft.com/office/drawing/2014/main" id="{851CA36A-3F48-47DB-BCC1-F613D523BD12}"/>
+              </a:ext>
+            </a:extLst>
+          </p:cNvPr>
+          <p:cNvPicPr>
+            <a:picLocks noChangeAspect="1"/>
+          </p:cNvPicPr>
+          <p:nvPr/>
+        </p:nvPicPr>
+        <p:blipFill>
+          <a:blip r:embed="rId4"/>
+          <a:stretch>
+            <a:fillRect/>
+          </a:stretch>
+        </p:blipFill>
+        <p:spPr>
+          <a:xfrm>
+            <a:off x="408510" y="4490908"/>
+            <a:ext cx="5124450" cy="2314575"/>
+          </a:xfrm>
+          <a:prstGeom prst="rect">
+            <a:avLst/>
+          </a:prstGeom>
+        </p:spPr>
+      </p:pic>
+    </p:spTree>
+    <p:extLst>
+      <p:ext uri="{BB962C8B-B14F-4D97-AF65-F5344CB8AC3E}">
+        <p14:creationId xmlns:p14="http://schemas.microsoft.com/office/powerpoint/2010/main" val="2414850197"/>
+      </p:ext>
+    </p:extLst>
+  </p:cSld>
+  <p:clrMapOvr>
+    <a:masterClrMapping/>
+  </p:clrMapOvr>
+</p:sld>
+</file>
+
+<file path=ppt/slides/slide48.xml><?xml version="1.0" encoding="utf-8"?>
 <p:sld xmlns:a="http://schemas.openxmlformats.org/drawingml/2006/main" xmlns:r="http://schemas.openxmlformats.org/officeDocument/2006/relationships" xmlns:p="http://schemas.openxmlformats.org/presentationml/2006/main">
   <p:cSld>
     <p:spTree>

</xml_diff>